<commit_message>
Added support for tables and drawings in docx
Changed the output of .docx to be a list instead of a vector
</commit_message>
<xml_diff>
--- a/inst/extdata/example.pptx
+++ b/inst/extdata/example.pptx
@@ -8,6 +8,7 @@
     <p:sldId id="256" r:id="rId2"/>
     <p:sldId id="257" r:id="rId3"/>
     <p:sldId id="258" r:id="rId4"/>
+    <p:sldId id="259" r:id="rId5"/>
   </p:sldIdLst>
   <p:sldSz cx="12192000" cy="6858000"/>
   <p:notesSz cx="6858000" cy="9144000"/>
@@ -114,6 +115,4204 @@
 </p:presentation>
 </file>
 
+<file path=ppt/charts/chart1.xml><?xml version="1.0" encoding="utf-8"?>
+<c:chartSpace xmlns:c="http://schemas.openxmlformats.org/drawingml/2006/chart" xmlns:a="http://schemas.openxmlformats.org/drawingml/2006/main" xmlns:r="http://schemas.openxmlformats.org/officeDocument/2006/relationships" xmlns:c16r2="http://schemas.microsoft.com/office/drawing/2015/06/chart">
+  <c:date1904 val="0"/>
+  <c:lang val="en-US"/>
+  <c:roundedCorners val="0"/>
+  <mc:AlternateContent xmlns:mc="http://schemas.openxmlformats.org/markup-compatibility/2006">
+    <mc:Choice xmlns:c14="http://schemas.microsoft.com/office/drawing/2007/8/2/chart" Requires="c14">
+      <c14:style val="102"/>
+    </mc:Choice>
+    <mc:Fallback>
+      <c:style val="2"/>
+    </mc:Fallback>
+  </mc:AlternateContent>
+  <c:chart>
+    <c:title>
+      <c:overlay val="0"/>
+      <c:spPr>
+        <a:noFill/>
+        <a:ln>
+          <a:noFill/>
+        </a:ln>
+        <a:effectLst/>
+      </c:spPr>
+      <c:txPr>
+        <a:bodyPr rot="0" spcFirstLastPara="1" vertOverflow="ellipsis" vert="horz" wrap="square" anchor="ctr" anchorCtr="1"/>
+        <a:lstStyle/>
+        <a:p>
+          <a:pPr>
+            <a:defRPr sz="1862" b="0" i="0" u="none" strike="noStrike" kern="1200" spc="0" baseline="0">
+              <a:solidFill>
+                <a:schemeClr val="tx1">
+                  <a:lumMod val="65000"/>
+                  <a:lumOff val="35000"/>
+                </a:schemeClr>
+              </a:solidFill>
+              <a:latin typeface="+mn-lt"/>
+              <a:ea typeface="+mn-ea"/>
+              <a:cs typeface="+mn-cs"/>
+            </a:defRPr>
+          </a:pPr>
+          <a:endParaRPr lang="en-US"/>
+        </a:p>
+      </c:txPr>
+    </c:title>
+    <c:autoTitleDeleted val="0"/>
+    <c:plotArea>
+      <c:layout/>
+      <c:barChart>
+        <c:barDir val="col"/>
+        <c:grouping val="clustered"/>
+        <c:varyColors val="0"/>
+        <c:ser>
+          <c:idx val="0"/>
+          <c:order val="0"/>
+          <c:tx>
+            <c:strRef>
+              <c:f>Sheet1!$B$1</c:f>
+              <c:strCache>
+                <c:ptCount val="1"/>
+                <c:pt idx="0">
+                  <c:v>Series 1</c:v>
+                </c:pt>
+              </c:strCache>
+            </c:strRef>
+          </c:tx>
+          <c:spPr>
+            <a:solidFill>
+              <a:schemeClr val="accent1"/>
+            </a:solidFill>
+            <a:ln>
+              <a:noFill/>
+            </a:ln>
+            <a:effectLst/>
+          </c:spPr>
+          <c:invertIfNegative val="0"/>
+          <c:cat>
+            <c:strRef>
+              <c:f>Sheet1!$A$2:$A$5</c:f>
+              <c:strCache>
+                <c:ptCount val="4"/>
+                <c:pt idx="0">
+                  <c:v>Category 1</c:v>
+                </c:pt>
+                <c:pt idx="1">
+                  <c:v>Category 2</c:v>
+                </c:pt>
+                <c:pt idx="2">
+                  <c:v>Category 3</c:v>
+                </c:pt>
+                <c:pt idx="3">
+                  <c:v>Category 4</c:v>
+                </c:pt>
+              </c:strCache>
+            </c:strRef>
+          </c:cat>
+          <c:val>
+            <c:numRef>
+              <c:f>Sheet1!$B$2:$B$5</c:f>
+              <c:numCache>
+                <c:formatCode>General</c:formatCode>
+                <c:ptCount val="4"/>
+                <c:pt idx="0">
+                  <c:v>4.3</c:v>
+                </c:pt>
+                <c:pt idx="1">
+                  <c:v>2.5</c:v>
+                </c:pt>
+                <c:pt idx="2">
+                  <c:v>3.5</c:v>
+                </c:pt>
+                <c:pt idx="3">
+                  <c:v>4.5</c:v>
+                </c:pt>
+              </c:numCache>
+            </c:numRef>
+          </c:val>
+          <c:extLst>
+            <c:ext xmlns:c16="http://schemas.microsoft.com/office/drawing/2014/chart" uri="{C3380CC4-5D6E-409C-BE32-E72D297353CC}">
+              <c16:uniqueId val="{00000000-1B63-41F1-8E15-7624B45EAD9D}"/>
+            </c:ext>
+          </c:extLst>
+        </c:ser>
+        <c:ser>
+          <c:idx val="1"/>
+          <c:order val="1"/>
+          <c:tx>
+            <c:strRef>
+              <c:f>Sheet1!$C$1</c:f>
+              <c:strCache>
+                <c:ptCount val="1"/>
+                <c:pt idx="0">
+                  <c:v>Series 2</c:v>
+                </c:pt>
+              </c:strCache>
+            </c:strRef>
+          </c:tx>
+          <c:spPr>
+            <a:solidFill>
+              <a:schemeClr val="accent2"/>
+            </a:solidFill>
+            <a:ln>
+              <a:noFill/>
+            </a:ln>
+            <a:effectLst/>
+          </c:spPr>
+          <c:invertIfNegative val="0"/>
+          <c:cat>
+            <c:strRef>
+              <c:f>Sheet1!$A$2:$A$5</c:f>
+              <c:strCache>
+                <c:ptCount val="4"/>
+                <c:pt idx="0">
+                  <c:v>Category 1</c:v>
+                </c:pt>
+                <c:pt idx="1">
+                  <c:v>Category 2</c:v>
+                </c:pt>
+                <c:pt idx="2">
+                  <c:v>Category 3</c:v>
+                </c:pt>
+                <c:pt idx="3">
+                  <c:v>Category 4</c:v>
+                </c:pt>
+              </c:strCache>
+            </c:strRef>
+          </c:cat>
+          <c:val>
+            <c:numRef>
+              <c:f>Sheet1!$C$2:$C$5</c:f>
+              <c:numCache>
+                <c:formatCode>General</c:formatCode>
+                <c:ptCount val="4"/>
+                <c:pt idx="0">
+                  <c:v>2.4</c:v>
+                </c:pt>
+                <c:pt idx="1">
+                  <c:v>4.4000000000000004</c:v>
+                </c:pt>
+                <c:pt idx="2">
+                  <c:v>1.8</c:v>
+                </c:pt>
+                <c:pt idx="3">
+                  <c:v>2.8</c:v>
+                </c:pt>
+              </c:numCache>
+            </c:numRef>
+          </c:val>
+          <c:extLst>
+            <c:ext xmlns:c16="http://schemas.microsoft.com/office/drawing/2014/chart" uri="{C3380CC4-5D6E-409C-BE32-E72D297353CC}">
+              <c16:uniqueId val="{00000001-1B63-41F1-8E15-7624B45EAD9D}"/>
+            </c:ext>
+          </c:extLst>
+        </c:ser>
+        <c:ser>
+          <c:idx val="2"/>
+          <c:order val="2"/>
+          <c:tx>
+            <c:strRef>
+              <c:f>Sheet1!$D$1</c:f>
+              <c:strCache>
+                <c:ptCount val="1"/>
+                <c:pt idx="0">
+                  <c:v>Series 3</c:v>
+                </c:pt>
+              </c:strCache>
+            </c:strRef>
+          </c:tx>
+          <c:spPr>
+            <a:solidFill>
+              <a:schemeClr val="accent3"/>
+            </a:solidFill>
+            <a:ln>
+              <a:noFill/>
+            </a:ln>
+            <a:effectLst/>
+          </c:spPr>
+          <c:invertIfNegative val="0"/>
+          <c:cat>
+            <c:strRef>
+              <c:f>Sheet1!$A$2:$A$5</c:f>
+              <c:strCache>
+                <c:ptCount val="4"/>
+                <c:pt idx="0">
+                  <c:v>Category 1</c:v>
+                </c:pt>
+                <c:pt idx="1">
+                  <c:v>Category 2</c:v>
+                </c:pt>
+                <c:pt idx="2">
+                  <c:v>Category 3</c:v>
+                </c:pt>
+                <c:pt idx="3">
+                  <c:v>Category 4</c:v>
+                </c:pt>
+              </c:strCache>
+            </c:strRef>
+          </c:cat>
+          <c:val>
+            <c:numRef>
+              <c:f>Sheet1!$D$2:$D$5</c:f>
+              <c:numCache>
+                <c:formatCode>General</c:formatCode>
+                <c:ptCount val="4"/>
+                <c:pt idx="0">
+                  <c:v>2</c:v>
+                </c:pt>
+                <c:pt idx="1">
+                  <c:v>2</c:v>
+                </c:pt>
+                <c:pt idx="2">
+                  <c:v>3</c:v>
+                </c:pt>
+                <c:pt idx="3">
+                  <c:v>5</c:v>
+                </c:pt>
+              </c:numCache>
+            </c:numRef>
+          </c:val>
+          <c:extLst>
+            <c:ext xmlns:c16="http://schemas.microsoft.com/office/drawing/2014/chart" uri="{C3380CC4-5D6E-409C-BE32-E72D297353CC}">
+              <c16:uniqueId val="{00000002-1B63-41F1-8E15-7624B45EAD9D}"/>
+            </c:ext>
+          </c:extLst>
+        </c:ser>
+        <c:dLbls>
+          <c:showLegendKey val="0"/>
+          <c:showVal val="0"/>
+          <c:showCatName val="0"/>
+          <c:showSerName val="0"/>
+          <c:showPercent val="0"/>
+          <c:showBubbleSize val="0"/>
+        </c:dLbls>
+        <c:gapWidth val="219"/>
+        <c:overlap val="-27"/>
+        <c:axId val="508166120"/>
+        <c:axId val="508166448"/>
+      </c:barChart>
+      <c:catAx>
+        <c:axId val="508166120"/>
+        <c:scaling>
+          <c:orientation val="minMax"/>
+        </c:scaling>
+        <c:delete val="0"/>
+        <c:axPos val="b"/>
+        <c:numFmt formatCode="General" sourceLinked="1"/>
+        <c:majorTickMark val="none"/>
+        <c:minorTickMark val="none"/>
+        <c:tickLblPos val="nextTo"/>
+        <c:spPr>
+          <a:noFill/>
+          <a:ln w="9525" cap="flat" cmpd="sng" algn="ctr">
+            <a:solidFill>
+              <a:schemeClr val="tx1">
+                <a:lumMod val="15000"/>
+                <a:lumOff val="85000"/>
+              </a:schemeClr>
+            </a:solidFill>
+            <a:round/>
+          </a:ln>
+          <a:effectLst/>
+        </c:spPr>
+        <c:txPr>
+          <a:bodyPr rot="-60000000" spcFirstLastPara="1" vertOverflow="ellipsis" vert="horz" wrap="square" anchor="ctr" anchorCtr="1"/>
+          <a:lstStyle/>
+          <a:p>
+            <a:pPr>
+              <a:defRPr sz="1197" b="0" i="0" u="none" strike="noStrike" kern="1200" baseline="0">
+                <a:solidFill>
+                  <a:schemeClr val="tx1">
+                    <a:lumMod val="65000"/>
+                    <a:lumOff val="35000"/>
+                  </a:schemeClr>
+                </a:solidFill>
+                <a:latin typeface="+mn-lt"/>
+                <a:ea typeface="+mn-ea"/>
+                <a:cs typeface="+mn-cs"/>
+              </a:defRPr>
+            </a:pPr>
+            <a:endParaRPr lang="en-US"/>
+          </a:p>
+        </c:txPr>
+        <c:crossAx val="508166448"/>
+        <c:crosses val="autoZero"/>
+        <c:auto val="1"/>
+        <c:lblAlgn val="ctr"/>
+        <c:lblOffset val="100"/>
+        <c:noMultiLvlLbl val="0"/>
+      </c:catAx>
+      <c:valAx>
+        <c:axId val="508166448"/>
+        <c:scaling>
+          <c:orientation val="minMax"/>
+        </c:scaling>
+        <c:delete val="0"/>
+        <c:axPos val="l"/>
+        <c:majorGridlines>
+          <c:spPr>
+            <a:ln w="9525" cap="flat" cmpd="sng" algn="ctr">
+              <a:solidFill>
+                <a:schemeClr val="tx1">
+                  <a:lumMod val="15000"/>
+                  <a:lumOff val="85000"/>
+                </a:schemeClr>
+              </a:solidFill>
+              <a:round/>
+            </a:ln>
+            <a:effectLst/>
+          </c:spPr>
+        </c:majorGridlines>
+        <c:numFmt formatCode="General" sourceLinked="1"/>
+        <c:majorTickMark val="none"/>
+        <c:minorTickMark val="none"/>
+        <c:tickLblPos val="nextTo"/>
+        <c:spPr>
+          <a:noFill/>
+          <a:ln>
+            <a:noFill/>
+          </a:ln>
+          <a:effectLst/>
+        </c:spPr>
+        <c:txPr>
+          <a:bodyPr rot="-60000000" spcFirstLastPara="1" vertOverflow="ellipsis" vert="horz" wrap="square" anchor="ctr" anchorCtr="1"/>
+          <a:lstStyle/>
+          <a:p>
+            <a:pPr>
+              <a:defRPr sz="1197" b="0" i="0" u="none" strike="noStrike" kern="1200" baseline="0">
+                <a:solidFill>
+                  <a:schemeClr val="tx1">
+                    <a:lumMod val="65000"/>
+                    <a:lumOff val="35000"/>
+                  </a:schemeClr>
+                </a:solidFill>
+                <a:latin typeface="+mn-lt"/>
+                <a:ea typeface="+mn-ea"/>
+                <a:cs typeface="+mn-cs"/>
+              </a:defRPr>
+            </a:pPr>
+            <a:endParaRPr lang="en-US"/>
+          </a:p>
+        </c:txPr>
+        <c:crossAx val="508166120"/>
+        <c:crosses val="autoZero"/>
+        <c:crossBetween val="between"/>
+      </c:valAx>
+      <c:spPr>
+        <a:noFill/>
+        <a:ln>
+          <a:noFill/>
+        </a:ln>
+        <a:effectLst/>
+      </c:spPr>
+    </c:plotArea>
+    <c:legend>
+      <c:legendPos val="b"/>
+      <c:overlay val="0"/>
+      <c:spPr>
+        <a:noFill/>
+        <a:ln>
+          <a:noFill/>
+        </a:ln>
+        <a:effectLst/>
+      </c:spPr>
+      <c:txPr>
+        <a:bodyPr rot="0" spcFirstLastPara="1" vertOverflow="ellipsis" vert="horz" wrap="square" anchor="ctr" anchorCtr="1"/>
+        <a:lstStyle/>
+        <a:p>
+          <a:pPr>
+            <a:defRPr sz="1197" b="0" i="0" u="none" strike="noStrike" kern="1200" baseline="0">
+              <a:solidFill>
+                <a:schemeClr val="tx1">
+                  <a:lumMod val="65000"/>
+                  <a:lumOff val="35000"/>
+                </a:schemeClr>
+              </a:solidFill>
+              <a:latin typeface="+mn-lt"/>
+              <a:ea typeface="+mn-ea"/>
+              <a:cs typeface="+mn-cs"/>
+            </a:defRPr>
+          </a:pPr>
+          <a:endParaRPr lang="en-US"/>
+        </a:p>
+      </c:txPr>
+    </c:legend>
+    <c:plotVisOnly val="1"/>
+    <c:dispBlanksAs val="gap"/>
+    <c:showDLblsOverMax val="0"/>
+  </c:chart>
+  <c:spPr>
+    <a:noFill/>
+    <a:ln>
+      <a:noFill/>
+    </a:ln>
+    <a:effectLst/>
+  </c:spPr>
+  <c:txPr>
+    <a:bodyPr/>
+    <a:lstStyle/>
+    <a:p>
+      <a:pPr>
+        <a:defRPr/>
+      </a:pPr>
+      <a:endParaRPr lang="en-US"/>
+    </a:p>
+  </c:txPr>
+  <c:externalData r:id="rId3">
+    <c:autoUpdate val="0"/>
+  </c:externalData>
+</c:chartSpace>
+</file>
+
+<file path=ppt/charts/colors1.xml><?xml version="1.0" encoding="utf-8"?>
+<cs:colorStyle xmlns:cs="http://schemas.microsoft.com/office/drawing/2012/chartStyle" xmlns:a="http://schemas.openxmlformats.org/drawingml/2006/main" meth="cycle" id="10">
+  <a:schemeClr val="accent1"/>
+  <a:schemeClr val="accent2"/>
+  <a:schemeClr val="accent3"/>
+  <a:schemeClr val="accent4"/>
+  <a:schemeClr val="accent5"/>
+  <a:schemeClr val="accent6"/>
+  <cs:variation/>
+  <cs:variation>
+    <a:lumMod val="60000"/>
+  </cs:variation>
+  <cs:variation>
+    <a:lumMod val="80000"/>
+    <a:lumOff val="20000"/>
+  </cs:variation>
+  <cs:variation>
+    <a:lumMod val="80000"/>
+  </cs:variation>
+  <cs:variation>
+    <a:lumMod val="60000"/>
+    <a:lumOff val="40000"/>
+  </cs:variation>
+  <cs:variation>
+    <a:lumMod val="50000"/>
+  </cs:variation>
+  <cs:variation>
+    <a:lumMod val="70000"/>
+    <a:lumOff val="30000"/>
+  </cs:variation>
+  <cs:variation>
+    <a:lumMod val="70000"/>
+  </cs:variation>
+  <cs:variation>
+    <a:lumMod val="50000"/>
+    <a:lumOff val="50000"/>
+  </cs:variation>
+</cs:colorStyle>
+</file>
+
+<file path=ppt/charts/style1.xml><?xml version="1.0" encoding="utf-8"?>
+<cs:chartStyle xmlns:cs="http://schemas.microsoft.com/office/drawing/2012/chartStyle" xmlns:a="http://schemas.openxmlformats.org/drawingml/2006/main" id="201">
+  <cs:axisTitle>
+    <cs:lnRef idx="0"/>
+    <cs:fillRef idx="0"/>
+    <cs:effectRef idx="0"/>
+    <cs:fontRef idx="minor">
+      <a:schemeClr val="tx1">
+        <a:lumMod val="65000"/>
+        <a:lumOff val="35000"/>
+      </a:schemeClr>
+    </cs:fontRef>
+    <cs:defRPr sz="1330" kern="1200"/>
+  </cs:axisTitle>
+  <cs:categoryAxis>
+    <cs:lnRef idx="0"/>
+    <cs:fillRef idx="0"/>
+    <cs:effectRef idx="0"/>
+    <cs:fontRef idx="minor">
+      <a:schemeClr val="tx1">
+        <a:lumMod val="65000"/>
+        <a:lumOff val="35000"/>
+      </a:schemeClr>
+    </cs:fontRef>
+    <cs:spPr>
+      <a:ln w="9525" cap="flat" cmpd="sng" algn="ctr">
+        <a:solidFill>
+          <a:schemeClr val="tx1">
+            <a:lumMod val="15000"/>
+            <a:lumOff val="85000"/>
+          </a:schemeClr>
+        </a:solidFill>
+        <a:round/>
+      </a:ln>
+    </cs:spPr>
+    <cs:defRPr sz="1197" kern="1200"/>
+  </cs:categoryAxis>
+  <cs:chartArea mods="allowNoFillOverride allowNoLineOverride">
+    <cs:lnRef idx="0"/>
+    <cs:fillRef idx="0"/>
+    <cs:effectRef idx="0"/>
+    <cs:fontRef idx="minor">
+      <a:schemeClr val="tx1"/>
+    </cs:fontRef>
+    <cs:spPr>
+      <a:solidFill>
+        <a:schemeClr val="bg1"/>
+      </a:solidFill>
+      <a:ln w="9525" cap="flat" cmpd="sng" algn="ctr">
+        <a:solidFill>
+          <a:schemeClr val="tx1">
+            <a:lumMod val="15000"/>
+            <a:lumOff val="85000"/>
+          </a:schemeClr>
+        </a:solidFill>
+        <a:round/>
+      </a:ln>
+    </cs:spPr>
+    <cs:defRPr sz="1330" kern="1200"/>
+  </cs:chartArea>
+  <cs:dataLabel>
+    <cs:lnRef idx="0"/>
+    <cs:fillRef idx="0"/>
+    <cs:effectRef idx="0"/>
+    <cs:fontRef idx="minor">
+      <a:schemeClr val="tx1">
+        <a:lumMod val="75000"/>
+        <a:lumOff val="25000"/>
+      </a:schemeClr>
+    </cs:fontRef>
+    <cs:defRPr sz="1197" kern="1200"/>
+  </cs:dataLabel>
+  <cs:dataLabelCallout>
+    <cs:lnRef idx="0"/>
+    <cs:fillRef idx="0"/>
+    <cs:effectRef idx="0"/>
+    <cs:fontRef idx="minor">
+      <a:schemeClr val="dk1">
+        <a:lumMod val="65000"/>
+        <a:lumOff val="35000"/>
+      </a:schemeClr>
+    </cs:fontRef>
+    <cs:spPr>
+      <a:solidFill>
+        <a:schemeClr val="lt1"/>
+      </a:solidFill>
+      <a:ln>
+        <a:solidFill>
+          <a:schemeClr val="dk1">
+            <a:lumMod val="25000"/>
+            <a:lumOff val="75000"/>
+          </a:schemeClr>
+        </a:solidFill>
+      </a:ln>
+    </cs:spPr>
+    <cs:defRPr sz="1197" kern="1200"/>
+    <cs:bodyPr rot="0" spcFirstLastPara="1" vertOverflow="clip" horzOverflow="clip" vert="horz" wrap="square" lIns="36576" tIns="18288" rIns="36576" bIns="18288" anchor="ctr" anchorCtr="1">
+      <a:spAutoFit/>
+    </cs:bodyPr>
+  </cs:dataLabelCallout>
+  <cs:dataPoint>
+    <cs:lnRef idx="0"/>
+    <cs:fillRef idx="1">
+      <cs:styleClr val="auto"/>
+    </cs:fillRef>
+    <cs:effectRef idx="0"/>
+    <cs:fontRef idx="minor">
+      <a:schemeClr val="tx1"/>
+    </cs:fontRef>
+  </cs:dataPoint>
+  <cs:dataPoint3D>
+    <cs:lnRef idx="0"/>
+    <cs:fillRef idx="1">
+      <cs:styleClr val="auto"/>
+    </cs:fillRef>
+    <cs:effectRef idx="0"/>
+    <cs:fontRef idx="minor">
+      <a:schemeClr val="tx1"/>
+    </cs:fontRef>
+  </cs:dataPoint3D>
+  <cs:dataPointLine>
+    <cs:lnRef idx="0">
+      <cs:styleClr val="auto"/>
+    </cs:lnRef>
+    <cs:fillRef idx="1"/>
+    <cs:effectRef idx="0"/>
+    <cs:fontRef idx="minor">
+      <a:schemeClr val="tx1"/>
+    </cs:fontRef>
+    <cs:spPr>
+      <a:ln w="28575" cap="rnd">
+        <a:solidFill>
+          <a:schemeClr val="phClr"/>
+        </a:solidFill>
+        <a:round/>
+      </a:ln>
+    </cs:spPr>
+  </cs:dataPointLine>
+  <cs:dataPointMarker>
+    <cs:lnRef idx="0">
+      <cs:styleClr val="auto"/>
+    </cs:lnRef>
+    <cs:fillRef idx="1">
+      <cs:styleClr val="auto"/>
+    </cs:fillRef>
+    <cs:effectRef idx="0"/>
+    <cs:fontRef idx="minor">
+      <a:schemeClr val="tx1"/>
+    </cs:fontRef>
+    <cs:spPr>
+      <a:ln w="9525">
+        <a:solidFill>
+          <a:schemeClr val="phClr"/>
+        </a:solidFill>
+      </a:ln>
+    </cs:spPr>
+  </cs:dataPointMarker>
+  <cs:dataPointMarkerLayout symbol="circle" size="5"/>
+  <cs:dataPointWireframe>
+    <cs:lnRef idx="0">
+      <cs:styleClr val="auto"/>
+    </cs:lnRef>
+    <cs:fillRef idx="1"/>
+    <cs:effectRef idx="0"/>
+    <cs:fontRef idx="minor">
+      <a:schemeClr val="tx1"/>
+    </cs:fontRef>
+    <cs:spPr>
+      <a:ln w="9525" cap="rnd">
+        <a:solidFill>
+          <a:schemeClr val="phClr"/>
+        </a:solidFill>
+        <a:round/>
+      </a:ln>
+    </cs:spPr>
+  </cs:dataPointWireframe>
+  <cs:dataTable>
+    <cs:lnRef idx="0"/>
+    <cs:fillRef idx="0"/>
+    <cs:effectRef idx="0"/>
+    <cs:fontRef idx="minor">
+      <a:schemeClr val="tx1">
+        <a:lumMod val="65000"/>
+        <a:lumOff val="35000"/>
+      </a:schemeClr>
+    </cs:fontRef>
+    <cs:spPr>
+      <a:noFill/>
+      <a:ln w="9525" cap="flat" cmpd="sng" algn="ctr">
+        <a:solidFill>
+          <a:schemeClr val="tx1">
+            <a:lumMod val="15000"/>
+            <a:lumOff val="85000"/>
+          </a:schemeClr>
+        </a:solidFill>
+        <a:round/>
+      </a:ln>
+    </cs:spPr>
+    <cs:defRPr sz="1197" kern="1200"/>
+  </cs:dataTable>
+  <cs:downBar>
+    <cs:lnRef idx="0"/>
+    <cs:fillRef idx="0"/>
+    <cs:effectRef idx="0"/>
+    <cs:fontRef idx="minor">
+      <a:schemeClr val="dk1"/>
+    </cs:fontRef>
+    <cs:spPr>
+      <a:solidFill>
+        <a:schemeClr val="dk1">
+          <a:lumMod val="65000"/>
+          <a:lumOff val="35000"/>
+        </a:schemeClr>
+      </a:solidFill>
+      <a:ln w="9525">
+        <a:solidFill>
+          <a:schemeClr val="tx1">
+            <a:lumMod val="65000"/>
+            <a:lumOff val="35000"/>
+          </a:schemeClr>
+        </a:solidFill>
+      </a:ln>
+    </cs:spPr>
+  </cs:downBar>
+  <cs:dropLine>
+    <cs:lnRef idx="0"/>
+    <cs:fillRef idx="0"/>
+    <cs:effectRef idx="0"/>
+    <cs:fontRef idx="minor">
+      <a:schemeClr val="tx1"/>
+    </cs:fontRef>
+    <cs:spPr>
+      <a:ln w="9525" cap="flat" cmpd="sng" algn="ctr">
+        <a:solidFill>
+          <a:schemeClr val="tx1">
+            <a:lumMod val="35000"/>
+            <a:lumOff val="65000"/>
+          </a:schemeClr>
+        </a:solidFill>
+        <a:round/>
+      </a:ln>
+    </cs:spPr>
+  </cs:dropLine>
+  <cs:errorBar>
+    <cs:lnRef idx="0"/>
+    <cs:fillRef idx="0"/>
+    <cs:effectRef idx="0"/>
+    <cs:fontRef idx="minor">
+      <a:schemeClr val="tx1"/>
+    </cs:fontRef>
+    <cs:spPr>
+      <a:ln w="9525" cap="flat" cmpd="sng" algn="ctr">
+        <a:solidFill>
+          <a:schemeClr val="tx1">
+            <a:lumMod val="65000"/>
+            <a:lumOff val="35000"/>
+          </a:schemeClr>
+        </a:solidFill>
+        <a:round/>
+      </a:ln>
+    </cs:spPr>
+  </cs:errorBar>
+  <cs:floor>
+    <cs:lnRef idx="0"/>
+    <cs:fillRef idx="0"/>
+    <cs:effectRef idx="0"/>
+    <cs:fontRef idx="minor">
+      <a:schemeClr val="tx1"/>
+    </cs:fontRef>
+    <cs:spPr>
+      <a:noFill/>
+      <a:ln>
+        <a:noFill/>
+      </a:ln>
+    </cs:spPr>
+  </cs:floor>
+  <cs:gridlineMajor>
+    <cs:lnRef idx="0"/>
+    <cs:fillRef idx="0"/>
+    <cs:effectRef idx="0"/>
+    <cs:fontRef idx="minor">
+      <a:schemeClr val="tx1"/>
+    </cs:fontRef>
+    <cs:spPr>
+      <a:ln w="9525" cap="flat" cmpd="sng" algn="ctr">
+        <a:solidFill>
+          <a:schemeClr val="tx1">
+            <a:lumMod val="15000"/>
+            <a:lumOff val="85000"/>
+          </a:schemeClr>
+        </a:solidFill>
+        <a:round/>
+      </a:ln>
+    </cs:spPr>
+  </cs:gridlineMajor>
+  <cs:gridlineMinor>
+    <cs:lnRef idx="0"/>
+    <cs:fillRef idx="0"/>
+    <cs:effectRef idx="0"/>
+    <cs:fontRef idx="minor">
+      <a:schemeClr val="tx1"/>
+    </cs:fontRef>
+    <cs:spPr>
+      <a:ln w="9525" cap="flat" cmpd="sng" algn="ctr">
+        <a:solidFill>
+          <a:schemeClr val="tx1">
+            <a:lumMod val="5000"/>
+            <a:lumOff val="95000"/>
+          </a:schemeClr>
+        </a:solidFill>
+        <a:round/>
+      </a:ln>
+    </cs:spPr>
+  </cs:gridlineMinor>
+  <cs:hiLoLine>
+    <cs:lnRef idx="0"/>
+    <cs:fillRef idx="0"/>
+    <cs:effectRef idx="0"/>
+    <cs:fontRef idx="minor">
+      <a:schemeClr val="tx1"/>
+    </cs:fontRef>
+    <cs:spPr>
+      <a:ln w="9525" cap="flat" cmpd="sng" algn="ctr">
+        <a:solidFill>
+          <a:schemeClr val="tx1">
+            <a:lumMod val="75000"/>
+            <a:lumOff val="25000"/>
+          </a:schemeClr>
+        </a:solidFill>
+        <a:round/>
+      </a:ln>
+    </cs:spPr>
+  </cs:hiLoLine>
+  <cs:leaderLine>
+    <cs:lnRef idx="0"/>
+    <cs:fillRef idx="0"/>
+    <cs:effectRef idx="0"/>
+    <cs:fontRef idx="minor">
+      <a:schemeClr val="tx1"/>
+    </cs:fontRef>
+    <cs:spPr>
+      <a:ln w="9525" cap="flat" cmpd="sng" algn="ctr">
+        <a:solidFill>
+          <a:schemeClr val="tx1">
+            <a:lumMod val="35000"/>
+            <a:lumOff val="65000"/>
+          </a:schemeClr>
+        </a:solidFill>
+        <a:round/>
+      </a:ln>
+    </cs:spPr>
+  </cs:leaderLine>
+  <cs:legend>
+    <cs:lnRef idx="0"/>
+    <cs:fillRef idx="0"/>
+    <cs:effectRef idx="0"/>
+    <cs:fontRef idx="minor">
+      <a:schemeClr val="tx1">
+        <a:lumMod val="65000"/>
+        <a:lumOff val="35000"/>
+      </a:schemeClr>
+    </cs:fontRef>
+    <cs:defRPr sz="1197" kern="1200"/>
+  </cs:legend>
+  <cs:plotArea mods="allowNoFillOverride allowNoLineOverride">
+    <cs:lnRef idx="0"/>
+    <cs:fillRef idx="0"/>
+    <cs:effectRef idx="0"/>
+    <cs:fontRef idx="minor">
+      <a:schemeClr val="tx1"/>
+    </cs:fontRef>
+  </cs:plotArea>
+  <cs:plotArea3D mods="allowNoFillOverride allowNoLineOverride">
+    <cs:lnRef idx="0"/>
+    <cs:fillRef idx="0"/>
+    <cs:effectRef idx="0"/>
+    <cs:fontRef idx="minor">
+      <a:schemeClr val="tx1"/>
+    </cs:fontRef>
+  </cs:plotArea3D>
+  <cs:seriesAxis>
+    <cs:lnRef idx="0"/>
+    <cs:fillRef idx="0"/>
+    <cs:effectRef idx="0"/>
+    <cs:fontRef idx="minor">
+      <a:schemeClr val="tx1">
+        <a:lumMod val="65000"/>
+        <a:lumOff val="35000"/>
+      </a:schemeClr>
+    </cs:fontRef>
+    <cs:defRPr sz="1197" kern="1200"/>
+  </cs:seriesAxis>
+  <cs:seriesLine>
+    <cs:lnRef idx="0"/>
+    <cs:fillRef idx="0"/>
+    <cs:effectRef idx="0"/>
+    <cs:fontRef idx="minor">
+      <a:schemeClr val="tx1"/>
+    </cs:fontRef>
+    <cs:spPr>
+      <a:ln w="9525" cap="flat" cmpd="sng" algn="ctr">
+        <a:solidFill>
+          <a:schemeClr val="tx1">
+            <a:lumMod val="35000"/>
+            <a:lumOff val="65000"/>
+          </a:schemeClr>
+        </a:solidFill>
+        <a:round/>
+      </a:ln>
+    </cs:spPr>
+  </cs:seriesLine>
+  <cs:title>
+    <cs:lnRef idx="0"/>
+    <cs:fillRef idx="0"/>
+    <cs:effectRef idx="0"/>
+    <cs:fontRef idx="minor">
+      <a:schemeClr val="tx1">
+        <a:lumMod val="65000"/>
+        <a:lumOff val="35000"/>
+      </a:schemeClr>
+    </cs:fontRef>
+    <cs:defRPr sz="1862" b="0" kern="1200" spc="0" baseline="0"/>
+  </cs:title>
+  <cs:trendline>
+    <cs:lnRef idx="0">
+      <cs:styleClr val="auto"/>
+    </cs:lnRef>
+    <cs:fillRef idx="0"/>
+    <cs:effectRef idx="0"/>
+    <cs:fontRef idx="minor">
+      <a:schemeClr val="tx1"/>
+    </cs:fontRef>
+    <cs:spPr>
+      <a:ln w="19050" cap="rnd">
+        <a:solidFill>
+          <a:schemeClr val="phClr"/>
+        </a:solidFill>
+        <a:prstDash val="sysDot"/>
+      </a:ln>
+    </cs:spPr>
+  </cs:trendline>
+  <cs:trendlineLabel>
+    <cs:lnRef idx="0"/>
+    <cs:fillRef idx="0"/>
+    <cs:effectRef idx="0"/>
+    <cs:fontRef idx="minor">
+      <a:schemeClr val="tx1">
+        <a:lumMod val="65000"/>
+        <a:lumOff val="35000"/>
+      </a:schemeClr>
+    </cs:fontRef>
+    <cs:defRPr sz="1197" kern="1200"/>
+  </cs:trendlineLabel>
+  <cs:upBar>
+    <cs:lnRef idx="0"/>
+    <cs:fillRef idx="0"/>
+    <cs:effectRef idx="0"/>
+    <cs:fontRef idx="minor">
+      <a:schemeClr val="dk1"/>
+    </cs:fontRef>
+    <cs:spPr>
+      <a:solidFill>
+        <a:schemeClr val="lt1"/>
+      </a:solidFill>
+      <a:ln w="9525">
+        <a:solidFill>
+          <a:schemeClr val="tx1">
+            <a:lumMod val="15000"/>
+            <a:lumOff val="85000"/>
+          </a:schemeClr>
+        </a:solidFill>
+      </a:ln>
+    </cs:spPr>
+  </cs:upBar>
+  <cs:valueAxis>
+    <cs:lnRef idx="0"/>
+    <cs:fillRef idx="0"/>
+    <cs:effectRef idx="0"/>
+    <cs:fontRef idx="minor">
+      <a:schemeClr val="tx1">
+        <a:lumMod val="65000"/>
+        <a:lumOff val="35000"/>
+      </a:schemeClr>
+    </cs:fontRef>
+    <cs:defRPr sz="1197" kern="1200"/>
+  </cs:valueAxis>
+  <cs:wall>
+    <cs:lnRef idx="0"/>
+    <cs:fillRef idx="0"/>
+    <cs:effectRef idx="0"/>
+    <cs:fontRef idx="minor">
+      <a:schemeClr val="tx1"/>
+    </cs:fontRef>
+    <cs:spPr>
+      <a:noFill/>
+      <a:ln>
+        <a:noFill/>
+      </a:ln>
+    </cs:spPr>
+  </cs:wall>
+</cs:chartStyle>
+</file>
+
+<file path=ppt/diagrams/colors1.xml><?xml version="1.0" encoding="utf-8"?>
+<dgm:colorsDef xmlns:dgm="http://schemas.openxmlformats.org/drawingml/2006/diagram" xmlns:a="http://schemas.openxmlformats.org/drawingml/2006/main" uniqueId="urn:microsoft.com/office/officeart/2005/8/colors/accent1_2">
+  <dgm:title val=""/>
+  <dgm:desc val=""/>
+  <dgm:catLst>
+    <dgm:cat type="accent1" pri="11200"/>
+  </dgm:catLst>
+  <dgm:styleLbl name="node0">
+    <dgm:fillClrLst meth="repeat">
+      <a:schemeClr val="accent1"/>
+    </dgm:fillClrLst>
+    <dgm:linClrLst meth="repeat">
+      <a:schemeClr val="lt1"/>
+    </dgm:linClrLst>
+    <dgm:effectClrLst/>
+    <dgm:txLinClrLst/>
+    <dgm:txFillClrLst/>
+    <dgm:txEffectClrLst/>
+  </dgm:styleLbl>
+  <dgm:styleLbl name="alignNode1">
+    <dgm:fillClrLst meth="repeat">
+      <a:schemeClr val="accent1"/>
+    </dgm:fillClrLst>
+    <dgm:linClrLst meth="repeat">
+      <a:schemeClr val="accent1"/>
+    </dgm:linClrLst>
+    <dgm:effectClrLst/>
+    <dgm:txLinClrLst/>
+    <dgm:txFillClrLst/>
+    <dgm:txEffectClrLst/>
+  </dgm:styleLbl>
+  <dgm:styleLbl name="node1">
+    <dgm:fillClrLst meth="repeat">
+      <a:schemeClr val="accent1"/>
+    </dgm:fillClrLst>
+    <dgm:linClrLst meth="repeat">
+      <a:schemeClr val="lt1"/>
+    </dgm:linClrLst>
+    <dgm:effectClrLst/>
+    <dgm:txLinClrLst/>
+    <dgm:txFillClrLst/>
+    <dgm:txEffectClrLst/>
+  </dgm:styleLbl>
+  <dgm:styleLbl name="lnNode1">
+    <dgm:fillClrLst meth="repeat">
+      <a:schemeClr val="accent1"/>
+    </dgm:fillClrLst>
+    <dgm:linClrLst meth="repeat">
+      <a:schemeClr val="lt1"/>
+    </dgm:linClrLst>
+    <dgm:effectClrLst/>
+    <dgm:txLinClrLst/>
+    <dgm:txFillClrLst/>
+    <dgm:txEffectClrLst/>
+  </dgm:styleLbl>
+  <dgm:styleLbl name="vennNode1">
+    <dgm:fillClrLst meth="repeat">
+      <a:schemeClr val="accent1">
+        <a:alpha val="50000"/>
+      </a:schemeClr>
+    </dgm:fillClrLst>
+    <dgm:linClrLst meth="repeat">
+      <a:schemeClr val="lt1"/>
+    </dgm:linClrLst>
+    <dgm:effectClrLst/>
+    <dgm:txLinClrLst/>
+    <dgm:txFillClrLst/>
+    <dgm:txEffectClrLst/>
+  </dgm:styleLbl>
+  <dgm:styleLbl name="node2">
+    <dgm:fillClrLst meth="repeat">
+      <a:schemeClr val="accent1"/>
+    </dgm:fillClrLst>
+    <dgm:linClrLst meth="repeat">
+      <a:schemeClr val="lt1"/>
+    </dgm:linClrLst>
+    <dgm:effectClrLst/>
+    <dgm:txLinClrLst/>
+    <dgm:txFillClrLst/>
+    <dgm:txEffectClrLst/>
+  </dgm:styleLbl>
+  <dgm:styleLbl name="node3">
+    <dgm:fillClrLst meth="repeat">
+      <a:schemeClr val="accent1"/>
+    </dgm:fillClrLst>
+    <dgm:linClrLst meth="repeat">
+      <a:schemeClr val="lt1"/>
+    </dgm:linClrLst>
+    <dgm:effectClrLst/>
+    <dgm:txLinClrLst/>
+    <dgm:txFillClrLst/>
+    <dgm:txEffectClrLst/>
+  </dgm:styleLbl>
+  <dgm:styleLbl name="node4">
+    <dgm:fillClrLst meth="repeat">
+      <a:schemeClr val="accent1"/>
+    </dgm:fillClrLst>
+    <dgm:linClrLst meth="repeat">
+      <a:schemeClr val="lt1"/>
+    </dgm:linClrLst>
+    <dgm:effectClrLst/>
+    <dgm:txLinClrLst/>
+    <dgm:txFillClrLst/>
+    <dgm:txEffectClrLst/>
+  </dgm:styleLbl>
+  <dgm:styleLbl name="fgImgPlace1">
+    <dgm:fillClrLst meth="repeat">
+      <a:schemeClr val="accent1">
+        <a:tint val="50000"/>
+      </a:schemeClr>
+    </dgm:fillClrLst>
+    <dgm:linClrLst meth="repeat">
+      <a:schemeClr val="lt1"/>
+    </dgm:linClrLst>
+    <dgm:effectClrLst/>
+    <dgm:txLinClrLst/>
+    <dgm:txFillClrLst meth="repeat">
+      <a:schemeClr val="lt1"/>
+    </dgm:txFillClrLst>
+    <dgm:txEffectClrLst/>
+  </dgm:styleLbl>
+  <dgm:styleLbl name="alignImgPlace1">
+    <dgm:fillClrLst meth="repeat">
+      <a:schemeClr val="accent1">
+        <a:tint val="50000"/>
+      </a:schemeClr>
+    </dgm:fillClrLst>
+    <dgm:linClrLst meth="repeat">
+      <a:schemeClr val="lt1"/>
+    </dgm:linClrLst>
+    <dgm:effectClrLst/>
+    <dgm:txLinClrLst/>
+    <dgm:txFillClrLst meth="repeat">
+      <a:schemeClr val="lt1"/>
+    </dgm:txFillClrLst>
+    <dgm:txEffectClrLst/>
+  </dgm:styleLbl>
+  <dgm:styleLbl name="bgImgPlace1">
+    <dgm:fillClrLst meth="repeat">
+      <a:schemeClr val="accent1">
+        <a:tint val="50000"/>
+      </a:schemeClr>
+    </dgm:fillClrLst>
+    <dgm:linClrLst meth="repeat">
+      <a:schemeClr val="lt1"/>
+    </dgm:linClrLst>
+    <dgm:effectClrLst/>
+    <dgm:txLinClrLst/>
+    <dgm:txFillClrLst meth="repeat">
+      <a:schemeClr val="lt1"/>
+    </dgm:txFillClrLst>
+    <dgm:txEffectClrLst/>
+  </dgm:styleLbl>
+  <dgm:styleLbl name="sibTrans2D1">
+    <dgm:fillClrLst meth="repeat">
+      <a:schemeClr val="accent1">
+        <a:tint val="60000"/>
+      </a:schemeClr>
+    </dgm:fillClrLst>
+    <dgm:linClrLst meth="repeat">
+      <a:schemeClr val="accent1">
+        <a:tint val="60000"/>
+      </a:schemeClr>
+    </dgm:linClrLst>
+    <dgm:effectClrLst/>
+    <dgm:txLinClrLst/>
+    <dgm:txFillClrLst/>
+    <dgm:txEffectClrLst/>
+  </dgm:styleLbl>
+  <dgm:styleLbl name="fgSibTrans2D1">
+    <dgm:fillClrLst meth="repeat">
+      <a:schemeClr val="accent1">
+        <a:tint val="60000"/>
+      </a:schemeClr>
+    </dgm:fillClrLst>
+    <dgm:linClrLst meth="repeat">
+      <a:schemeClr val="accent1">
+        <a:tint val="60000"/>
+      </a:schemeClr>
+    </dgm:linClrLst>
+    <dgm:effectClrLst/>
+    <dgm:txLinClrLst/>
+    <dgm:txFillClrLst/>
+    <dgm:txEffectClrLst/>
+  </dgm:styleLbl>
+  <dgm:styleLbl name="bgSibTrans2D1">
+    <dgm:fillClrLst meth="repeat">
+      <a:schemeClr val="accent1">
+        <a:tint val="60000"/>
+      </a:schemeClr>
+    </dgm:fillClrLst>
+    <dgm:linClrLst meth="repeat">
+      <a:schemeClr val="accent1">
+        <a:tint val="60000"/>
+      </a:schemeClr>
+    </dgm:linClrLst>
+    <dgm:effectClrLst/>
+    <dgm:txLinClrLst/>
+    <dgm:txFillClrLst/>
+    <dgm:txEffectClrLst/>
+  </dgm:styleLbl>
+  <dgm:styleLbl name="sibTrans1D1">
+    <dgm:fillClrLst meth="repeat">
+      <a:schemeClr val="accent1"/>
+    </dgm:fillClrLst>
+    <dgm:linClrLst meth="repeat">
+      <a:schemeClr val="accent1"/>
+    </dgm:linClrLst>
+    <dgm:effectClrLst/>
+    <dgm:txLinClrLst/>
+    <dgm:txFillClrLst meth="repeat">
+      <a:schemeClr val="tx1"/>
+    </dgm:txFillClrLst>
+    <dgm:txEffectClrLst/>
+  </dgm:styleLbl>
+  <dgm:styleLbl name="callout">
+    <dgm:fillClrLst meth="repeat">
+      <a:schemeClr val="accent1"/>
+    </dgm:fillClrLst>
+    <dgm:linClrLst meth="repeat">
+      <a:schemeClr val="accent1">
+        <a:tint val="50000"/>
+      </a:schemeClr>
+    </dgm:linClrLst>
+    <dgm:effectClrLst/>
+    <dgm:txLinClrLst/>
+    <dgm:txFillClrLst meth="repeat">
+      <a:schemeClr val="tx1"/>
+    </dgm:txFillClrLst>
+    <dgm:txEffectClrLst/>
+  </dgm:styleLbl>
+  <dgm:styleLbl name="asst0">
+    <dgm:fillClrLst meth="repeat">
+      <a:schemeClr val="accent1"/>
+    </dgm:fillClrLst>
+    <dgm:linClrLst meth="repeat">
+      <a:schemeClr val="lt1"/>
+    </dgm:linClrLst>
+    <dgm:effectClrLst/>
+    <dgm:txLinClrLst/>
+    <dgm:txFillClrLst/>
+    <dgm:txEffectClrLst/>
+  </dgm:styleLbl>
+  <dgm:styleLbl name="asst1">
+    <dgm:fillClrLst meth="repeat">
+      <a:schemeClr val="accent1"/>
+    </dgm:fillClrLst>
+    <dgm:linClrLst meth="repeat">
+      <a:schemeClr val="lt1"/>
+    </dgm:linClrLst>
+    <dgm:effectClrLst/>
+    <dgm:txLinClrLst/>
+    <dgm:txFillClrLst/>
+    <dgm:txEffectClrLst/>
+  </dgm:styleLbl>
+  <dgm:styleLbl name="asst2">
+    <dgm:fillClrLst meth="repeat">
+      <a:schemeClr val="accent1"/>
+    </dgm:fillClrLst>
+    <dgm:linClrLst meth="repeat">
+      <a:schemeClr val="lt1"/>
+    </dgm:linClrLst>
+    <dgm:effectClrLst/>
+    <dgm:txLinClrLst/>
+    <dgm:txFillClrLst/>
+    <dgm:txEffectClrLst/>
+  </dgm:styleLbl>
+  <dgm:styleLbl name="asst3">
+    <dgm:fillClrLst meth="repeat">
+      <a:schemeClr val="accent1"/>
+    </dgm:fillClrLst>
+    <dgm:linClrLst meth="repeat">
+      <a:schemeClr val="lt1"/>
+    </dgm:linClrLst>
+    <dgm:effectClrLst/>
+    <dgm:txLinClrLst/>
+    <dgm:txFillClrLst/>
+    <dgm:txEffectClrLst/>
+  </dgm:styleLbl>
+  <dgm:styleLbl name="asst4">
+    <dgm:fillClrLst meth="repeat">
+      <a:schemeClr val="accent1"/>
+    </dgm:fillClrLst>
+    <dgm:linClrLst meth="repeat">
+      <a:schemeClr val="lt1"/>
+    </dgm:linClrLst>
+    <dgm:effectClrLst/>
+    <dgm:txLinClrLst/>
+    <dgm:txFillClrLst/>
+    <dgm:txEffectClrLst/>
+  </dgm:styleLbl>
+  <dgm:styleLbl name="parChTrans2D1">
+    <dgm:fillClrLst meth="repeat">
+      <a:schemeClr val="accent1">
+        <a:tint val="60000"/>
+      </a:schemeClr>
+    </dgm:fillClrLst>
+    <dgm:linClrLst meth="repeat">
+      <a:schemeClr val="accent1">
+        <a:tint val="60000"/>
+      </a:schemeClr>
+    </dgm:linClrLst>
+    <dgm:effectClrLst/>
+    <dgm:txLinClrLst/>
+    <dgm:txFillClrLst meth="repeat">
+      <a:schemeClr val="lt1"/>
+    </dgm:txFillClrLst>
+    <dgm:txEffectClrLst/>
+  </dgm:styleLbl>
+  <dgm:styleLbl name="parChTrans2D2">
+    <dgm:fillClrLst meth="repeat">
+      <a:schemeClr val="accent1"/>
+    </dgm:fillClrLst>
+    <dgm:linClrLst meth="repeat">
+      <a:schemeClr val="accent1"/>
+    </dgm:linClrLst>
+    <dgm:effectClrLst/>
+    <dgm:txLinClrLst/>
+    <dgm:txFillClrLst meth="repeat">
+      <a:schemeClr val="lt1"/>
+    </dgm:txFillClrLst>
+    <dgm:txEffectClrLst/>
+  </dgm:styleLbl>
+  <dgm:styleLbl name="parChTrans2D3">
+    <dgm:fillClrLst meth="repeat">
+      <a:schemeClr val="accent1"/>
+    </dgm:fillClrLst>
+    <dgm:linClrLst meth="repeat">
+      <a:schemeClr val="accent1"/>
+    </dgm:linClrLst>
+    <dgm:effectClrLst/>
+    <dgm:txLinClrLst/>
+    <dgm:txFillClrLst meth="repeat">
+      <a:schemeClr val="lt1"/>
+    </dgm:txFillClrLst>
+    <dgm:txEffectClrLst/>
+  </dgm:styleLbl>
+  <dgm:styleLbl name="parChTrans2D4">
+    <dgm:fillClrLst meth="repeat">
+      <a:schemeClr val="accent1"/>
+    </dgm:fillClrLst>
+    <dgm:linClrLst meth="repeat">
+      <a:schemeClr val="accent1"/>
+    </dgm:linClrLst>
+    <dgm:effectClrLst/>
+    <dgm:txLinClrLst/>
+    <dgm:txFillClrLst meth="repeat">
+      <a:schemeClr val="lt1"/>
+    </dgm:txFillClrLst>
+    <dgm:txEffectClrLst/>
+  </dgm:styleLbl>
+  <dgm:styleLbl name="parChTrans1D1">
+    <dgm:fillClrLst meth="repeat">
+      <a:schemeClr val="accent1"/>
+    </dgm:fillClrLst>
+    <dgm:linClrLst meth="repeat">
+      <a:schemeClr val="accent1">
+        <a:shade val="60000"/>
+      </a:schemeClr>
+    </dgm:linClrLst>
+    <dgm:effectClrLst/>
+    <dgm:txLinClrLst/>
+    <dgm:txFillClrLst meth="repeat">
+      <a:schemeClr val="tx1"/>
+    </dgm:txFillClrLst>
+    <dgm:txEffectClrLst/>
+  </dgm:styleLbl>
+  <dgm:styleLbl name="parChTrans1D2">
+    <dgm:fillClrLst meth="repeat">
+      <a:schemeClr val="accent1"/>
+    </dgm:fillClrLst>
+    <dgm:linClrLst meth="repeat">
+      <a:schemeClr val="accent1">
+        <a:shade val="60000"/>
+      </a:schemeClr>
+    </dgm:linClrLst>
+    <dgm:effectClrLst/>
+    <dgm:txLinClrLst/>
+    <dgm:txFillClrLst meth="repeat">
+      <a:schemeClr val="tx1"/>
+    </dgm:txFillClrLst>
+    <dgm:txEffectClrLst/>
+  </dgm:styleLbl>
+  <dgm:styleLbl name="parChTrans1D3">
+    <dgm:fillClrLst meth="repeat">
+      <a:schemeClr val="accent1"/>
+    </dgm:fillClrLst>
+    <dgm:linClrLst meth="repeat">
+      <a:schemeClr val="accent1">
+        <a:shade val="80000"/>
+      </a:schemeClr>
+    </dgm:linClrLst>
+    <dgm:effectClrLst/>
+    <dgm:txLinClrLst/>
+    <dgm:txFillClrLst meth="repeat">
+      <a:schemeClr val="tx1"/>
+    </dgm:txFillClrLst>
+    <dgm:txEffectClrLst/>
+  </dgm:styleLbl>
+  <dgm:styleLbl name="parChTrans1D4">
+    <dgm:fillClrLst meth="repeat">
+      <a:schemeClr val="accent1"/>
+    </dgm:fillClrLst>
+    <dgm:linClrLst meth="repeat">
+      <a:schemeClr val="accent1">
+        <a:shade val="80000"/>
+      </a:schemeClr>
+    </dgm:linClrLst>
+    <dgm:effectClrLst/>
+    <dgm:txLinClrLst/>
+    <dgm:txFillClrLst meth="repeat">
+      <a:schemeClr val="tx1"/>
+    </dgm:txFillClrLst>
+    <dgm:txEffectClrLst/>
+  </dgm:styleLbl>
+  <dgm:styleLbl name="fgAcc1">
+    <dgm:fillClrLst meth="repeat">
+      <a:schemeClr val="lt1">
+        <a:alpha val="90000"/>
+      </a:schemeClr>
+    </dgm:fillClrLst>
+    <dgm:linClrLst meth="repeat">
+      <a:schemeClr val="accent1"/>
+    </dgm:linClrLst>
+    <dgm:effectClrLst/>
+    <dgm:txLinClrLst/>
+    <dgm:txFillClrLst meth="repeat">
+      <a:schemeClr val="dk1"/>
+    </dgm:txFillClrLst>
+    <dgm:txEffectClrLst/>
+  </dgm:styleLbl>
+  <dgm:styleLbl name="conFgAcc1">
+    <dgm:fillClrLst meth="repeat">
+      <a:schemeClr val="lt1">
+        <a:alpha val="90000"/>
+      </a:schemeClr>
+    </dgm:fillClrLst>
+    <dgm:linClrLst meth="repeat">
+      <a:schemeClr val="accent1"/>
+    </dgm:linClrLst>
+    <dgm:effectClrLst/>
+    <dgm:txLinClrLst/>
+    <dgm:txFillClrLst meth="repeat">
+      <a:schemeClr val="dk1"/>
+    </dgm:txFillClrLst>
+    <dgm:txEffectClrLst/>
+  </dgm:styleLbl>
+  <dgm:styleLbl name="alignAcc1">
+    <dgm:fillClrLst meth="repeat">
+      <a:schemeClr val="lt1">
+        <a:alpha val="90000"/>
+      </a:schemeClr>
+    </dgm:fillClrLst>
+    <dgm:linClrLst meth="repeat">
+      <a:schemeClr val="accent1"/>
+    </dgm:linClrLst>
+    <dgm:effectClrLst/>
+    <dgm:txLinClrLst/>
+    <dgm:txFillClrLst meth="repeat">
+      <a:schemeClr val="dk1"/>
+    </dgm:txFillClrLst>
+    <dgm:txEffectClrLst/>
+  </dgm:styleLbl>
+  <dgm:styleLbl name="trAlignAcc1">
+    <dgm:fillClrLst meth="repeat">
+      <a:schemeClr val="lt1">
+        <a:alpha val="40000"/>
+      </a:schemeClr>
+    </dgm:fillClrLst>
+    <dgm:linClrLst meth="repeat">
+      <a:schemeClr val="accent1"/>
+    </dgm:linClrLst>
+    <dgm:effectClrLst/>
+    <dgm:txLinClrLst/>
+    <dgm:txFillClrLst meth="repeat">
+      <a:schemeClr val="dk1"/>
+    </dgm:txFillClrLst>
+    <dgm:txEffectClrLst/>
+  </dgm:styleLbl>
+  <dgm:styleLbl name="bgAcc1">
+    <dgm:fillClrLst meth="repeat">
+      <a:schemeClr val="lt1">
+        <a:alpha val="90000"/>
+      </a:schemeClr>
+    </dgm:fillClrLst>
+    <dgm:linClrLst meth="repeat">
+      <a:schemeClr val="accent1"/>
+    </dgm:linClrLst>
+    <dgm:effectClrLst/>
+    <dgm:txLinClrLst/>
+    <dgm:txFillClrLst meth="repeat">
+      <a:schemeClr val="dk1"/>
+    </dgm:txFillClrLst>
+    <dgm:txEffectClrLst/>
+  </dgm:styleLbl>
+  <dgm:styleLbl name="solidFgAcc1">
+    <dgm:fillClrLst meth="repeat">
+      <a:schemeClr val="lt1"/>
+    </dgm:fillClrLst>
+    <dgm:linClrLst meth="repeat">
+      <a:schemeClr val="accent1"/>
+    </dgm:linClrLst>
+    <dgm:effectClrLst/>
+    <dgm:txLinClrLst/>
+    <dgm:txFillClrLst meth="repeat">
+      <a:schemeClr val="dk1"/>
+    </dgm:txFillClrLst>
+    <dgm:txEffectClrLst/>
+  </dgm:styleLbl>
+  <dgm:styleLbl name="solidAlignAcc1">
+    <dgm:fillClrLst meth="repeat">
+      <a:schemeClr val="lt1"/>
+    </dgm:fillClrLst>
+    <dgm:linClrLst meth="repeat">
+      <a:schemeClr val="accent1"/>
+    </dgm:linClrLst>
+    <dgm:effectClrLst/>
+    <dgm:txLinClrLst/>
+    <dgm:txFillClrLst meth="repeat">
+      <a:schemeClr val="dk1"/>
+    </dgm:txFillClrLst>
+    <dgm:txEffectClrLst/>
+  </dgm:styleLbl>
+  <dgm:styleLbl name="solidBgAcc1">
+    <dgm:fillClrLst meth="repeat">
+      <a:schemeClr val="lt1"/>
+    </dgm:fillClrLst>
+    <dgm:linClrLst meth="repeat">
+      <a:schemeClr val="accent1"/>
+    </dgm:linClrLst>
+    <dgm:effectClrLst/>
+    <dgm:txLinClrLst/>
+    <dgm:txFillClrLst meth="repeat">
+      <a:schemeClr val="dk1"/>
+    </dgm:txFillClrLst>
+    <dgm:txEffectClrLst/>
+  </dgm:styleLbl>
+  <dgm:styleLbl name="fgAccFollowNode1">
+    <dgm:fillClrLst meth="repeat">
+      <a:schemeClr val="accent1">
+        <a:alpha val="90000"/>
+        <a:tint val="40000"/>
+      </a:schemeClr>
+    </dgm:fillClrLst>
+    <dgm:linClrLst meth="repeat">
+      <a:schemeClr val="accent1">
+        <a:alpha val="90000"/>
+        <a:tint val="40000"/>
+      </a:schemeClr>
+    </dgm:linClrLst>
+    <dgm:effectClrLst/>
+    <dgm:txLinClrLst/>
+    <dgm:txFillClrLst meth="repeat">
+      <a:schemeClr val="dk1"/>
+    </dgm:txFillClrLst>
+    <dgm:txEffectClrLst/>
+  </dgm:styleLbl>
+  <dgm:styleLbl name="alignAccFollowNode1">
+    <dgm:fillClrLst meth="repeat">
+      <a:schemeClr val="accent1">
+        <a:alpha val="90000"/>
+        <a:tint val="40000"/>
+      </a:schemeClr>
+    </dgm:fillClrLst>
+    <dgm:linClrLst meth="repeat">
+      <a:schemeClr val="accent1">
+        <a:alpha val="90000"/>
+        <a:tint val="40000"/>
+      </a:schemeClr>
+    </dgm:linClrLst>
+    <dgm:effectClrLst/>
+    <dgm:txLinClrLst/>
+    <dgm:txFillClrLst meth="repeat">
+      <a:schemeClr val="dk1"/>
+    </dgm:txFillClrLst>
+    <dgm:txEffectClrLst/>
+  </dgm:styleLbl>
+  <dgm:styleLbl name="bgAccFollowNode1">
+    <dgm:fillClrLst meth="repeat">
+      <a:schemeClr val="accent1">
+        <a:alpha val="90000"/>
+        <a:tint val="40000"/>
+      </a:schemeClr>
+    </dgm:fillClrLst>
+    <dgm:linClrLst meth="repeat">
+      <a:schemeClr val="accent1">
+        <a:alpha val="90000"/>
+        <a:tint val="40000"/>
+      </a:schemeClr>
+    </dgm:linClrLst>
+    <dgm:effectClrLst/>
+    <dgm:txLinClrLst/>
+    <dgm:txFillClrLst meth="repeat">
+      <a:schemeClr val="dk1"/>
+    </dgm:txFillClrLst>
+    <dgm:txEffectClrLst/>
+  </dgm:styleLbl>
+  <dgm:styleLbl name="fgAcc0">
+    <dgm:fillClrLst meth="repeat">
+      <a:schemeClr val="lt1">
+        <a:alpha val="90000"/>
+      </a:schemeClr>
+    </dgm:fillClrLst>
+    <dgm:linClrLst meth="repeat">
+      <a:schemeClr val="accent1"/>
+    </dgm:linClrLst>
+    <dgm:effectClrLst/>
+    <dgm:txLinClrLst/>
+    <dgm:txFillClrLst meth="repeat">
+      <a:schemeClr val="dk1"/>
+    </dgm:txFillClrLst>
+    <dgm:txEffectClrLst/>
+  </dgm:styleLbl>
+  <dgm:styleLbl name="fgAcc2">
+    <dgm:fillClrLst meth="repeat">
+      <a:schemeClr val="lt1">
+        <a:alpha val="90000"/>
+      </a:schemeClr>
+    </dgm:fillClrLst>
+    <dgm:linClrLst meth="repeat">
+      <a:schemeClr val="accent1"/>
+    </dgm:linClrLst>
+    <dgm:effectClrLst/>
+    <dgm:txLinClrLst/>
+    <dgm:txFillClrLst meth="repeat">
+      <a:schemeClr val="dk1"/>
+    </dgm:txFillClrLst>
+    <dgm:txEffectClrLst/>
+  </dgm:styleLbl>
+  <dgm:styleLbl name="fgAcc3">
+    <dgm:fillClrLst meth="repeat">
+      <a:schemeClr val="lt1">
+        <a:alpha val="90000"/>
+      </a:schemeClr>
+    </dgm:fillClrLst>
+    <dgm:linClrLst meth="repeat">
+      <a:schemeClr val="accent1"/>
+    </dgm:linClrLst>
+    <dgm:effectClrLst/>
+    <dgm:txLinClrLst/>
+    <dgm:txFillClrLst meth="repeat">
+      <a:schemeClr val="dk1"/>
+    </dgm:txFillClrLst>
+    <dgm:txEffectClrLst/>
+  </dgm:styleLbl>
+  <dgm:styleLbl name="fgAcc4">
+    <dgm:fillClrLst meth="repeat">
+      <a:schemeClr val="lt1">
+        <a:alpha val="90000"/>
+      </a:schemeClr>
+    </dgm:fillClrLst>
+    <dgm:linClrLst meth="repeat">
+      <a:schemeClr val="accent1"/>
+    </dgm:linClrLst>
+    <dgm:effectClrLst/>
+    <dgm:txLinClrLst/>
+    <dgm:txFillClrLst meth="repeat">
+      <a:schemeClr val="dk1"/>
+    </dgm:txFillClrLst>
+    <dgm:txEffectClrLst/>
+  </dgm:styleLbl>
+  <dgm:styleLbl name="bgShp">
+    <dgm:fillClrLst meth="repeat">
+      <a:schemeClr val="accent1">
+        <a:tint val="40000"/>
+      </a:schemeClr>
+    </dgm:fillClrLst>
+    <dgm:linClrLst meth="repeat">
+      <a:schemeClr val="accent1"/>
+    </dgm:linClrLst>
+    <dgm:effectClrLst/>
+    <dgm:txLinClrLst/>
+    <dgm:txFillClrLst meth="repeat">
+      <a:schemeClr val="dk1"/>
+    </dgm:txFillClrLst>
+    <dgm:txEffectClrLst/>
+  </dgm:styleLbl>
+  <dgm:styleLbl name="dkBgShp">
+    <dgm:fillClrLst meth="repeat">
+      <a:schemeClr val="accent1">
+        <a:shade val="80000"/>
+      </a:schemeClr>
+    </dgm:fillClrLst>
+    <dgm:linClrLst meth="repeat">
+      <a:schemeClr val="accent1"/>
+    </dgm:linClrLst>
+    <dgm:effectClrLst/>
+    <dgm:txLinClrLst/>
+    <dgm:txFillClrLst meth="repeat">
+      <a:schemeClr val="lt1"/>
+    </dgm:txFillClrLst>
+    <dgm:txEffectClrLst/>
+  </dgm:styleLbl>
+  <dgm:styleLbl name="trBgShp">
+    <dgm:fillClrLst meth="repeat">
+      <a:schemeClr val="accent1">
+        <a:tint val="50000"/>
+        <a:alpha val="40000"/>
+      </a:schemeClr>
+    </dgm:fillClrLst>
+    <dgm:linClrLst meth="repeat">
+      <a:schemeClr val="accent1"/>
+    </dgm:linClrLst>
+    <dgm:effectClrLst/>
+    <dgm:txLinClrLst/>
+    <dgm:txFillClrLst meth="repeat">
+      <a:schemeClr val="lt1"/>
+    </dgm:txFillClrLst>
+    <dgm:txEffectClrLst/>
+  </dgm:styleLbl>
+  <dgm:styleLbl name="fgShp">
+    <dgm:fillClrLst meth="repeat">
+      <a:schemeClr val="accent1">
+        <a:tint val="60000"/>
+      </a:schemeClr>
+    </dgm:fillClrLst>
+    <dgm:linClrLst meth="repeat">
+      <a:schemeClr val="lt1"/>
+    </dgm:linClrLst>
+    <dgm:effectClrLst/>
+    <dgm:txLinClrLst/>
+    <dgm:txFillClrLst meth="repeat">
+      <a:schemeClr val="dk1"/>
+    </dgm:txFillClrLst>
+    <dgm:txEffectClrLst/>
+  </dgm:styleLbl>
+  <dgm:styleLbl name="revTx">
+    <dgm:fillClrLst meth="repeat">
+      <a:schemeClr val="lt1">
+        <a:alpha val="0"/>
+      </a:schemeClr>
+    </dgm:fillClrLst>
+    <dgm:linClrLst meth="repeat">
+      <a:schemeClr val="dk1">
+        <a:alpha val="0"/>
+      </a:schemeClr>
+    </dgm:linClrLst>
+    <dgm:effectClrLst/>
+    <dgm:txLinClrLst/>
+    <dgm:txFillClrLst meth="repeat">
+      <a:schemeClr val="tx1"/>
+    </dgm:txFillClrLst>
+    <dgm:txEffectClrLst/>
+  </dgm:styleLbl>
+</dgm:colorsDef>
+</file>
+
+<file path=ppt/diagrams/data1.xml><?xml version="1.0" encoding="utf-8"?>
+<dgm:dataModel xmlns:dgm="http://schemas.openxmlformats.org/drawingml/2006/diagram" xmlns:a="http://schemas.openxmlformats.org/drawingml/2006/main">
+  <dgm:ptLst>
+    <dgm:pt modelId="{F112D1D7-B272-4DD1-A5D8-DAB1DCE25EC8}" type="doc">
+      <dgm:prSet loTypeId="urn:microsoft.com/office/officeart/2008/layout/AlternatingHexagons" loCatId="list" qsTypeId="urn:microsoft.com/office/officeart/2005/8/quickstyle/simple1" qsCatId="simple" csTypeId="urn:microsoft.com/office/officeart/2005/8/colors/accent1_2" csCatId="accent1" phldr="1"/>
+      <dgm:spPr/>
+      <dgm:t>
+        <a:bodyPr/>
+        <a:lstStyle/>
+        <a:p>
+          <a:endParaRPr lang="en-US"/>
+        </a:p>
+      </dgm:t>
+    </dgm:pt>
+    <dgm:pt modelId="{A72529E1-A7CB-4A6E-91AC-6B0A9C8C1F90}">
+      <dgm:prSet phldrT="[Text]"/>
+      <dgm:spPr/>
+      <dgm:t>
+        <a:bodyPr/>
+        <a:lstStyle/>
+        <a:p>
+          <a:r>
+            <a:rPr lang="en-US" dirty="0"/>
+            <a:t>Smart</a:t>
+          </a:r>
+        </a:p>
+      </dgm:t>
+    </dgm:pt>
+    <dgm:pt modelId="{42A3A65A-BDD1-4131-9951-3553A6373E27}" type="parTrans" cxnId="{A3618639-0B34-4774-B010-C6877553D53B}">
+      <dgm:prSet/>
+      <dgm:spPr/>
+      <dgm:t>
+        <a:bodyPr/>
+        <a:lstStyle/>
+        <a:p>
+          <a:endParaRPr lang="en-US"/>
+        </a:p>
+      </dgm:t>
+    </dgm:pt>
+    <dgm:pt modelId="{DF63F033-5943-45CE-9427-CE141F9BA6F7}" type="sibTrans" cxnId="{A3618639-0B34-4774-B010-C6877553D53B}">
+      <dgm:prSet/>
+      <dgm:spPr/>
+      <dgm:t>
+        <a:bodyPr/>
+        <a:lstStyle/>
+        <a:p>
+          <a:endParaRPr lang="en-US"/>
+        </a:p>
+      </dgm:t>
+    </dgm:pt>
+    <dgm:pt modelId="{ED62DB92-7143-411A-B895-1DCA98F22DAC}">
+      <dgm:prSet phldrT="[Text]"/>
+      <dgm:spPr/>
+      <dgm:t>
+        <a:bodyPr/>
+        <a:lstStyle/>
+        <a:p>
+          <a:r>
+            <a:rPr lang="en-US" dirty="0"/>
+            <a:t>Art</a:t>
+          </a:r>
+        </a:p>
+      </dgm:t>
+    </dgm:pt>
+    <dgm:pt modelId="{E47A9344-02AA-451D-971E-B477FCC8DC42}" type="parTrans" cxnId="{F37625B8-6F1F-474B-AD13-AFDD3DDADF47}">
+      <dgm:prSet/>
+      <dgm:spPr/>
+      <dgm:t>
+        <a:bodyPr/>
+        <a:lstStyle/>
+        <a:p>
+          <a:endParaRPr lang="en-US"/>
+        </a:p>
+      </dgm:t>
+    </dgm:pt>
+    <dgm:pt modelId="{AB4A5AFA-B5A9-4582-A06B-DCD5E99E2249}" type="sibTrans" cxnId="{F37625B8-6F1F-474B-AD13-AFDD3DDADF47}">
+      <dgm:prSet/>
+      <dgm:spPr/>
+      <dgm:t>
+        <a:bodyPr/>
+        <a:lstStyle/>
+        <a:p>
+          <a:endParaRPr lang="en-US"/>
+        </a:p>
+      </dgm:t>
+    </dgm:pt>
+    <dgm:pt modelId="{4C302C23-2D5D-4E38-AC13-9BA0D01D7283}">
+      <dgm:prSet phldrT="[Text]"/>
+      <dgm:spPr/>
+      <dgm:t>
+        <a:bodyPr/>
+        <a:lstStyle/>
+        <a:p>
+          <a:r>
+            <a:rPr lang="en-US" dirty="0"/>
+            <a:t>What</a:t>
+          </a:r>
+        </a:p>
+      </dgm:t>
+    </dgm:pt>
+    <dgm:pt modelId="{AC1F061B-B7A7-4889-9438-F6AFB22067AA}" type="parTrans" cxnId="{5B7B2EED-CF18-49B2-A8F0-574B5AC7218B}">
+      <dgm:prSet/>
+      <dgm:spPr/>
+      <dgm:t>
+        <a:bodyPr/>
+        <a:lstStyle/>
+        <a:p>
+          <a:endParaRPr lang="en-US"/>
+        </a:p>
+      </dgm:t>
+    </dgm:pt>
+    <dgm:pt modelId="{1FF96A90-63B3-47D0-AAD2-F870EBBC9CD5}" type="sibTrans" cxnId="{5B7B2EED-CF18-49B2-A8F0-574B5AC7218B}">
+      <dgm:prSet/>
+      <dgm:spPr/>
+      <dgm:t>
+        <a:bodyPr/>
+        <a:lstStyle/>
+        <a:p>
+          <a:endParaRPr lang="en-US"/>
+        </a:p>
+      </dgm:t>
+    </dgm:pt>
+    <dgm:pt modelId="{53738581-C29B-4FAB-AD45-4A94B6CA907D}">
+      <dgm:prSet phldrT="[Text]"/>
+      <dgm:spPr/>
+      <dgm:t>
+        <a:bodyPr/>
+        <a:lstStyle/>
+        <a:p>
+          <a:r>
+            <a:rPr lang="en-US" dirty="0"/>
+            <a:t>Up?</a:t>
+          </a:r>
+        </a:p>
+      </dgm:t>
+    </dgm:pt>
+    <dgm:pt modelId="{732DE03A-D6A5-4468-BF1C-5F0BD93F8CF3}" type="parTrans" cxnId="{FAB66E15-19AF-4F44-8254-26B0D6972A52}">
+      <dgm:prSet/>
+      <dgm:spPr/>
+      <dgm:t>
+        <a:bodyPr/>
+        <a:lstStyle/>
+        <a:p>
+          <a:endParaRPr lang="en-US"/>
+        </a:p>
+      </dgm:t>
+    </dgm:pt>
+    <dgm:pt modelId="{524178D4-2617-41C9-A3BD-8517DD68F3DD}" type="sibTrans" cxnId="{FAB66E15-19AF-4F44-8254-26B0D6972A52}">
+      <dgm:prSet/>
+      <dgm:spPr/>
+      <dgm:t>
+        <a:bodyPr/>
+        <a:lstStyle/>
+        <a:p>
+          <a:endParaRPr lang="en-US"/>
+        </a:p>
+      </dgm:t>
+    </dgm:pt>
+    <dgm:pt modelId="{8A4A2CA1-56A9-4A77-802C-0AFE4040FB08}">
+      <dgm:prSet phldrT="[Text]"/>
+      <dgm:spPr/>
+      <dgm:t>
+        <a:bodyPr/>
+        <a:lstStyle/>
+        <a:p>
+          <a:r>
+            <a:rPr lang="en-US" dirty="0"/>
+            <a:t>Dummy</a:t>
+          </a:r>
+        </a:p>
+      </dgm:t>
+    </dgm:pt>
+    <dgm:pt modelId="{D0657A07-1021-4040-94CA-EA27D9A4386D}" type="parTrans" cxnId="{44B53121-4AFF-413C-839A-611D0D0D69D5}">
+      <dgm:prSet/>
+      <dgm:spPr/>
+      <dgm:t>
+        <a:bodyPr/>
+        <a:lstStyle/>
+        <a:p>
+          <a:endParaRPr lang="en-US"/>
+        </a:p>
+      </dgm:t>
+    </dgm:pt>
+    <dgm:pt modelId="{E48512F9-BD23-430C-AF09-A068F7992C41}" type="sibTrans" cxnId="{44B53121-4AFF-413C-839A-611D0D0D69D5}">
+      <dgm:prSet/>
+      <dgm:spPr/>
+      <dgm:t>
+        <a:bodyPr/>
+        <a:lstStyle/>
+        <a:p>
+          <a:endParaRPr lang="en-US"/>
+        </a:p>
+      </dgm:t>
+    </dgm:pt>
+    <dgm:pt modelId="{8B314975-777E-4A61-8201-BEF7C8977C10}">
+      <dgm:prSet phldrT="[Text]"/>
+      <dgm:spPr/>
+      <dgm:t>
+        <a:bodyPr/>
+        <a:lstStyle/>
+        <a:p>
+          <a:r>
+            <a:rPr lang="en-US" dirty="0"/>
+            <a:t>Text</a:t>
+          </a:r>
+        </a:p>
+      </dgm:t>
+    </dgm:pt>
+    <dgm:pt modelId="{F2575AD3-8E19-4FD2-B9F7-793B6FDD3304}" type="parTrans" cxnId="{6D2EC349-1556-4D1F-BC76-82649F264A5F}">
+      <dgm:prSet/>
+      <dgm:spPr/>
+      <dgm:t>
+        <a:bodyPr/>
+        <a:lstStyle/>
+        <a:p>
+          <a:endParaRPr lang="en-US"/>
+        </a:p>
+      </dgm:t>
+    </dgm:pt>
+    <dgm:pt modelId="{5137121A-0D13-4474-9C31-48B1C89EAD57}" type="sibTrans" cxnId="{6D2EC349-1556-4D1F-BC76-82649F264A5F}">
+      <dgm:prSet/>
+      <dgm:spPr/>
+      <dgm:t>
+        <a:bodyPr/>
+        <a:lstStyle/>
+        <a:p>
+          <a:endParaRPr lang="en-US"/>
+        </a:p>
+      </dgm:t>
+    </dgm:pt>
+    <dgm:pt modelId="{CBADA04D-C53F-4EBA-82F8-91F7CF466F50}" type="pres">
+      <dgm:prSet presAssocID="{F112D1D7-B272-4DD1-A5D8-DAB1DCE25EC8}" presName="Name0" presStyleCnt="0">
+        <dgm:presLayoutVars>
+          <dgm:chMax/>
+          <dgm:chPref/>
+          <dgm:dir/>
+          <dgm:animLvl val="lvl"/>
+        </dgm:presLayoutVars>
+      </dgm:prSet>
+      <dgm:spPr/>
+    </dgm:pt>
+    <dgm:pt modelId="{8ABB96DD-66AA-4C2D-91FC-340A30624D07}" type="pres">
+      <dgm:prSet presAssocID="{A72529E1-A7CB-4A6E-91AC-6B0A9C8C1F90}" presName="composite" presStyleCnt="0"/>
+      <dgm:spPr/>
+    </dgm:pt>
+    <dgm:pt modelId="{A13BBD1A-EC91-4088-8C0D-8005D2B49B60}" type="pres">
+      <dgm:prSet presAssocID="{A72529E1-A7CB-4A6E-91AC-6B0A9C8C1F90}" presName="Parent1" presStyleLbl="node1" presStyleIdx="0" presStyleCnt="6">
+        <dgm:presLayoutVars>
+          <dgm:chMax val="1"/>
+          <dgm:chPref val="1"/>
+          <dgm:bulletEnabled val="1"/>
+        </dgm:presLayoutVars>
+      </dgm:prSet>
+      <dgm:spPr/>
+    </dgm:pt>
+    <dgm:pt modelId="{3FA9AA67-3DB4-46CF-8239-07C8D344CE85}" type="pres">
+      <dgm:prSet presAssocID="{A72529E1-A7CB-4A6E-91AC-6B0A9C8C1F90}" presName="Childtext1" presStyleLbl="revTx" presStyleIdx="0" presStyleCnt="3">
+        <dgm:presLayoutVars>
+          <dgm:chMax val="0"/>
+          <dgm:chPref val="0"/>
+          <dgm:bulletEnabled val="1"/>
+        </dgm:presLayoutVars>
+      </dgm:prSet>
+      <dgm:spPr/>
+    </dgm:pt>
+    <dgm:pt modelId="{23CD0CE3-8E87-4F02-9EED-0109B972D3B0}" type="pres">
+      <dgm:prSet presAssocID="{A72529E1-A7CB-4A6E-91AC-6B0A9C8C1F90}" presName="BalanceSpacing" presStyleCnt="0"/>
+      <dgm:spPr/>
+    </dgm:pt>
+    <dgm:pt modelId="{1E2163D6-E26A-4D62-A0A7-626A68C10C4A}" type="pres">
+      <dgm:prSet presAssocID="{A72529E1-A7CB-4A6E-91AC-6B0A9C8C1F90}" presName="BalanceSpacing1" presStyleCnt="0"/>
+      <dgm:spPr/>
+    </dgm:pt>
+    <dgm:pt modelId="{5D04823C-6A4E-48BD-A65C-BD1DB9C48016}" type="pres">
+      <dgm:prSet presAssocID="{DF63F033-5943-45CE-9427-CE141F9BA6F7}" presName="Accent1Text" presStyleLbl="node1" presStyleIdx="1" presStyleCnt="6"/>
+      <dgm:spPr/>
+    </dgm:pt>
+    <dgm:pt modelId="{CDC98647-9B6A-49E9-B64C-CCD4862231C6}" type="pres">
+      <dgm:prSet presAssocID="{DF63F033-5943-45CE-9427-CE141F9BA6F7}" presName="spaceBetweenRectangles" presStyleCnt="0"/>
+      <dgm:spPr/>
+    </dgm:pt>
+    <dgm:pt modelId="{49BE13FE-C5CB-4384-A95B-EA7FCD6B908C}" type="pres">
+      <dgm:prSet presAssocID="{4C302C23-2D5D-4E38-AC13-9BA0D01D7283}" presName="composite" presStyleCnt="0"/>
+      <dgm:spPr/>
+    </dgm:pt>
+    <dgm:pt modelId="{B55BEE7D-AE8F-4224-A842-0F3589D254EF}" type="pres">
+      <dgm:prSet presAssocID="{4C302C23-2D5D-4E38-AC13-9BA0D01D7283}" presName="Parent1" presStyleLbl="node1" presStyleIdx="2" presStyleCnt="6">
+        <dgm:presLayoutVars>
+          <dgm:chMax val="1"/>
+          <dgm:chPref val="1"/>
+          <dgm:bulletEnabled val="1"/>
+        </dgm:presLayoutVars>
+      </dgm:prSet>
+      <dgm:spPr/>
+    </dgm:pt>
+    <dgm:pt modelId="{97ACB592-E593-4E07-8F59-97EF0C40D0DB}" type="pres">
+      <dgm:prSet presAssocID="{4C302C23-2D5D-4E38-AC13-9BA0D01D7283}" presName="Childtext1" presStyleLbl="revTx" presStyleIdx="1" presStyleCnt="3">
+        <dgm:presLayoutVars>
+          <dgm:chMax val="0"/>
+          <dgm:chPref val="0"/>
+          <dgm:bulletEnabled val="1"/>
+        </dgm:presLayoutVars>
+      </dgm:prSet>
+      <dgm:spPr/>
+    </dgm:pt>
+    <dgm:pt modelId="{97621C15-A04C-4384-9F8E-8CFB643D75DC}" type="pres">
+      <dgm:prSet presAssocID="{4C302C23-2D5D-4E38-AC13-9BA0D01D7283}" presName="BalanceSpacing" presStyleCnt="0"/>
+      <dgm:spPr/>
+    </dgm:pt>
+    <dgm:pt modelId="{4E2D5C36-BD39-43BF-AADD-392580865009}" type="pres">
+      <dgm:prSet presAssocID="{4C302C23-2D5D-4E38-AC13-9BA0D01D7283}" presName="BalanceSpacing1" presStyleCnt="0"/>
+      <dgm:spPr/>
+    </dgm:pt>
+    <dgm:pt modelId="{7F41EBA0-5ECA-4D1E-BAD1-6FBAD7DC36C0}" type="pres">
+      <dgm:prSet presAssocID="{1FF96A90-63B3-47D0-AAD2-F870EBBC9CD5}" presName="Accent1Text" presStyleLbl="node1" presStyleIdx="3" presStyleCnt="6"/>
+      <dgm:spPr/>
+    </dgm:pt>
+    <dgm:pt modelId="{4113A17B-6FC6-46BE-A32D-7D84397CBE37}" type="pres">
+      <dgm:prSet presAssocID="{1FF96A90-63B3-47D0-AAD2-F870EBBC9CD5}" presName="spaceBetweenRectangles" presStyleCnt="0"/>
+      <dgm:spPr/>
+    </dgm:pt>
+    <dgm:pt modelId="{AC408D77-55D4-434E-BD43-DC96F121C860}" type="pres">
+      <dgm:prSet presAssocID="{8A4A2CA1-56A9-4A77-802C-0AFE4040FB08}" presName="composite" presStyleCnt="0"/>
+      <dgm:spPr/>
+    </dgm:pt>
+    <dgm:pt modelId="{06415C6F-5127-4189-8307-992845069613}" type="pres">
+      <dgm:prSet presAssocID="{8A4A2CA1-56A9-4A77-802C-0AFE4040FB08}" presName="Parent1" presStyleLbl="node1" presStyleIdx="4" presStyleCnt="6">
+        <dgm:presLayoutVars>
+          <dgm:chMax val="1"/>
+          <dgm:chPref val="1"/>
+          <dgm:bulletEnabled val="1"/>
+        </dgm:presLayoutVars>
+      </dgm:prSet>
+      <dgm:spPr/>
+    </dgm:pt>
+    <dgm:pt modelId="{D8215E68-EB2B-4A0C-9276-E6A4A9DA2299}" type="pres">
+      <dgm:prSet presAssocID="{8A4A2CA1-56A9-4A77-802C-0AFE4040FB08}" presName="Childtext1" presStyleLbl="revTx" presStyleIdx="2" presStyleCnt="3">
+        <dgm:presLayoutVars>
+          <dgm:chMax val="0"/>
+          <dgm:chPref val="0"/>
+          <dgm:bulletEnabled val="1"/>
+        </dgm:presLayoutVars>
+      </dgm:prSet>
+      <dgm:spPr/>
+    </dgm:pt>
+    <dgm:pt modelId="{D281A2D5-98F4-4D97-85B5-65FC82C749B0}" type="pres">
+      <dgm:prSet presAssocID="{8A4A2CA1-56A9-4A77-802C-0AFE4040FB08}" presName="BalanceSpacing" presStyleCnt="0"/>
+      <dgm:spPr/>
+    </dgm:pt>
+    <dgm:pt modelId="{B1BD950B-50C1-4BBA-AF69-6E8A2309E3C7}" type="pres">
+      <dgm:prSet presAssocID="{8A4A2CA1-56A9-4A77-802C-0AFE4040FB08}" presName="BalanceSpacing1" presStyleCnt="0"/>
+      <dgm:spPr/>
+    </dgm:pt>
+    <dgm:pt modelId="{ABE1ED78-628C-4C7E-ABF4-6CF4FC631D11}" type="pres">
+      <dgm:prSet presAssocID="{E48512F9-BD23-430C-AF09-A068F7992C41}" presName="Accent1Text" presStyleLbl="node1" presStyleIdx="5" presStyleCnt="6"/>
+      <dgm:spPr/>
+    </dgm:pt>
+  </dgm:ptLst>
+  <dgm:cxnLst>
+    <dgm:cxn modelId="{FAB66E15-19AF-4F44-8254-26B0D6972A52}" srcId="{4C302C23-2D5D-4E38-AC13-9BA0D01D7283}" destId="{53738581-C29B-4FAB-AD45-4A94B6CA907D}" srcOrd="0" destOrd="0" parTransId="{732DE03A-D6A5-4468-BF1C-5F0BD93F8CF3}" sibTransId="{524178D4-2617-41C9-A3BD-8517DD68F3DD}"/>
+    <dgm:cxn modelId="{767CE916-10B2-41DD-8D86-E82F6AF67B0F}" type="presOf" srcId="{53738581-C29B-4FAB-AD45-4A94B6CA907D}" destId="{97ACB592-E593-4E07-8F59-97EF0C40D0DB}" srcOrd="0" destOrd="0" presId="urn:microsoft.com/office/officeart/2008/layout/AlternatingHexagons"/>
+    <dgm:cxn modelId="{44B53121-4AFF-413C-839A-611D0D0D69D5}" srcId="{F112D1D7-B272-4DD1-A5D8-DAB1DCE25EC8}" destId="{8A4A2CA1-56A9-4A77-802C-0AFE4040FB08}" srcOrd="2" destOrd="0" parTransId="{D0657A07-1021-4040-94CA-EA27D9A4386D}" sibTransId="{E48512F9-BD23-430C-AF09-A068F7992C41}"/>
+    <dgm:cxn modelId="{A3618639-0B34-4774-B010-C6877553D53B}" srcId="{F112D1D7-B272-4DD1-A5D8-DAB1DCE25EC8}" destId="{A72529E1-A7CB-4A6E-91AC-6B0A9C8C1F90}" srcOrd="0" destOrd="0" parTransId="{42A3A65A-BDD1-4131-9951-3553A6373E27}" sibTransId="{DF63F033-5943-45CE-9427-CE141F9BA6F7}"/>
+    <dgm:cxn modelId="{F1340D46-6049-4B8E-953B-BD8B3AF63863}" type="presOf" srcId="{8A4A2CA1-56A9-4A77-802C-0AFE4040FB08}" destId="{06415C6F-5127-4189-8307-992845069613}" srcOrd="0" destOrd="0" presId="urn:microsoft.com/office/officeart/2008/layout/AlternatingHexagons"/>
+    <dgm:cxn modelId="{6D2EC349-1556-4D1F-BC76-82649F264A5F}" srcId="{8A4A2CA1-56A9-4A77-802C-0AFE4040FB08}" destId="{8B314975-777E-4A61-8201-BEF7C8977C10}" srcOrd="0" destOrd="0" parTransId="{F2575AD3-8E19-4FD2-B9F7-793B6FDD3304}" sibTransId="{5137121A-0D13-4474-9C31-48B1C89EAD57}"/>
+    <dgm:cxn modelId="{695B3B7D-BDAA-48A9-BA23-F9797C51377B}" type="presOf" srcId="{1FF96A90-63B3-47D0-AAD2-F870EBBC9CD5}" destId="{7F41EBA0-5ECA-4D1E-BAD1-6FBAD7DC36C0}" srcOrd="0" destOrd="0" presId="urn:microsoft.com/office/officeart/2008/layout/AlternatingHexagons"/>
+    <dgm:cxn modelId="{91E1A8A7-8635-4A6E-9BD0-D5C27BF62B72}" type="presOf" srcId="{DF63F033-5943-45CE-9427-CE141F9BA6F7}" destId="{5D04823C-6A4E-48BD-A65C-BD1DB9C48016}" srcOrd="0" destOrd="0" presId="urn:microsoft.com/office/officeart/2008/layout/AlternatingHexagons"/>
+    <dgm:cxn modelId="{1B91CEAA-9935-4A4C-AF1A-68FE11E38FAB}" type="presOf" srcId="{A72529E1-A7CB-4A6E-91AC-6B0A9C8C1F90}" destId="{A13BBD1A-EC91-4088-8C0D-8005D2B49B60}" srcOrd="0" destOrd="0" presId="urn:microsoft.com/office/officeart/2008/layout/AlternatingHexagons"/>
+    <dgm:cxn modelId="{F37625B8-6F1F-474B-AD13-AFDD3DDADF47}" srcId="{A72529E1-A7CB-4A6E-91AC-6B0A9C8C1F90}" destId="{ED62DB92-7143-411A-B895-1DCA98F22DAC}" srcOrd="0" destOrd="0" parTransId="{E47A9344-02AA-451D-971E-B477FCC8DC42}" sibTransId="{AB4A5AFA-B5A9-4582-A06B-DCD5E99E2249}"/>
+    <dgm:cxn modelId="{3F2F06B9-D3C5-4C13-BE17-80AE54B6D201}" type="presOf" srcId="{ED62DB92-7143-411A-B895-1DCA98F22DAC}" destId="{3FA9AA67-3DB4-46CF-8239-07C8D344CE85}" srcOrd="0" destOrd="0" presId="urn:microsoft.com/office/officeart/2008/layout/AlternatingHexagons"/>
+    <dgm:cxn modelId="{91B104E0-C0B0-4D64-AA0F-A0689494D9DD}" type="presOf" srcId="{F112D1D7-B272-4DD1-A5D8-DAB1DCE25EC8}" destId="{CBADA04D-C53F-4EBA-82F8-91F7CF466F50}" srcOrd="0" destOrd="0" presId="urn:microsoft.com/office/officeart/2008/layout/AlternatingHexagons"/>
+    <dgm:cxn modelId="{B89C98E5-1276-40EA-8BDA-0750C2192818}" type="presOf" srcId="{E48512F9-BD23-430C-AF09-A068F7992C41}" destId="{ABE1ED78-628C-4C7E-ABF4-6CF4FC631D11}" srcOrd="0" destOrd="0" presId="urn:microsoft.com/office/officeart/2008/layout/AlternatingHexagons"/>
+    <dgm:cxn modelId="{5B7B2EED-CF18-49B2-A8F0-574B5AC7218B}" srcId="{F112D1D7-B272-4DD1-A5D8-DAB1DCE25EC8}" destId="{4C302C23-2D5D-4E38-AC13-9BA0D01D7283}" srcOrd="1" destOrd="0" parTransId="{AC1F061B-B7A7-4889-9438-F6AFB22067AA}" sibTransId="{1FF96A90-63B3-47D0-AAD2-F870EBBC9CD5}"/>
+    <dgm:cxn modelId="{4FF8A6F4-CDCC-4995-A31C-5D47F93628CC}" type="presOf" srcId="{8B314975-777E-4A61-8201-BEF7C8977C10}" destId="{D8215E68-EB2B-4A0C-9276-E6A4A9DA2299}" srcOrd="0" destOrd="0" presId="urn:microsoft.com/office/officeart/2008/layout/AlternatingHexagons"/>
+    <dgm:cxn modelId="{710864F7-8F13-4266-B9BA-C21C6341FC57}" type="presOf" srcId="{4C302C23-2D5D-4E38-AC13-9BA0D01D7283}" destId="{B55BEE7D-AE8F-4224-A842-0F3589D254EF}" srcOrd="0" destOrd="0" presId="urn:microsoft.com/office/officeart/2008/layout/AlternatingHexagons"/>
+    <dgm:cxn modelId="{8930DBB6-B1C4-48C0-8FBF-39F0235A086E}" type="presParOf" srcId="{CBADA04D-C53F-4EBA-82F8-91F7CF466F50}" destId="{8ABB96DD-66AA-4C2D-91FC-340A30624D07}" srcOrd="0" destOrd="0" presId="urn:microsoft.com/office/officeart/2008/layout/AlternatingHexagons"/>
+    <dgm:cxn modelId="{ABAF5468-57E2-4922-BC58-6CA0303413F0}" type="presParOf" srcId="{8ABB96DD-66AA-4C2D-91FC-340A30624D07}" destId="{A13BBD1A-EC91-4088-8C0D-8005D2B49B60}" srcOrd="0" destOrd="0" presId="urn:microsoft.com/office/officeart/2008/layout/AlternatingHexagons"/>
+    <dgm:cxn modelId="{A9F081DD-A5C3-424E-B54D-5AD6C83FA35E}" type="presParOf" srcId="{8ABB96DD-66AA-4C2D-91FC-340A30624D07}" destId="{3FA9AA67-3DB4-46CF-8239-07C8D344CE85}" srcOrd="1" destOrd="0" presId="urn:microsoft.com/office/officeart/2008/layout/AlternatingHexagons"/>
+    <dgm:cxn modelId="{B9F1F9D7-7BF4-4804-A442-24C728C88E26}" type="presParOf" srcId="{8ABB96DD-66AA-4C2D-91FC-340A30624D07}" destId="{23CD0CE3-8E87-4F02-9EED-0109B972D3B0}" srcOrd="2" destOrd="0" presId="urn:microsoft.com/office/officeart/2008/layout/AlternatingHexagons"/>
+    <dgm:cxn modelId="{B870EE7F-AAD7-4B2B-91CC-7A120A9E8D66}" type="presParOf" srcId="{8ABB96DD-66AA-4C2D-91FC-340A30624D07}" destId="{1E2163D6-E26A-4D62-A0A7-626A68C10C4A}" srcOrd="3" destOrd="0" presId="urn:microsoft.com/office/officeart/2008/layout/AlternatingHexagons"/>
+    <dgm:cxn modelId="{3B20BED3-0C90-4236-8474-0D32339B53FD}" type="presParOf" srcId="{8ABB96DD-66AA-4C2D-91FC-340A30624D07}" destId="{5D04823C-6A4E-48BD-A65C-BD1DB9C48016}" srcOrd="4" destOrd="0" presId="urn:microsoft.com/office/officeart/2008/layout/AlternatingHexagons"/>
+    <dgm:cxn modelId="{3C14D71B-FBE6-4F66-B947-1E8B2FE8E4C2}" type="presParOf" srcId="{CBADA04D-C53F-4EBA-82F8-91F7CF466F50}" destId="{CDC98647-9B6A-49E9-B64C-CCD4862231C6}" srcOrd="1" destOrd="0" presId="urn:microsoft.com/office/officeart/2008/layout/AlternatingHexagons"/>
+    <dgm:cxn modelId="{085E4D35-2D4A-4B54-9FB3-2ABE44BF4B66}" type="presParOf" srcId="{CBADA04D-C53F-4EBA-82F8-91F7CF466F50}" destId="{49BE13FE-C5CB-4384-A95B-EA7FCD6B908C}" srcOrd="2" destOrd="0" presId="urn:microsoft.com/office/officeart/2008/layout/AlternatingHexagons"/>
+    <dgm:cxn modelId="{EAFD79D5-EFE8-4F5A-8DC4-05D702BDE86F}" type="presParOf" srcId="{49BE13FE-C5CB-4384-A95B-EA7FCD6B908C}" destId="{B55BEE7D-AE8F-4224-A842-0F3589D254EF}" srcOrd="0" destOrd="0" presId="urn:microsoft.com/office/officeart/2008/layout/AlternatingHexagons"/>
+    <dgm:cxn modelId="{FD65DF45-8724-4867-B37C-C04A7810AF14}" type="presParOf" srcId="{49BE13FE-C5CB-4384-A95B-EA7FCD6B908C}" destId="{97ACB592-E593-4E07-8F59-97EF0C40D0DB}" srcOrd="1" destOrd="0" presId="urn:microsoft.com/office/officeart/2008/layout/AlternatingHexagons"/>
+    <dgm:cxn modelId="{932D7F5B-1419-4987-B2D4-0E9AEA26F11E}" type="presParOf" srcId="{49BE13FE-C5CB-4384-A95B-EA7FCD6B908C}" destId="{97621C15-A04C-4384-9F8E-8CFB643D75DC}" srcOrd="2" destOrd="0" presId="urn:microsoft.com/office/officeart/2008/layout/AlternatingHexagons"/>
+    <dgm:cxn modelId="{5C4AB7ED-BD47-4822-A6DF-47E82844497D}" type="presParOf" srcId="{49BE13FE-C5CB-4384-A95B-EA7FCD6B908C}" destId="{4E2D5C36-BD39-43BF-AADD-392580865009}" srcOrd="3" destOrd="0" presId="urn:microsoft.com/office/officeart/2008/layout/AlternatingHexagons"/>
+    <dgm:cxn modelId="{4301723C-05C7-4309-BC2A-8424A15B08A3}" type="presParOf" srcId="{49BE13FE-C5CB-4384-A95B-EA7FCD6B908C}" destId="{7F41EBA0-5ECA-4D1E-BAD1-6FBAD7DC36C0}" srcOrd="4" destOrd="0" presId="urn:microsoft.com/office/officeart/2008/layout/AlternatingHexagons"/>
+    <dgm:cxn modelId="{63AFB49C-CDFD-4272-9FDF-B5F628EE388E}" type="presParOf" srcId="{CBADA04D-C53F-4EBA-82F8-91F7CF466F50}" destId="{4113A17B-6FC6-46BE-A32D-7D84397CBE37}" srcOrd="3" destOrd="0" presId="urn:microsoft.com/office/officeart/2008/layout/AlternatingHexagons"/>
+    <dgm:cxn modelId="{46DEFE0F-3E0F-4BBA-9D75-C3562071D983}" type="presParOf" srcId="{CBADA04D-C53F-4EBA-82F8-91F7CF466F50}" destId="{AC408D77-55D4-434E-BD43-DC96F121C860}" srcOrd="4" destOrd="0" presId="urn:microsoft.com/office/officeart/2008/layout/AlternatingHexagons"/>
+    <dgm:cxn modelId="{CD5A3213-5A68-479A-AA7D-98AE60A170EA}" type="presParOf" srcId="{AC408D77-55D4-434E-BD43-DC96F121C860}" destId="{06415C6F-5127-4189-8307-992845069613}" srcOrd="0" destOrd="0" presId="urn:microsoft.com/office/officeart/2008/layout/AlternatingHexagons"/>
+    <dgm:cxn modelId="{EBBF557C-AC7B-432D-B7A9-0FEC66A9EA77}" type="presParOf" srcId="{AC408D77-55D4-434E-BD43-DC96F121C860}" destId="{D8215E68-EB2B-4A0C-9276-E6A4A9DA2299}" srcOrd="1" destOrd="0" presId="urn:microsoft.com/office/officeart/2008/layout/AlternatingHexagons"/>
+    <dgm:cxn modelId="{9215CABB-8AF5-4260-BDB6-AAC2CBC52C1A}" type="presParOf" srcId="{AC408D77-55D4-434E-BD43-DC96F121C860}" destId="{D281A2D5-98F4-4D97-85B5-65FC82C749B0}" srcOrd="2" destOrd="0" presId="urn:microsoft.com/office/officeart/2008/layout/AlternatingHexagons"/>
+    <dgm:cxn modelId="{F9ACE5FE-30A7-462F-A7C8-E70ECC3AD4C2}" type="presParOf" srcId="{AC408D77-55D4-434E-BD43-DC96F121C860}" destId="{B1BD950B-50C1-4BBA-AF69-6E8A2309E3C7}" srcOrd="3" destOrd="0" presId="urn:microsoft.com/office/officeart/2008/layout/AlternatingHexagons"/>
+    <dgm:cxn modelId="{5BF6BFEB-AD3D-47C6-A8EC-7A33A239E26D}" type="presParOf" srcId="{AC408D77-55D4-434E-BD43-DC96F121C860}" destId="{ABE1ED78-628C-4C7E-ABF4-6CF4FC631D11}" srcOrd="4" destOrd="0" presId="urn:microsoft.com/office/officeart/2008/layout/AlternatingHexagons"/>
+  </dgm:cxnLst>
+  <dgm:bg/>
+  <dgm:whole/>
+  <dgm:extLst>
+    <a:ext uri="http://schemas.microsoft.com/office/drawing/2008/diagram">
+      <dsp:dataModelExt xmlns:dsp="http://schemas.microsoft.com/office/drawing/2008/diagram" relId="rId6" minVer="http://schemas.openxmlformats.org/drawingml/2006/diagram"/>
+    </a:ext>
+  </dgm:extLst>
+</dgm:dataModel>
+</file>
+
+<file path=ppt/diagrams/drawing1.xml><?xml version="1.0" encoding="utf-8"?>
+<dsp:drawing xmlns:dgm="http://schemas.openxmlformats.org/drawingml/2006/diagram" xmlns:dsp="http://schemas.microsoft.com/office/drawing/2008/diagram" xmlns:a="http://schemas.openxmlformats.org/drawingml/2006/main">
+  <dsp:spTree>
+    <dsp:nvGrpSpPr>
+      <dsp:cNvPr id="0" name=""/>
+      <dsp:cNvGrpSpPr/>
+    </dsp:nvGrpSpPr>
+    <dsp:grpSpPr/>
+    <dsp:sp modelId="{A13BBD1A-EC91-4088-8C0D-8005D2B49B60}">
+      <dsp:nvSpPr>
+        <dsp:cNvPr id="0" name=""/>
+        <dsp:cNvSpPr/>
+      </dsp:nvSpPr>
+      <dsp:spPr>
+        <a:xfrm rot="5400000">
+          <a:off x="2061151" y="83477"/>
+          <a:ext cx="1265518" cy="1101001"/>
+        </a:xfrm>
+        <a:prstGeom prst="hexagon">
+          <a:avLst>
+            <a:gd name="adj" fmla="val 25000"/>
+            <a:gd name="vf" fmla="val 115470"/>
+          </a:avLst>
+        </a:prstGeom>
+        <a:solidFill>
+          <a:schemeClr val="accent1">
+            <a:hueOff val="0"/>
+            <a:satOff val="0"/>
+            <a:lumOff val="0"/>
+            <a:alphaOff val="0"/>
+          </a:schemeClr>
+        </a:solidFill>
+        <a:ln w="19050" cap="rnd" cmpd="sng" algn="ctr">
+          <a:solidFill>
+            <a:schemeClr val="lt1">
+              <a:hueOff val="0"/>
+              <a:satOff val="0"/>
+              <a:lumOff val="0"/>
+              <a:alphaOff val="0"/>
+            </a:schemeClr>
+          </a:solidFill>
+          <a:prstDash val="solid"/>
+        </a:ln>
+        <a:effectLst/>
+      </dsp:spPr>
+      <dsp:style>
+        <a:lnRef idx="2">
+          <a:scrgbClr r="0" g="0" b="0"/>
+        </a:lnRef>
+        <a:fillRef idx="1">
+          <a:scrgbClr r="0" g="0" b="0"/>
+        </a:fillRef>
+        <a:effectRef idx="0">
+          <a:scrgbClr r="0" g="0" b="0"/>
+        </a:effectRef>
+        <a:fontRef idx="minor">
+          <a:schemeClr val="lt1"/>
+        </a:fontRef>
+      </dsp:style>
+      <dsp:txBody>
+        <a:bodyPr spcFirstLastPara="0" vert="horz" wrap="square" lIns="49530" tIns="49530" rIns="49530" bIns="49530" numCol="1" spcCol="1270" anchor="ctr" anchorCtr="0">
+          <a:noAutofit/>
+        </a:bodyPr>
+        <a:lstStyle/>
+        <a:p>
+          <a:pPr marL="0" lvl="0" indent="0" algn="ctr" defTabSz="577850">
+            <a:lnSpc>
+              <a:spcPct val="90000"/>
+            </a:lnSpc>
+            <a:spcBef>
+              <a:spcPct val="0"/>
+            </a:spcBef>
+            <a:spcAft>
+              <a:spcPct val="35000"/>
+            </a:spcAft>
+            <a:buNone/>
+          </a:pPr>
+          <a:r>
+            <a:rPr lang="en-US" sz="1300" kern="1200" dirty="0"/>
+            <a:t>Smart</a:t>
+          </a:r>
+        </a:p>
+      </dsp:txBody>
+      <dsp:txXfrm rot="-5400000">
+        <a:off x="2314982" y="198429"/>
+        <a:ext cx="757855" cy="871098"/>
+      </dsp:txXfrm>
+    </dsp:sp>
+    <dsp:sp modelId="{3FA9AA67-3DB4-46CF-8239-07C8D344CE85}">
+      <dsp:nvSpPr>
+        <dsp:cNvPr id="0" name=""/>
+        <dsp:cNvSpPr/>
+      </dsp:nvSpPr>
+      <dsp:spPr>
+        <a:xfrm>
+          <a:off x="3277821" y="254322"/>
+          <a:ext cx="1412318" cy="759311"/>
+        </a:xfrm>
+        <a:prstGeom prst="rect">
+          <a:avLst/>
+        </a:prstGeom>
+        <a:noFill/>
+        <a:ln>
+          <a:noFill/>
+        </a:ln>
+        <a:effectLst/>
+      </dsp:spPr>
+      <dsp:style>
+        <a:lnRef idx="0">
+          <a:scrgbClr r="0" g="0" b="0"/>
+        </a:lnRef>
+        <a:fillRef idx="0">
+          <a:scrgbClr r="0" g="0" b="0"/>
+        </a:fillRef>
+        <a:effectRef idx="0">
+          <a:scrgbClr r="0" g="0" b="0"/>
+        </a:effectRef>
+        <a:fontRef idx="minor"/>
+      </dsp:style>
+      <dsp:txBody>
+        <a:bodyPr spcFirstLastPara="0" vert="horz" wrap="square" lIns="49530" tIns="49530" rIns="49530" bIns="49530" numCol="1" spcCol="1270" anchor="ctr" anchorCtr="0">
+          <a:noAutofit/>
+        </a:bodyPr>
+        <a:lstStyle/>
+        <a:p>
+          <a:pPr marL="0" lvl="0" indent="0" algn="l" defTabSz="577850">
+            <a:lnSpc>
+              <a:spcPct val="90000"/>
+            </a:lnSpc>
+            <a:spcBef>
+              <a:spcPct val="0"/>
+            </a:spcBef>
+            <a:spcAft>
+              <a:spcPct val="35000"/>
+            </a:spcAft>
+            <a:buNone/>
+          </a:pPr>
+          <a:r>
+            <a:rPr lang="en-US" sz="1300" kern="1200" dirty="0"/>
+            <a:t>Art</a:t>
+          </a:r>
+        </a:p>
+      </dsp:txBody>
+      <dsp:txXfrm>
+        <a:off x="3277821" y="254322"/>
+        <a:ext cx="1412318" cy="759311"/>
+      </dsp:txXfrm>
+    </dsp:sp>
+    <dsp:sp modelId="{5D04823C-6A4E-48BD-A65C-BD1DB9C48016}">
+      <dsp:nvSpPr>
+        <dsp:cNvPr id="0" name=""/>
+        <dsp:cNvSpPr/>
+      </dsp:nvSpPr>
+      <dsp:spPr>
+        <a:xfrm rot="5400000">
+          <a:off x="872070" y="83477"/>
+          <a:ext cx="1265518" cy="1101001"/>
+        </a:xfrm>
+        <a:prstGeom prst="hexagon">
+          <a:avLst>
+            <a:gd name="adj" fmla="val 25000"/>
+            <a:gd name="vf" fmla="val 115470"/>
+          </a:avLst>
+        </a:prstGeom>
+        <a:solidFill>
+          <a:schemeClr val="accent1">
+            <a:hueOff val="0"/>
+            <a:satOff val="0"/>
+            <a:lumOff val="0"/>
+            <a:alphaOff val="0"/>
+          </a:schemeClr>
+        </a:solidFill>
+        <a:ln w="19050" cap="rnd" cmpd="sng" algn="ctr">
+          <a:solidFill>
+            <a:schemeClr val="lt1">
+              <a:hueOff val="0"/>
+              <a:satOff val="0"/>
+              <a:lumOff val="0"/>
+              <a:alphaOff val="0"/>
+            </a:schemeClr>
+          </a:solidFill>
+          <a:prstDash val="solid"/>
+        </a:ln>
+        <a:effectLst/>
+      </dsp:spPr>
+      <dsp:style>
+        <a:lnRef idx="2">
+          <a:scrgbClr r="0" g="0" b="0"/>
+        </a:lnRef>
+        <a:fillRef idx="1">
+          <a:scrgbClr r="0" g="0" b="0"/>
+        </a:fillRef>
+        <a:effectRef idx="0">
+          <a:scrgbClr r="0" g="0" b="0"/>
+        </a:effectRef>
+        <a:fontRef idx="minor">
+          <a:schemeClr val="lt1"/>
+        </a:fontRef>
+      </dsp:style>
+      <dsp:txBody>
+        <a:bodyPr spcFirstLastPara="0" vert="horz" wrap="square" lIns="0" tIns="0" rIns="0" bIns="0" numCol="1" spcCol="1270" anchor="ctr" anchorCtr="0">
+          <a:noAutofit/>
+        </a:bodyPr>
+        <a:lstStyle/>
+        <a:p>
+          <a:pPr marL="0" lvl="0" indent="0" algn="ctr" defTabSz="1600200">
+            <a:lnSpc>
+              <a:spcPct val="90000"/>
+            </a:lnSpc>
+            <a:spcBef>
+              <a:spcPct val="0"/>
+            </a:spcBef>
+            <a:spcAft>
+              <a:spcPct val="35000"/>
+            </a:spcAft>
+            <a:buNone/>
+          </a:pPr>
+          <a:endParaRPr lang="en-US" sz="3600" kern="1200"/>
+        </a:p>
+      </dsp:txBody>
+      <dsp:txXfrm rot="-5400000">
+        <a:off x="1125901" y="198429"/>
+        <a:ext cx="757855" cy="871098"/>
+      </dsp:txXfrm>
+    </dsp:sp>
+    <dsp:sp modelId="{B55BEE7D-AE8F-4224-A842-0F3589D254EF}">
+      <dsp:nvSpPr>
+        <dsp:cNvPr id="0" name=""/>
+        <dsp:cNvSpPr/>
+      </dsp:nvSpPr>
+      <dsp:spPr>
+        <a:xfrm rot="5400000">
+          <a:off x="1464333" y="1157649"/>
+          <a:ext cx="1265518" cy="1101001"/>
+        </a:xfrm>
+        <a:prstGeom prst="hexagon">
+          <a:avLst>
+            <a:gd name="adj" fmla="val 25000"/>
+            <a:gd name="vf" fmla="val 115470"/>
+          </a:avLst>
+        </a:prstGeom>
+        <a:solidFill>
+          <a:schemeClr val="accent1">
+            <a:hueOff val="0"/>
+            <a:satOff val="0"/>
+            <a:lumOff val="0"/>
+            <a:alphaOff val="0"/>
+          </a:schemeClr>
+        </a:solidFill>
+        <a:ln w="19050" cap="rnd" cmpd="sng" algn="ctr">
+          <a:solidFill>
+            <a:schemeClr val="lt1">
+              <a:hueOff val="0"/>
+              <a:satOff val="0"/>
+              <a:lumOff val="0"/>
+              <a:alphaOff val="0"/>
+            </a:schemeClr>
+          </a:solidFill>
+          <a:prstDash val="solid"/>
+        </a:ln>
+        <a:effectLst/>
+      </dsp:spPr>
+      <dsp:style>
+        <a:lnRef idx="2">
+          <a:scrgbClr r="0" g="0" b="0"/>
+        </a:lnRef>
+        <a:fillRef idx="1">
+          <a:scrgbClr r="0" g="0" b="0"/>
+        </a:fillRef>
+        <a:effectRef idx="0">
+          <a:scrgbClr r="0" g="0" b="0"/>
+        </a:effectRef>
+        <a:fontRef idx="minor">
+          <a:schemeClr val="lt1"/>
+        </a:fontRef>
+      </dsp:style>
+      <dsp:txBody>
+        <a:bodyPr spcFirstLastPara="0" vert="horz" wrap="square" lIns="49530" tIns="49530" rIns="49530" bIns="49530" numCol="1" spcCol="1270" anchor="ctr" anchorCtr="0">
+          <a:noAutofit/>
+        </a:bodyPr>
+        <a:lstStyle/>
+        <a:p>
+          <a:pPr marL="0" lvl="0" indent="0" algn="ctr" defTabSz="577850">
+            <a:lnSpc>
+              <a:spcPct val="90000"/>
+            </a:lnSpc>
+            <a:spcBef>
+              <a:spcPct val="0"/>
+            </a:spcBef>
+            <a:spcAft>
+              <a:spcPct val="35000"/>
+            </a:spcAft>
+            <a:buNone/>
+          </a:pPr>
+          <a:r>
+            <a:rPr lang="en-US" sz="1300" kern="1200" dirty="0"/>
+            <a:t>What</a:t>
+          </a:r>
+        </a:p>
+      </dsp:txBody>
+      <dsp:txXfrm rot="-5400000">
+        <a:off x="1718164" y="1272601"/>
+        <a:ext cx="757855" cy="871098"/>
+      </dsp:txXfrm>
+    </dsp:sp>
+    <dsp:sp modelId="{97ACB592-E593-4E07-8F59-97EF0C40D0DB}">
+      <dsp:nvSpPr>
+        <dsp:cNvPr id="0" name=""/>
+        <dsp:cNvSpPr/>
+      </dsp:nvSpPr>
+      <dsp:spPr>
+        <a:xfrm>
+          <a:off x="134273" y="1328494"/>
+          <a:ext cx="1366759" cy="759311"/>
+        </a:xfrm>
+        <a:prstGeom prst="rect">
+          <a:avLst/>
+        </a:prstGeom>
+        <a:noFill/>
+        <a:ln>
+          <a:noFill/>
+        </a:ln>
+        <a:effectLst/>
+      </dsp:spPr>
+      <dsp:style>
+        <a:lnRef idx="0">
+          <a:scrgbClr r="0" g="0" b="0"/>
+        </a:lnRef>
+        <a:fillRef idx="0">
+          <a:scrgbClr r="0" g="0" b="0"/>
+        </a:fillRef>
+        <a:effectRef idx="0">
+          <a:scrgbClr r="0" g="0" b="0"/>
+        </a:effectRef>
+        <a:fontRef idx="minor"/>
+      </dsp:style>
+      <dsp:txBody>
+        <a:bodyPr spcFirstLastPara="0" vert="horz" wrap="square" lIns="49530" tIns="49530" rIns="49530" bIns="49530" numCol="1" spcCol="1270" anchor="ctr" anchorCtr="0">
+          <a:noAutofit/>
+        </a:bodyPr>
+        <a:lstStyle/>
+        <a:p>
+          <a:pPr marL="0" lvl="0" indent="0" algn="r" defTabSz="577850">
+            <a:lnSpc>
+              <a:spcPct val="90000"/>
+            </a:lnSpc>
+            <a:spcBef>
+              <a:spcPct val="0"/>
+            </a:spcBef>
+            <a:spcAft>
+              <a:spcPct val="35000"/>
+            </a:spcAft>
+            <a:buNone/>
+          </a:pPr>
+          <a:r>
+            <a:rPr lang="en-US" sz="1300" kern="1200" dirty="0"/>
+            <a:t>Up?</a:t>
+          </a:r>
+        </a:p>
+      </dsp:txBody>
+      <dsp:txXfrm>
+        <a:off x="134273" y="1328494"/>
+        <a:ext cx="1366759" cy="759311"/>
+      </dsp:txXfrm>
+    </dsp:sp>
+    <dsp:sp modelId="{7F41EBA0-5ECA-4D1E-BAD1-6FBAD7DC36C0}">
+      <dsp:nvSpPr>
+        <dsp:cNvPr id="0" name=""/>
+        <dsp:cNvSpPr/>
+      </dsp:nvSpPr>
+      <dsp:spPr>
+        <a:xfrm rot="5400000">
+          <a:off x="2653414" y="1157649"/>
+          <a:ext cx="1265518" cy="1101001"/>
+        </a:xfrm>
+        <a:prstGeom prst="hexagon">
+          <a:avLst>
+            <a:gd name="adj" fmla="val 25000"/>
+            <a:gd name="vf" fmla="val 115470"/>
+          </a:avLst>
+        </a:prstGeom>
+        <a:solidFill>
+          <a:schemeClr val="accent1">
+            <a:hueOff val="0"/>
+            <a:satOff val="0"/>
+            <a:lumOff val="0"/>
+            <a:alphaOff val="0"/>
+          </a:schemeClr>
+        </a:solidFill>
+        <a:ln w="19050" cap="rnd" cmpd="sng" algn="ctr">
+          <a:solidFill>
+            <a:schemeClr val="lt1">
+              <a:hueOff val="0"/>
+              <a:satOff val="0"/>
+              <a:lumOff val="0"/>
+              <a:alphaOff val="0"/>
+            </a:schemeClr>
+          </a:solidFill>
+          <a:prstDash val="solid"/>
+        </a:ln>
+        <a:effectLst/>
+      </dsp:spPr>
+      <dsp:style>
+        <a:lnRef idx="2">
+          <a:scrgbClr r="0" g="0" b="0"/>
+        </a:lnRef>
+        <a:fillRef idx="1">
+          <a:scrgbClr r="0" g="0" b="0"/>
+        </a:fillRef>
+        <a:effectRef idx="0">
+          <a:scrgbClr r="0" g="0" b="0"/>
+        </a:effectRef>
+        <a:fontRef idx="minor">
+          <a:schemeClr val="lt1"/>
+        </a:fontRef>
+      </dsp:style>
+      <dsp:txBody>
+        <a:bodyPr spcFirstLastPara="0" vert="horz" wrap="square" lIns="0" tIns="0" rIns="0" bIns="0" numCol="1" spcCol="1270" anchor="ctr" anchorCtr="0">
+          <a:noAutofit/>
+        </a:bodyPr>
+        <a:lstStyle/>
+        <a:p>
+          <a:pPr marL="0" lvl="0" indent="0" algn="ctr" defTabSz="1600200">
+            <a:lnSpc>
+              <a:spcPct val="90000"/>
+            </a:lnSpc>
+            <a:spcBef>
+              <a:spcPct val="0"/>
+            </a:spcBef>
+            <a:spcAft>
+              <a:spcPct val="35000"/>
+            </a:spcAft>
+            <a:buNone/>
+          </a:pPr>
+          <a:endParaRPr lang="en-US" sz="3600" kern="1200"/>
+        </a:p>
+      </dsp:txBody>
+      <dsp:txXfrm rot="-5400000">
+        <a:off x="2907245" y="1272601"/>
+        <a:ext cx="757855" cy="871098"/>
+      </dsp:txXfrm>
+    </dsp:sp>
+    <dsp:sp modelId="{06415C6F-5127-4189-8307-992845069613}">
+      <dsp:nvSpPr>
+        <dsp:cNvPr id="0" name=""/>
+        <dsp:cNvSpPr/>
+      </dsp:nvSpPr>
+      <dsp:spPr>
+        <a:xfrm rot="5400000">
+          <a:off x="2061151" y="2231821"/>
+          <a:ext cx="1265518" cy="1101001"/>
+        </a:xfrm>
+        <a:prstGeom prst="hexagon">
+          <a:avLst>
+            <a:gd name="adj" fmla="val 25000"/>
+            <a:gd name="vf" fmla="val 115470"/>
+          </a:avLst>
+        </a:prstGeom>
+        <a:solidFill>
+          <a:schemeClr val="accent1">
+            <a:hueOff val="0"/>
+            <a:satOff val="0"/>
+            <a:lumOff val="0"/>
+            <a:alphaOff val="0"/>
+          </a:schemeClr>
+        </a:solidFill>
+        <a:ln w="19050" cap="rnd" cmpd="sng" algn="ctr">
+          <a:solidFill>
+            <a:schemeClr val="lt1">
+              <a:hueOff val="0"/>
+              <a:satOff val="0"/>
+              <a:lumOff val="0"/>
+              <a:alphaOff val="0"/>
+            </a:schemeClr>
+          </a:solidFill>
+          <a:prstDash val="solid"/>
+        </a:ln>
+        <a:effectLst/>
+      </dsp:spPr>
+      <dsp:style>
+        <a:lnRef idx="2">
+          <a:scrgbClr r="0" g="0" b="0"/>
+        </a:lnRef>
+        <a:fillRef idx="1">
+          <a:scrgbClr r="0" g="0" b="0"/>
+        </a:fillRef>
+        <a:effectRef idx="0">
+          <a:scrgbClr r="0" g="0" b="0"/>
+        </a:effectRef>
+        <a:fontRef idx="minor">
+          <a:schemeClr val="lt1"/>
+        </a:fontRef>
+      </dsp:style>
+      <dsp:txBody>
+        <a:bodyPr spcFirstLastPara="0" vert="horz" wrap="square" lIns="49530" tIns="49530" rIns="49530" bIns="49530" numCol="1" spcCol="1270" anchor="ctr" anchorCtr="0">
+          <a:noAutofit/>
+        </a:bodyPr>
+        <a:lstStyle/>
+        <a:p>
+          <a:pPr marL="0" lvl="0" indent="0" algn="ctr" defTabSz="577850">
+            <a:lnSpc>
+              <a:spcPct val="90000"/>
+            </a:lnSpc>
+            <a:spcBef>
+              <a:spcPct val="0"/>
+            </a:spcBef>
+            <a:spcAft>
+              <a:spcPct val="35000"/>
+            </a:spcAft>
+            <a:buNone/>
+          </a:pPr>
+          <a:r>
+            <a:rPr lang="en-US" sz="1300" kern="1200" dirty="0"/>
+            <a:t>Dummy</a:t>
+          </a:r>
+        </a:p>
+      </dsp:txBody>
+      <dsp:txXfrm rot="-5400000">
+        <a:off x="2314982" y="2346773"/>
+        <a:ext cx="757855" cy="871098"/>
+      </dsp:txXfrm>
+    </dsp:sp>
+    <dsp:sp modelId="{D8215E68-EB2B-4A0C-9276-E6A4A9DA2299}">
+      <dsp:nvSpPr>
+        <dsp:cNvPr id="0" name=""/>
+        <dsp:cNvSpPr/>
+      </dsp:nvSpPr>
+      <dsp:spPr>
+        <a:xfrm>
+          <a:off x="3277821" y="2402666"/>
+          <a:ext cx="1412318" cy="759311"/>
+        </a:xfrm>
+        <a:prstGeom prst="rect">
+          <a:avLst/>
+        </a:prstGeom>
+        <a:noFill/>
+        <a:ln>
+          <a:noFill/>
+        </a:ln>
+        <a:effectLst/>
+      </dsp:spPr>
+      <dsp:style>
+        <a:lnRef idx="0">
+          <a:scrgbClr r="0" g="0" b="0"/>
+        </a:lnRef>
+        <a:fillRef idx="0">
+          <a:scrgbClr r="0" g="0" b="0"/>
+        </a:fillRef>
+        <a:effectRef idx="0">
+          <a:scrgbClr r="0" g="0" b="0"/>
+        </a:effectRef>
+        <a:fontRef idx="minor"/>
+      </dsp:style>
+      <dsp:txBody>
+        <a:bodyPr spcFirstLastPara="0" vert="horz" wrap="square" lIns="49530" tIns="49530" rIns="49530" bIns="49530" numCol="1" spcCol="1270" anchor="ctr" anchorCtr="0">
+          <a:noAutofit/>
+        </a:bodyPr>
+        <a:lstStyle/>
+        <a:p>
+          <a:pPr marL="0" lvl="0" indent="0" algn="l" defTabSz="577850">
+            <a:lnSpc>
+              <a:spcPct val="90000"/>
+            </a:lnSpc>
+            <a:spcBef>
+              <a:spcPct val="0"/>
+            </a:spcBef>
+            <a:spcAft>
+              <a:spcPct val="35000"/>
+            </a:spcAft>
+            <a:buNone/>
+          </a:pPr>
+          <a:r>
+            <a:rPr lang="en-US" sz="1300" kern="1200" dirty="0"/>
+            <a:t>Text</a:t>
+          </a:r>
+        </a:p>
+      </dsp:txBody>
+      <dsp:txXfrm>
+        <a:off x="3277821" y="2402666"/>
+        <a:ext cx="1412318" cy="759311"/>
+      </dsp:txXfrm>
+    </dsp:sp>
+    <dsp:sp modelId="{ABE1ED78-628C-4C7E-ABF4-6CF4FC631D11}">
+      <dsp:nvSpPr>
+        <dsp:cNvPr id="0" name=""/>
+        <dsp:cNvSpPr/>
+      </dsp:nvSpPr>
+      <dsp:spPr>
+        <a:xfrm rot="5400000">
+          <a:off x="872070" y="2231821"/>
+          <a:ext cx="1265518" cy="1101001"/>
+        </a:xfrm>
+        <a:prstGeom prst="hexagon">
+          <a:avLst>
+            <a:gd name="adj" fmla="val 25000"/>
+            <a:gd name="vf" fmla="val 115470"/>
+          </a:avLst>
+        </a:prstGeom>
+        <a:solidFill>
+          <a:schemeClr val="accent1">
+            <a:hueOff val="0"/>
+            <a:satOff val="0"/>
+            <a:lumOff val="0"/>
+            <a:alphaOff val="0"/>
+          </a:schemeClr>
+        </a:solidFill>
+        <a:ln w="19050" cap="rnd" cmpd="sng" algn="ctr">
+          <a:solidFill>
+            <a:schemeClr val="lt1">
+              <a:hueOff val="0"/>
+              <a:satOff val="0"/>
+              <a:lumOff val="0"/>
+              <a:alphaOff val="0"/>
+            </a:schemeClr>
+          </a:solidFill>
+          <a:prstDash val="solid"/>
+        </a:ln>
+        <a:effectLst/>
+      </dsp:spPr>
+      <dsp:style>
+        <a:lnRef idx="2">
+          <a:scrgbClr r="0" g="0" b="0"/>
+        </a:lnRef>
+        <a:fillRef idx="1">
+          <a:scrgbClr r="0" g="0" b="0"/>
+        </a:fillRef>
+        <a:effectRef idx="0">
+          <a:scrgbClr r="0" g="0" b="0"/>
+        </a:effectRef>
+        <a:fontRef idx="minor">
+          <a:schemeClr val="lt1"/>
+        </a:fontRef>
+      </dsp:style>
+      <dsp:txBody>
+        <a:bodyPr spcFirstLastPara="0" vert="horz" wrap="square" lIns="0" tIns="0" rIns="0" bIns="0" numCol="1" spcCol="1270" anchor="ctr" anchorCtr="0">
+          <a:noAutofit/>
+        </a:bodyPr>
+        <a:lstStyle/>
+        <a:p>
+          <a:pPr marL="0" lvl="0" indent="0" algn="ctr" defTabSz="1600200">
+            <a:lnSpc>
+              <a:spcPct val="90000"/>
+            </a:lnSpc>
+            <a:spcBef>
+              <a:spcPct val="0"/>
+            </a:spcBef>
+            <a:spcAft>
+              <a:spcPct val="35000"/>
+            </a:spcAft>
+            <a:buNone/>
+          </a:pPr>
+          <a:endParaRPr lang="en-US" sz="3600" kern="1200"/>
+        </a:p>
+      </dsp:txBody>
+      <dsp:txXfrm rot="-5400000">
+        <a:off x="1125901" y="2346773"/>
+        <a:ext cx="757855" cy="871098"/>
+      </dsp:txXfrm>
+    </dsp:sp>
+  </dsp:spTree>
+</dsp:drawing>
+</file>
+
+<file path=ppt/diagrams/layout1.xml><?xml version="1.0" encoding="utf-8"?>
+<dgm:layoutDef xmlns:dgm="http://schemas.openxmlformats.org/drawingml/2006/diagram" xmlns:a="http://schemas.openxmlformats.org/drawingml/2006/main" uniqueId="urn:microsoft.com/office/officeart/2008/layout/AlternatingHexagons">
+  <dgm:title val=""/>
+  <dgm:desc val=""/>
+  <dgm:catLst>
+    <dgm:cat type="list" pri="1500"/>
+  </dgm:catLst>
+  <dgm:sampData>
+    <dgm:dataModel>
+      <dgm:ptLst>
+        <dgm:pt modelId="0" type="doc"/>
+        <dgm:pt modelId="10">
+          <dgm:prSet phldr="1"/>
+        </dgm:pt>
+        <dgm:pt modelId="11">
+          <dgm:prSet phldr="1"/>
+        </dgm:pt>
+        <dgm:pt modelId="20">
+          <dgm:prSet phldr="1"/>
+        </dgm:pt>
+        <dgm:pt modelId="21">
+          <dgm:prSet phldr="1"/>
+        </dgm:pt>
+        <dgm:pt modelId="30">
+          <dgm:prSet phldr="1"/>
+        </dgm:pt>
+        <dgm:pt modelId="31">
+          <dgm:prSet phldr="1"/>
+        </dgm:pt>
+      </dgm:ptLst>
+      <dgm:cxnLst>
+        <dgm:cxn modelId="40" srcId="0" destId="10" srcOrd="0" destOrd="0"/>
+        <dgm:cxn modelId="12" srcId="10" destId="11" srcOrd="0" destOrd="0"/>
+        <dgm:cxn modelId="50" srcId="0" destId="20" srcOrd="1" destOrd="0"/>
+        <dgm:cxn modelId="22" srcId="20" destId="21" srcOrd="0" destOrd="0"/>
+        <dgm:cxn modelId="60" srcId="0" destId="30" srcOrd="1" destOrd="0"/>
+        <dgm:cxn modelId="32" srcId="30" destId="31" srcOrd="0" destOrd="0"/>
+      </dgm:cxnLst>
+      <dgm:bg/>
+      <dgm:whole/>
+    </dgm:dataModel>
+  </dgm:sampData>
+  <dgm:styleData>
+    <dgm:dataModel>
+      <dgm:ptLst>
+        <dgm:pt modelId="0" type="doc"/>
+        <dgm:pt modelId="10">
+          <dgm:prSet phldr="1"/>
+        </dgm:pt>
+        <dgm:pt modelId="20">
+          <dgm:prSet phldr="1"/>
+        </dgm:pt>
+      </dgm:ptLst>
+      <dgm:cxnLst>
+        <dgm:cxn modelId="60" srcId="0" destId="10" srcOrd="0" destOrd="0"/>
+        <dgm:cxn modelId="70" srcId="0" destId="20" srcOrd="1" destOrd="0"/>
+      </dgm:cxnLst>
+      <dgm:bg/>
+      <dgm:whole/>
+    </dgm:dataModel>
+  </dgm:styleData>
+  <dgm:clrData>
+    <dgm:dataModel>
+      <dgm:ptLst>
+        <dgm:pt modelId="0" type="doc"/>
+        <dgm:pt modelId="10">
+          <dgm:prSet phldr="1"/>
+        </dgm:pt>
+        <dgm:pt modelId="20">
+          <dgm:prSet phldr="1"/>
+        </dgm:pt>
+        <dgm:pt modelId="30">
+          <dgm:prSet phldr="1"/>
+        </dgm:pt>
+        <dgm:pt modelId="40">
+          <dgm:prSet phldr="1"/>
+        </dgm:pt>
+      </dgm:ptLst>
+      <dgm:cxnLst>
+        <dgm:cxn modelId="60" srcId="0" destId="10" srcOrd="0" destOrd="0"/>
+        <dgm:cxn modelId="70" srcId="0" destId="20" srcOrd="1" destOrd="0"/>
+        <dgm:cxn modelId="80" srcId="0" destId="30" srcOrd="2" destOrd="0"/>
+        <dgm:cxn modelId="90" srcId="0" destId="40" srcOrd="3" destOrd="0"/>
+      </dgm:cxnLst>
+      <dgm:bg/>
+      <dgm:whole/>
+    </dgm:dataModel>
+  </dgm:clrData>
+  <dgm:layoutNode name="Name0">
+    <dgm:varLst>
+      <dgm:chMax/>
+      <dgm:chPref/>
+      <dgm:dir/>
+      <dgm:animLvl val="lvl"/>
+    </dgm:varLst>
+    <dgm:alg type="lin">
+      <dgm:param type="linDir" val="fromT"/>
+    </dgm:alg>
+    <dgm:shape xmlns:r="http://schemas.openxmlformats.org/officeDocument/2006/relationships" r:blip="">
+      <dgm:adjLst/>
+    </dgm:shape>
+    <dgm:constrLst>
+      <dgm:constr type="primFontSz" for="des" forName="Parent1" val="65"/>
+      <dgm:constr type="primFontSz" for="des" forName="Childtext1" refType="primFontSz" refFor="des" refForName="Parent1" op="lte"/>
+      <dgm:constr type="w" for="ch" forName="composite" refType="w"/>
+      <dgm:constr type="h" for="ch" forName="composite" refType="h"/>
+      <dgm:constr type="h" for="ch" forName="spaceBetweenRectangles" refType="w" refFor="ch" refForName="composite" fact="-0.042"/>
+      <dgm:constr type="sp" refType="h" refFor="ch" refForName="composite" op="equ" fact="0.1"/>
+    </dgm:constrLst>
+    <dgm:forEach name="nodesForEach" axis="ch" ptType="node">
+      <dgm:layoutNode name="composite">
+        <dgm:alg type="composite">
+          <dgm:param type="ar" val="3.6"/>
+        </dgm:alg>
+        <dgm:shape xmlns:r="http://schemas.openxmlformats.org/officeDocument/2006/relationships" r:blip="">
+          <dgm:adjLst/>
+        </dgm:shape>
+        <dgm:choose name="Name1">
+          <dgm:if name="Name2" func="var" arg="dir" op="equ" val="norm">
+            <dgm:choose name="Name3">
+              <dgm:if name="Name4" axis="self" ptType="node" func="posOdd" op="equ" val="1">
+                <dgm:constrLst>
+                  <dgm:constr type="l" for="ch" forName="Accent1" refType="w" fact="0.18"/>
+                  <dgm:constr type="t" for="ch" forName="Accent1" refType="h" fact="0"/>
+                  <dgm:constr type="h" for="ch" forName="Accent1" refType="h"/>
+                  <dgm:constr type="w" for="ch" forName="Accent1" refType="h" fact="0.87"/>
+                  <dgm:constr type="l" for="ch" forName="Accent1Text" refType="w" fact="0.18"/>
+                  <dgm:constr type="t" for="ch" forName="Accent1Text" refType="h" fact="0"/>
+                  <dgm:constr type="h" for="ch" forName="Accent1Text" refType="h"/>
+                  <dgm:constr type="w" for="ch" forName="Accent1Text" refType="h" fact="0.87"/>
+                  <dgm:constr type="l" for="ch" forName="Parent1" refType="w" fact="0.441"/>
+                  <dgm:constr type="t" for="ch" forName="Parent1" refType="h" fact="0"/>
+                  <dgm:constr type="h" for="ch" forName="Parent1" refType="h"/>
+                  <dgm:constr type="w" for="ch" forName="Parent1" refType="h" fact="0.87"/>
+                  <dgm:constr type="l" for="ch" forName="Childtext1" refType="w" fact="0.69"/>
+                  <dgm:constr type="t" for="ch" forName="Childtext1" refType="h" fact="0.2"/>
+                  <dgm:constr type="w" for="ch" forName="Childtext1" refType="w" fact="0.31"/>
+                  <dgm:constr type="h" for="ch" forName="Childtext1" refType="h" fact="0.6"/>
+                  <dgm:constr type="l" for="ch" forName="BalanceSpacing" refType="w" fact="0"/>
+                  <dgm:constr type="t" for="ch" forName="BalanceSpacing" refType="h" fact="0"/>
+                  <dgm:constr type="w" for="ch" forName="BalanceSpacing" refType="w"/>
+                  <dgm:constr type="h" for="ch" forName="BalanceSpacing" refType="h" fact="0.1"/>
+                  <dgm:constr type="l" for="ch" forName="BalanceSpacing1" refType="w" fact="0.69"/>
+                  <dgm:constr type="t" for="ch" forName="BalanceSpacing1" refType="h" fact="0.2"/>
+                  <dgm:constr type="w" for="ch" forName="BalanceSpacing1" refType="w" fact="0.31"/>
+                  <dgm:constr type="h" for="ch" forName="BalanceSpacing1" refType="h" fact="0.6"/>
+                </dgm:constrLst>
+              </dgm:if>
+              <dgm:else name="Name5">
+                <dgm:constrLst>
+                  <dgm:constr type="l" for="ch" forName="Accent1" refType="w" fact="0.571"/>
+                  <dgm:constr type="t" for="ch" forName="Accent1" refType="h" fact="0"/>
+                  <dgm:constr type="h" for="ch" forName="Accent1" refType="h"/>
+                  <dgm:constr type="w" for="ch" forName="Accent1" refType="h" fact="0.87"/>
+                  <dgm:constr type="l" for="ch" forName="Accent1Text" refType="w" fact="0.571"/>
+                  <dgm:constr type="t" for="ch" forName="Accent1Text" refType="h" fact="0"/>
+                  <dgm:constr type="h" for="ch" forName="Accent1Text" refType="h"/>
+                  <dgm:constr type="w" for="ch" forName="Accent1Text" refType="h" fact="0.87"/>
+                  <dgm:constr type="l" for="ch" forName="Parent1" refType="w" fact="0.31"/>
+                  <dgm:constr type="t" for="ch" forName="Parent1" refType="h" fact="0"/>
+                  <dgm:constr type="h" for="ch" forName="Parent1" refType="h"/>
+                  <dgm:constr type="w" for="ch" forName="Parent1" refType="h" fact="0.87"/>
+                  <dgm:constr type="l" for="ch" forName="Childtext1" refType="w" fact="0"/>
+                  <dgm:constr type="t" for="ch" forName="Childtext1" refType="h" fact="0.2"/>
+                  <dgm:constr type="w" for="ch" forName="Childtext1" refType="w" fact="0.3"/>
+                  <dgm:constr type="h" for="ch" forName="Childtext1" refType="h" fact="0.6"/>
+                  <dgm:constr type="l" for="ch" forName="BalanceSpacing" refType="w" fact="0.82"/>
+                  <dgm:constr type="t" for="ch" forName="BalanceSpacing" refType="h" fact="0"/>
+                  <dgm:constr type="w" for="ch" forName="BalanceSpacing" refType="w" fact="0.18"/>
+                  <dgm:constr type="h" for="ch" forName="BalanceSpacing" refType="h"/>
+                  <dgm:constr type="l" for="ch" forName="BalanceSpacing1" refType="w" fact="0"/>
+                  <dgm:constr type="t" for="ch" forName="BalanceSpacing1" refType="h" fact="0.2"/>
+                  <dgm:constr type="w" for="ch" forName="BalanceSpacing1" refType="w" fact="0.3"/>
+                  <dgm:constr type="h" for="ch" forName="BalanceSpacing1" refType="h" fact="0.6"/>
+                </dgm:constrLst>
+              </dgm:else>
+            </dgm:choose>
+          </dgm:if>
+          <dgm:else name="Name6">
+            <dgm:choose name="Name7">
+              <dgm:if name="Name8" axis="self" ptType="node" func="posOdd" op="equ" val="1">
+                <dgm:constrLst>
+                  <dgm:constr type="l" for="ch" forName="Accent1" refType="w" fact="0.571"/>
+                  <dgm:constr type="t" for="ch" forName="Accent1" refType="h" fact="0"/>
+                  <dgm:constr type="h" for="ch" forName="Accent1" refType="h"/>
+                  <dgm:constr type="w" for="ch" forName="Accent1" refType="h" fact="0.87"/>
+                  <dgm:constr type="l" for="ch" forName="Accent1Text" refType="w" fact="0.571"/>
+                  <dgm:constr type="t" for="ch" forName="Accent1Text" refType="h" fact="0"/>
+                  <dgm:constr type="h" for="ch" forName="Accent1Text" refType="h"/>
+                  <dgm:constr type="w" for="ch" forName="Accent1Text" refType="h" fact="0.87"/>
+                  <dgm:constr type="l" for="ch" forName="Parent1" refType="w" fact="0.31"/>
+                  <dgm:constr type="t" for="ch" forName="Parent1" refType="h" fact="0"/>
+                  <dgm:constr type="h" for="ch" forName="Parent1" refType="h"/>
+                  <dgm:constr type="w" for="ch" forName="Parent1" refType="h" fact="0.87"/>
+                  <dgm:constr type="l" for="ch" forName="Childtext1" refType="w" fact="0"/>
+                  <dgm:constr type="t" for="ch" forName="Childtext1" refType="h" fact="0.2"/>
+                  <dgm:constr type="w" for="ch" forName="Childtext1" refType="w" fact="0.3"/>
+                  <dgm:constr type="h" for="ch" forName="Childtext1" refType="h" fact="0.6"/>
+                  <dgm:constr type="l" for="ch" forName="BalanceSpacing" refType="w" fact="0.82"/>
+                  <dgm:constr type="t" for="ch" forName="BalanceSpacing" refType="h" fact="0"/>
+                  <dgm:constr type="w" for="ch" forName="BalanceSpacing" refType="w" fact="0.18"/>
+                  <dgm:constr type="h" for="ch" forName="BalanceSpacing" refType="h"/>
+                </dgm:constrLst>
+              </dgm:if>
+              <dgm:else name="Name9">
+                <dgm:constrLst>
+                  <dgm:constr type="l" for="ch" forName="Accent1" refType="w" fact="0.18"/>
+                  <dgm:constr type="t" for="ch" forName="Accent1" refType="h" fact="0"/>
+                  <dgm:constr type="h" for="ch" forName="Accent1" refType="h"/>
+                  <dgm:constr type="w" for="ch" forName="Accent1" refType="h" fact="0.87"/>
+                  <dgm:constr type="l" for="ch" forName="Accent1Text" refType="w" fact="0.18"/>
+                  <dgm:constr type="t" for="ch" forName="Accent1Text" refType="h" fact="0"/>
+                  <dgm:constr type="h" for="ch" forName="Accent1Text" refType="h"/>
+                  <dgm:constr type="w" for="ch" forName="Accent1Text" refType="h" fact="0.87"/>
+                  <dgm:constr type="l" for="ch" forName="Parent1" refType="w" fact="0.441"/>
+                  <dgm:constr type="t" for="ch" forName="Parent1" refType="h" fact="0"/>
+                  <dgm:constr type="h" for="ch" forName="Parent1" refType="h"/>
+                  <dgm:constr type="w" for="ch" forName="Parent1" refType="h" fact="0.87"/>
+                  <dgm:constr type="l" for="ch" forName="Childtext1" refType="w" fact="0.69"/>
+                  <dgm:constr type="t" for="ch" forName="Childtext1" refType="h" fact="0.2"/>
+                  <dgm:constr type="w" for="ch" forName="Childtext1" refType="w" fact="0.31"/>
+                  <dgm:constr type="h" for="ch" forName="Childtext1" refType="h" fact="0.6"/>
+                  <dgm:constr type="l" for="ch" forName="BalanceSpacing" refType="w" fact="0"/>
+                  <dgm:constr type="t" for="ch" forName="BalanceSpacing" refType="h" fact="0"/>
+                  <dgm:constr type="w" for="ch" forName="BalanceSpacing" refType="w" fact="0.18"/>
+                  <dgm:constr type="h" for="ch" forName="BalanceSpacing" refType="h"/>
+                </dgm:constrLst>
+              </dgm:else>
+            </dgm:choose>
+          </dgm:else>
+        </dgm:choose>
+        <dgm:layoutNode name="Parent1" styleLbl="node1">
+          <dgm:varLst>
+            <dgm:chMax val="1"/>
+            <dgm:chPref val="1"/>
+            <dgm:bulletEnabled val="1"/>
+          </dgm:varLst>
+          <dgm:alg type="tx"/>
+          <dgm:shape xmlns:r="http://schemas.openxmlformats.org/officeDocument/2006/relationships" rot="90" type="hexagon" r:blip="">
+            <dgm:adjLst>
+              <dgm:adj idx="1" val="0.25"/>
+              <dgm:adj idx="2" val="1.1547"/>
+            </dgm:adjLst>
+          </dgm:shape>
+          <dgm:presOf axis="self" ptType="node"/>
+          <dgm:constrLst>
+            <dgm:constr type="lMarg" refType="primFontSz" fact="0.3"/>
+            <dgm:constr type="rMarg" refType="primFontSz" fact="0.3"/>
+            <dgm:constr type="tMarg" refType="primFontSz" fact="0.3"/>
+            <dgm:constr type="bMarg" refType="primFontSz" fact="0.3"/>
+          </dgm:constrLst>
+          <dgm:ruleLst>
+            <dgm:rule type="primFontSz" val="5" fact="NaN" max="NaN"/>
+          </dgm:ruleLst>
+        </dgm:layoutNode>
+        <dgm:layoutNode name="Childtext1" styleLbl="revTx">
+          <dgm:varLst>
+            <dgm:chMax val="0"/>
+            <dgm:chPref val="0"/>
+            <dgm:bulletEnabled val="1"/>
+          </dgm:varLst>
+          <dgm:choose name="Name10">
+            <dgm:if name="Name11" func="var" arg="dir" op="equ" val="norm">
+              <dgm:choose name="Name12">
+                <dgm:if name="Name13" axis="self" ptType="node" func="posOdd" op="equ" val="1">
+                  <dgm:alg type="tx">
+                    <dgm:param type="parTxLTRAlign" val="l"/>
+                  </dgm:alg>
+                </dgm:if>
+                <dgm:else name="Name14">
+                  <dgm:alg type="tx">
+                    <dgm:param type="parTxLTRAlign" val="r"/>
+                  </dgm:alg>
+                </dgm:else>
+              </dgm:choose>
+            </dgm:if>
+            <dgm:else name="Name15">
+              <dgm:choose name="Name16">
+                <dgm:if name="Name17" axis="self" ptType="node" func="posOdd" op="equ" val="1">
+                  <dgm:alg type="tx">
+                    <dgm:param type="parTxLTRAlign" val="r"/>
+                  </dgm:alg>
+                </dgm:if>
+                <dgm:else name="Name18">
+                  <dgm:alg type="tx">
+                    <dgm:param type="parTxLTRAlign" val="l"/>
+                  </dgm:alg>
+                </dgm:else>
+              </dgm:choose>
+            </dgm:else>
+          </dgm:choose>
+          <dgm:shape xmlns:r="http://schemas.openxmlformats.org/officeDocument/2006/relationships" type="rect" r:blip="">
+            <dgm:adjLst/>
+          </dgm:shape>
+          <dgm:presOf axis="des" ptType="node"/>
+          <dgm:constrLst>
+            <dgm:constr type="lMarg" refType="primFontSz" fact="0.3"/>
+            <dgm:constr type="rMarg" refType="primFontSz" fact="0.3"/>
+            <dgm:constr type="tMarg" refType="primFontSz" fact="0.3"/>
+            <dgm:constr type="bMarg" refType="primFontSz" fact="0.3"/>
+          </dgm:constrLst>
+          <dgm:ruleLst>
+            <dgm:rule type="primFontSz" val="5" fact="NaN" max="NaN"/>
+          </dgm:ruleLst>
+        </dgm:layoutNode>
+        <dgm:layoutNode name="BalanceSpacing">
+          <dgm:alg type="sp"/>
+          <dgm:shape xmlns:r="http://schemas.openxmlformats.org/officeDocument/2006/relationships" r:blip="">
+            <dgm:adjLst/>
+          </dgm:shape>
+        </dgm:layoutNode>
+        <dgm:layoutNode name="BalanceSpacing1">
+          <dgm:alg type="sp"/>
+          <dgm:shape xmlns:r="http://schemas.openxmlformats.org/officeDocument/2006/relationships" r:blip="">
+            <dgm:adjLst/>
+          </dgm:shape>
+        </dgm:layoutNode>
+        <dgm:forEach name="Name19" axis="followSib" ptType="sibTrans" hideLastTrans="0" cnt="1">
+          <dgm:layoutNode name="Accent1Text" styleLbl="node1">
+            <dgm:alg type="tx"/>
+            <dgm:shape xmlns:r="http://schemas.openxmlformats.org/officeDocument/2006/relationships" rot="90" type="hexagon" r:blip="">
+              <dgm:adjLst>
+                <dgm:adj idx="1" val="0.25"/>
+                <dgm:adj idx="2" val="1.1547"/>
+              </dgm:adjLst>
+            </dgm:shape>
+            <dgm:presOf axis="self" ptType="sibTrans"/>
+            <dgm:constrLst>
+              <dgm:constr type="lMarg"/>
+              <dgm:constr type="rMarg"/>
+              <dgm:constr type="tMarg"/>
+              <dgm:constr type="bMarg"/>
+            </dgm:constrLst>
+            <dgm:ruleLst>
+              <dgm:rule type="primFontSz" val="5" fact="NaN" max="NaN"/>
+            </dgm:ruleLst>
+          </dgm:layoutNode>
+        </dgm:forEach>
+      </dgm:layoutNode>
+      <dgm:forEach name="Name20" axis="followSib" ptType="sibTrans" cnt="1">
+        <dgm:layoutNode name="spaceBetweenRectangles">
+          <dgm:alg type="sp"/>
+          <dgm:shape xmlns:r="http://schemas.openxmlformats.org/officeDocument/2006/relationships" r:blip="">
+            <dgm:adjLst/>
+          </dgm:shape>
+          <dgm:presOf/>
+          <dgm:constrLst/>
+          <dgm:ruleLst/>
+        </dgm:layoutNode>
+      </dgm:forEach>
+    </dgm:forEach>
+  </dgm:layoutNode>
+</dgm:layoutDef>
+</file>
+
+<file path=ppt/diagrams/quickStyle1.xml><?xml version="1.0" encoding="utf-8"?>
+<dgm:styleDef xmlns:dgm="http://schemas.openxmlformats.org/drawingml/2006/diagram" xmlns:a="http://schemas.openxmlformats.org/drawingml/2006/main" uniqueId="urn:microsoft.com/office/officeart/2005/8/quickstyle/simple1">
+  <dgm:title val=""/>
+  <dgm:desc val=""/>
+  <dgm:catLst>
+    <dgm:cat type="simple" pri="10100"/>
+  </dgm:catLst>
+  <dgm:scene3d>
+    <a:camera prst="orthographicFront"/>
+    <a:lightRig rig="threePt" dir="t"/>
+  </dgm:scene3d>
+  <dgm:styleLbl name="node0">
+    <dgm:scene3d>
+      <a:camera prst="orthographicFront"/>
+      <a:lightRig rig="threePt" dir="t"/>
+    </dgm:scene3d>
+    <dgm:sp3d/>
+    <dgm:txPr/>
+    <dgm:style>
+      <a:lnRef idx="2">
+        <a:scrgbClr r="0" g="0" b="0"/>
+      </a:lnRef>
+      <a:fillRef idx="1">
+        <a:scrgbClr r="0" g="0" b="0"/>
+      </a:fillRef>
+      <a:effectRef idx="0">
+        <a:scrgbClr r="0" g="0" b="0"/>
+      </a:effectRef>
+      <a:fontRef idx="minor">
+        <a:schemeClr val="lt1"/>
+      </a:fontRef>
+    </dgm:style>
+  </dgm:styleLbl>
+  <dgm:styleLbl name="lnNode1">
+    <dgm:scene3d>
+      <a:camera prst="orthographicFront"/>
+      <a:lightRig rig="threePt" dir="t"/>
+    </dgm:scene3d>
+    <dgm:sp3d/>
+    <dgm:txPr/>
+    <dgm:style>
+      <a:lnRef idx="2">
+        <a:scrgbClr r="0" g="0" b="0"/>
+      </a:lnRef>
+      <a:fillRef idx="1">
+        <a:scrgbClr r="0" g="0" b="0"/>
+      </a:fillRef>
+      <a:effectRef idx="0">
+        <a:scrgbClr r="0" g="0" b="0"/>
+      </a:effectRef>
+      <a:fontRef idx="minor">
+        <a:schemeClr val="lt1"/>
+      </a:fontRef>
+    </dgm:style>
+  </dgm:styleLbl>
+  <dgm:styleLbl name="vennNode1">
+    <dgm:scene3d>
+      <a:camera prst="orthographicFront"/>
+      <a:lightRig rig="threePt" dir="t"/>
+    </dgm:scene3d>
+    <dgm:sp3d/>
+    <dgm:txPr/>
+    <dgm:style>
+      <a:lnRef idx="2">
+        <a:scrgbClr r="0" g="0" b="0"/>
+      </a:lnRef>
+      <a:fillRef idx="1">
+        <a:scrgbClr r="0" g="0" b="0"/>
+      </a:fillRef>
+      <a:effectRef idx="0">
+        <a:scrgbClr r="0" g="0" b="0"/>
+      </a:effectRef>
+      <a:fontRef idx="minor">
+        <a:schemeClr val="tx1"/>
+      </a:fontRef>
+    </dgm:style>
+  </dgm:styleLbl>
+  <dgm:styleLbl name="alignNode1">
+    <dgm:scene3d>
+      <a:camera prst="orthographicFront"/>
+      <a:lightRig rig="threePt" dir="t"/>
+    </dgm:scene3d>
+    <dgm:sp3d/>
+    <dgm:txPr/>
+    <dgm:style>
+      <a:lnRef idx="2">
+        <a:scrgbClr r="0" g="0" b="0"/>
+      </a:lnRef>
+      <a:fillRef idx="1">
+        <a:scrgbClr r="0" g="0" b="0"/>
+      </a:fillRef>
+      <a:effectRef idx="0">
+        <a:scrgbClr r="0" g="0" b="0"/>
+      </a:effectRef>
+      <a:fontRef idx="minor">
+        <a:schemeClr val="lt1"/>
+      </a:fontRef>
+    </dgm:style>
+  </dgm:styleLbl>
+  <dgm:styleLbl name="node1">
+    <dgm:scene3d>
+      <a:camera prst="orthographicFront"/>
+      <a:lightRig rig="threePt" dir="t"/>
+    </dgm:scene3d>
+    <dgm:sp3d/>
+    <dgm:txPr/>
+    <dgm:style>
+      <a:lnRef idx="2">
+        <a:scrgbClr r="0" g="0" b="0"/>
+      </a:lnRef>
+      <a:fillRef idx="1">
+        <a:scrgbClr r="0" g="0" b="0"/>
+      </a:fillRef>
+      <a:effectRef idx="0">
+        <a:scrgbClr r="0" g="0" b="0"/>
+      </a:effectRef>
+      <a:fontRef idx="minor">
+        <a:schemeClr val="lt1"/>
+      </a:fontRef>
+    </dgm:style>
+  </dgm:styleLbl>
+  <dgm:styleLbl name="node2">
+    <dgm:scene3d>
+      <a:camera prst="orthographicFront"/>
+      <a:lightRig rig="threePt" dir="t"/>
+    </dgm:scene3d>
+    <dgm:sp3d/>
+    <dgm:txPr/>
+    <dgm:style>
+      <a:lnRef idx="2">
+        <a:scrgbClr r="0" g="0" b="0"/>
+      </a:lnRef>
+      <a:fillRef idx="1">
+        <a:scrgbClr r="0" g="0" b="0"/>
+      </a:fillRef>
+      <a:effectRef idx="0">
+        <a:scrgbClr r="0" g="0" b="0"/>
+      </a:effectRef>
+      <a:fontRef idx="minor">
+        <a:schemeClr val="lt1"/>
+      </a:fontRef>
+    </dgm:style>
+  </dgm:styleLbl>
+  <dgm:styleLbl name="node3">
+    <dgm:scene3d>
+      <a:camera prst="orthographicFront"/>
+      <a:lightRig rig="threePt" dir="t"/>
+    </dgm:scene3d>
+    <dgm:sp3d/>
+    <dgm:txPr/>
+    <dgm:style>
+      <a:lnRef idx="2">
+        <a:scrgbClr r="0" g="0" b="0"/>
+      </a:lnRef>
+      <a:fillRef idx="1">
+        <a:scrgbClr r="0" g="0" b="0"/>
+      </a:fillRef>
+      <a:effectRef idx="0">
+        <a:scrgbClr r="0" g="0" b="0"/>
+      </a:effectRef>
+      <a:fontRef idx="minor">
+        <a:schemeClr val="lt1"/>
+      </a:fontRef>
+    </dgm:style>
+  </dgm:styleLbl>
+  <dgm:styleLbl name="node4">
+    <dgm:scene3d>
+      <a:camera prst="orthographicFront"/>
+      <a:lightRig rig="threePt" dir="t"/>
+    </dgm:scene3d>
+    <dgm:sp3d/>
+    <dgm:txPr/>
+    <dgm:style>
+      <a:lnRef idx="2">
+        <a:scrgbClr r="0" g="0" b="0"/>
+      </a:lnRef>
+      <a:fillRef idx="1">
+        <a:scrgbClr r="0" g="0" b="0"/>
+      </a:fillRef>
+      <a:effectRef idx="0">
+        <a:scrgbClr r="0" g="0" b="0"/>
+      </a:effectRef>
+      <a:fontRef idx="minor">
+        <a:schemeClr val="lt1"/>
+      </a:fontRef>
+    </dgm:style>
+  </dgm:styleLbl>
+  <dgm:styleLbl name="fgImgPlace1">
+    <dgm:scene3d>
+      <a:camera prst="orthographicFront"/>
+      <a:lightRig rig="threePt" dir="t"/>
+    </dgm:scene3d>
+    <dgm:sp3d/>
+    <dgm:txPr/>
+    <dgm:style>
+      <a:lnRef idx="2">
+        <a:scrgbClr r="0" g="0" b="0"/>
+      </a:lnRef>
+      <a:fillRef idx="1">
+        <a:scrgbClr r="0" g="0" b="0"/>
+      </a:fillRef>
+      <a:effectRef idx="0">
+        <a:scrgbClr r="0" g="0" b="0"/>
+      </a:effectRef>
+      <a:fontRef idx="minor"/>
+    </dgm:style>
+  </dgm:styleLbl>
+  <dgm:styleLbl name="alignImgPlace1">
+    <dgm:scene3d>
+      <a:camera prst="orthographicFront"/>
+      <a:lightRig rig="threePt" dir="t"/>
+    </dgm:scene3d>
+    <dgm:sp3d/>
+    <dgm:txPr/>
+    <dgm:style>
+      <a:lnRef idx="2">
+        <a:scrgbClr r="0" g="0" b="0"/>
+      </a:lnRef>
+      <a:fillRef idx="1">
+        <a:scrgbClr r="0" g="0" b="0"/>
+      </a:fillRef>
+      <a:effectRef idx="0">
+        <a:scrgbClr r="0" g="0" b="0"/>
+      </a:effectRef>
+      <a:fontRef idx="minor"/>
+    </dgm:style>
+  </dgm:styleLbl>
+  <dgm:styleLbl name="bgImgPlace1">
+    <dgm:scene3d>
+      <a:camera prst="orthographicFront"/>
+      <a:lightRig rig="threePt" dir="t"/>
+    </dgm:scene3d>
+    <dgm:sp3d/>
+    <dgm:txPr/>
+    <dgm:style>
+      <a:lnRef idx="2">
+        <a:scrgbClr r="0" g="0" b="0"/>
+      </a:lnRef>
+      <a:fillRef idx="1">
+        <a:scrgbClr r="0" g="0" b="0"/>
+      </a:fillRef>
+      <a:effectRef idx="0">
+        <a:scrgbClr r="0" g="0" b="0"/>
+      </a:effectRef>
+      <a:fontRef idx="minor"/>
+    </dgm:style>
+  </dgm:styleLbl>
+  <dgm:styleLbl name="sibTrans2D1">
+    <dgm:scene3d>
+      <a:camera prst="orthographicFront"/>
+      <a:lightRig rig="threePt" dir="t"/>
+    </dgm:scene3d>
+    <dgm:sp3d/>
+    <dgm:txPr/>
+    <dgm:style>
+      <a:lnRef idx="0">
+        <a:scrgbClr r="0" g="0" b="0"/>
+      </a:lnRef>
+      <a:fillRef idx="1">
+        <a:scrgbClr r="0" g="0" b="0"/>
+      </a:fillRef>
+      <a:effectRef idx="0">
+        <a:scrgbClr r="0" g="0" b="0"/>
+      </a:effectRef>
+      <a:fontRef idx="minor">
+        <a:schemeClr val="lt1"/>
+      </a:fontRef>
+    </dgm:style>
+  </dgm:styleLbl>
+  <dgm:styleLbl name="fgSibTrans2D1">
+    <dgm:scene3d>
+      <a:camera prst="orthographicFront"/>
+      <a:lightRig rig="threePt" dir="t"/>
+    </dgm:scene3d>
+    <dgm:sp3d/>
+    <dgm:txPr/>
+    <dgm:style>
+      <a:lnRef idx="0">
+        <a:scrgbClr r="0" g="0" b="0"/>
+      </a:lnRef>
+      <a:fillRef idx="1">
+        <a:scrgbClr r="0" g="0" b="0"/>
+      </a:fillRef>
+      <a:effectRef idx="0">
+        <a:scrgbClr r="0" g="0" b="0"/>
+      </a:effectRef>
+      <a:fontRef idx="minor">
+        <a:schemeClr val="lt1"/>
+      </a:fontRef>
+    </dgm:style>
+  </dgm:styleLbl>
+  <dgm:styleLbl name="bgSibTrans2D1">
+    <dgm:scene3d>
+      <a:camera prst="orthographicFront"/>
+      <a:lightRig rig="threePt" dir="t"/>
+    </dgm:scene3d>
+    <dgm:sp3d/>
+    <dgm:txPr/>
+    <dgm:style>
+      <a:lnRef idx="0">
+        <a:scrgbClr r="0" g="0" b="0"/>
+      </a:lnRef>
+      <a:fillRef idx="1">
+        <a:scrgbClr r="0" g="0" b="0"/>
+      </a:fillRef>
+      <a:effectRef idx="0">
+        <a:scrgbClr r="0" g="0" b="0"/>
+      </a:effectRef>
+      <a:fontRef idx="minor">
+        <a:schemeClr val="lt1"/>
+      </a:fontRef>
+    </dgm:style>
+  </dgm:styleLbl>
+  <dgm:styleLbl name="sibTrans1D1">
+    <dgm:scene3d>
+      <a:camera prst="orthographicFront"/>
+      <a:lightRig rig="threePt" dir="t"/>
+    </dgm:scene3d>
+    <dgm:sp3d/>
+    <dgm:txPr/>
+    <dgm:style>
+      <a:lnRef idx="1">
+        <a:scrgbClr r="0" g="0" b="0"/>
+      </a:lnRef>
+      <a:fillRef idx="0">
+        <a:scrgbClr r="0" g="0" b="0"/>
+      </a:fillRef>
+      <a:effectRef idx="0">
+        <a:scrgbClr r="0" g="0" b="0"/>
+      </a:effectRef>
+      <a:fontRef idx="minor"/>
+    </dgm:style>
+  </dgm:styleLbl>
+  <dgm:styleLbl name="callout">
+    <dgm:scene3d>
+      <a:camera prst="orthographicFront"/>
+      <a:lightRig rig="threePt" dir="t"/>
+    </dgm:scene3d>
+    <dgm:sp3d/>
+    <dgm:txPr/>
+    <dgm:style>
+      <a:lnRef idx="2">
+        <a:scrgbClr r="0" g="0" b="0"/>
+      </a:lnRef>
+      <a:fillRef idx="1">
+        <a:scrgbClr r="0" g="0" b="0"/>
+      </a:fillRef>
+      <a:effectRef idx="0">
+        <a:scrgbClr r="0" g="0" b="0"/>
+      </a:effectRef>
+      <a:fontRef idx="minor"/>
+    </dgm:style>
+  </dgm:styleLbl>
+  <dgm:styleLbl name="asst0">
+    <dgm:scene3d>
+      <a:camera prst="orthographicFront"/>
+      <a:lightRig rig="threePt" dir="t"/>
+    </dgm:scene3d>
+    <dgm:sp3d/>
+    <dgm:txPr/>
+    <dgm:style>
+      <a:lnRef idx="2">
+        <a:scrgbClr r="0" g="0" b="0"/>
+      </a:lnRef>
+      <a:fillRef idx="1">
+        <a:scrgbClr r="0" g="0" b="0"/>
+      </a:fillRef>
+      <a:effectRef idx="0">
+        <a:scrgbClr r="0" g="0" b="0"/>
+      </a:effectRef>
+      <a:fontRef idx="minor">
+        <a:schemeClr val="lt1"/>
+      </a:fontRef>
+    </dgm:style>
+  </dgm:styleLbl>
+  <dgm:styleLbl name="asst1">
+    <dgm:scene3d>
+      <a:camera prst="orthographicFront"/>
+      <a:lightRig rig="threePt" dir="t"/>
+    </dgm:scene3d>
+    <dgm:sp3d/>
+    <dgm:txPr/>
+    <dgm:style>
+      <a:lnRef idx="2">
+        <a:scrgbClr r="0" g="0" b="0"/>
+      </a:lnRef>
+      <a:fillRef idx="1">
+        <a:scrgbClr r="0" g="0" b="0"/>
+      </a:fillRef>
+      <a:effectRef idx="0">
+        <a:scrgbClr r="0" g="0" b="0"/>
+      </a:effectRef>
+      <a:fontRef idx="minor">
+        <a:schemeClr val="lt1"/>
+      </a:fontRef>
+    </dgm:style>
+  </dgm:styleLbl>
+  <dgm:styleLbl name="asst2">
+    <dgm:scene3d>
+      <a:camera prst="orthographicFront"/>
+      <a:lightRig rig="threePt" dir="t"/>
+    </dgm:scene3d>
+    <dgm:sp3d/>
+    <dgm:txPr/>
+    <dgm:style>
+      <a:lnRef idx="2">
+        <a:scrgbClr r="0" g="0" b="0"/>
+      </a:lnRef>
+      <a:fillRef idx="1">
+        <a:scrgbClr r="0" g="0" b="0"/>
+      </a:fillRef>
+      <a:effectRef idx="0">
+        <a:scrgbClr r="0" g="0" b="0"/>
+      </a:effectRef>
+      <a:fontRef idx="minor">
+        <a:schemeClr val="lt1"/>
+      </a:fontRef>
+    </dgm:style>
+  </dgm:styleLbl>
+  <dgm:styleLbl name="asst3">
+    <dgm:scene3d>
+      <a:camera prst="orthographicFront"/>
+      <a:lightRig rig="threePt" dir="t"/>
+    </dgm:scene3d>
+    <dgm:sp3d/>
+    <dgm:txPr/>
+    <dgm:style>
+      <a:lnRef idx="2">
+        <a:scrgbClr r="0" g="0" b="0"/>
+      </a:lnRef>
+      <a:fillRef idx="1">
+        <a:scrgbClr r="0" g="0" b="0"/>
+      </a:fillRef>
+      <a:effectRef idx="0">
+        <a:scrgbClr r="0" g="0" b="0"/>
+      </a:effectRef>
+      <a:fontRef idx="minor">
+        <a:schemeClr val="lt1"/>
+      </a:fontRef>
+    </dgm:style>
+  </dgm:styleLbl>
+  <dgm:styleLbl name="asst4">
+    <dgm:scene3d>
+      <a:camera prst="orthographicFront"/>
+      <a:lightRig rig="threePt" dir="t"/>
+    </dgm:scene3d>
+    <dgm:sp3d/>
+    <dgm:txPr/>
+    <dgm:style>
+      <a:lnRef idx="2">
+        <a:scrgbClr r="0" g="0" b="0"/>
+      </a:lnRef>
+      <a:fillRef idx="1">
+        <a:scrgbClr r="0" g="0" b="0"/>
+      </a:fillRef>
+      <a:effectRef idx="0">
+        <a:scrgbClr r="0" g="0" b="0"/>
+      </a:effectRef>
+      <a:fontRef idx="minor">
+        <a:schemeClr val="lt1"/>
+      </a:fontRef>
+    </dgm:style>
+  </dgm:styleLbl>
+  <dgm:styleLbl name="parChTrans2D1">
+    <dgm:scene3d>
+      <a:camera prst="orthographicFront"/>
+      <a:lightRig rig="threePt" dir="t"/>
+    </dgm:scene3d>
+    <dgm:sp3d/>
+    <dgm:txPr/>
+    <dgm:style>
+      <a:lnRef idx="2">
+        <a:scrgbClr r="0" g="0" b="0"/>
+      </a:lnRef>
+      <a:fillRef idx="1">
+        <a:scrgbClr r="0" g="0" b="0"/>
+      </a:fillRef>
+      <a:effectRef idx="0">
+        <a:scrgbClr r="0" g="0" b="0"/>
+      </a:effectRef>
+      <a:fontRef idx="minor">
+        <a:schemeClr val="lt1"/>
+      </a:fontRef>
+    </dgm:style>
+  </dgm:styleLbl>
+  <dgm:styleLbl name="parChTrans2D2">
+    <dgm:scene3d>
+      <a:camera prst="orthographicFront"/>
+      <a:lightRig rig="threePt" dir="t"/>
+    </dgm:scene3d>
+    <dgm:sp3d/>
+    <dgm:txPr/>
+    <dgm:style>
+      <a:lnRef idx="2">
+        <a:scrgbClr r="0" g="0" b="0"/>
+      </a:lnRef>
+      <a:fillRef idx="1">
+        <a:scrgbClr r="0" g="0" b="0"/>
+      </a:fillRef>
+      <a:effectRef idx="0">
+        <a:scrgbClr r="0" g="0" b="0"/>
+      </a:effectRef>
+      <a:fontRef idx="minor">
+        <a:schemeClr val="lt1"/>
+      </a:fontRef>
+    </dgm:style>
+  </dgm:styleLbl>
+  <dgm:styleLbl name="parChTrans2D3">
+    <dgm:scene3d>
+      <a:camera prst="orthographicFront"/>
+      <a:lightRig rig="threePt" dir="t"/>
+    </dgm:scene3d>
+    <dgm:sp3d/>
+    <dgm:txPr/>
+    <dgm:style>
+      <a:lnRef idx="2">
+        <a:scrgbClr r="0" g="0" b="0"/>
+      </a:lnRef>
+      <a:fillRef idx="1">
+        <a:scrgbClr r="0" g="0" b="0"/>
+      </a:fillRef>
+      <a:effectRef idx="0">
+        <a:scrgbClr r="0" g="0" b="0"/>
+      </a:effectRef>
+      <a:fontRef idx="minor">
+        <a:schemeClr val="lt1"/>
+      </a:fontRef>
+    </dgm:style>
+  </dgm:styleLbl>
+  <dgm:styleLbl name="parChTrans2D4">
+    <dgm:scene3d>
+      <a:camera prst="orthographicFront"/>
+      <a:lightRig rig="threePt" dir="t"/>
+    </dgm:scene3d>
+    <dgm:sp3d/>
+    <dgm:txPr/>
+    <dgm:style>
+      <a:lnRef idx="2">
+        <a:scrgbClr r="0" g="0" b="0"/>
+      </a:lnRef>
+      <a:fillRef idx="1">
+        <a:scrgbClr r="0" g="0" b="0"/>
+      </a:fillRef>
+      <a:effectRef idx="0">
+        <a:scrgbClr r="0" g="0" b="0"/>
+      </a:effectRef>
+      <a:fontRef idx="minor">
+        <a:schemeClr val="lt1"/>
+      </a:fontRef>
+    </dgm:style>
+  </dgm:styleLbl>
+  <dgm:styleLbl name="parChTrans1D1">
+    <dgm:scene3d>
+      <a:camera prst="orthographicFront"/>
+      <a:lightRig rig="threePt" dir="t"/>
+    </dgm:scene3d>
+    <dgm:sp3d/>
+    <dgm:txPr/>
+    <dgm:style>
+      <a:lnRef idx="2">
+        <a:scrgbClr r="0" g="0" b="0"/>
+      </a:lnRef>
+      <a:fillRef idx="0">
+        <a:scrgbClr r="0" g="0" b="0"/>
+      </a:fillRef>
+      <a:effectRef idx="0">
+        <a:scrgbClr r="0" g="0" b="0"/>
+      </a:effectRef>
+      <a:fontRef idx="minor"/>
+    </dgm:style>
+  </dgm:styleLbl>
+  <dgm:styleLbl name="parChTrans1D2">
+    <dgm:scene3d>
+      <a:camera prst="orthographicFront"/>
+      <a:lightRig rig="threePt" dir="t"/>
+    </dgm:scene3d>
+    <dgm:sp3d/>
+    <dgm:txPr/>
+    <dgm:style>
+      <a:lnRef idx="2">
+        <a:scrgbClr r="0" g="0" b="0"/>
+      </a:lnRef>
+      <a:fillRef idx="0">
+        <a:scrgbClr r="0" g="0" b="0"/>
+      </a:fillRef>
+      <a:effectRef idx="0">
+        <a:scrgbClr r="0" g="0" b="0"/>
+      </a:effectRef>
+      <a:fontRef idx="minor"/>
+    </dgm:style>
+  </dgm:styleLbl>
+  <dgm:styleLbl name="parChTrans1D3">
+    <dgm:scene3d>
+      <a:camera prst="orthographicFront"/>
+      <a:lightRig rig="threePt" dir="t"/>
+    </dgm:scene3d>
+    <dgm:sp3d/>
+    <dgm:txPr/>
+    <dgm:style>
+      <a:lnRef idx="2">
+        <a:scrgbClr r="0" g="0" b="0"/>
+      </a:lnRef>
+      <a:fillRef idx="0">
+        <a:scrgbClr r="0" g="0" b="0"/>
+      </a:fillRef>
+      <a:effectRef idx="0">
+        <a:scrgbClr r="0" g="0" b="0"/>
+      </a:effectRef>
+      <a:fontRef idx="minor"/>
+    </dgm:style>
+  </dgm:styleLbl>
+  <dgm:styleLbl name="parChTrans1D4">
+    <dgm:scene3d>
+      <a:camera prst="orthographicFront"/>
+      <a:lightRig rig="threePt" dir="t"/>
+    </dgm:scene3d>
+    <dgm:sp3d/>
+    <dgm:txPr/>
+    <dgm:style>
+      <a:lnRef idx="2">
+        <a:scrgbClr r="0" g="0" b="0"/>
+      </a:lnRef>
+      <a:fillRef idx="0">
+        <a:scrgbClr r="0" g="0" b="0"/>
+      </a:fillRef>
+      <a:effectRef idx="0">
+        <a:scrgbClr r="0" g="0" b="0"/>
+      </a:effectRef>
+      <a:fontRef idx="minor"/>
+    </dgm:style>
+  </dgm:styleLbl>
+  <dgm:styleLbl name="fgAcc1">
+    <dgm:scene3d>
+      <a:camera prst="orthographicFront"/>
+      <a:lightRig rig="threePt" dir="t"/>
+    </dgm:scene3d>
+    <dgm:sp3d/>
+    <dgm:txPr/>
+    <dgm:style>
+      <a:lnRef idx="2">
+        <a:scrgbClr r="0" g="0" b="0"/>
+      </a:lnRef>
+      <a:fillRef idx="1">
+        <a:scrgbClr r="0" g="0" b="0"/>
+      </a:fillRef>
+      <a:effectRef idx="0">
+        <a:scrgbClr r="0" g="0" b="0"/>
+      </a:effectRef>
+      <a:fontRef idx="minor"/>
+    </dgm:style>
+  </dgm:styleLbl>
+  <dgm:styleLbl name="conFgAcc1">
+    <dgm:scene3d>
+      <a:camera prst="orthographicFront"/>
+      <a:lightRig rig="threePt" dir="t"/>
+    </dgm:scene3d>
+    <dgm:sp3d/>
+    <dgm:txPr/>
+    <dgm:style>
+      <a:lnRef idx="2">
+        <a:scrgbClr r="0" g="0" b="0"/>
+      </a:lnRef>
+      <a:fillRef idx="1">
+        <a:scrgbClr r="0" g="0" b="0"/>
+      </a:fillRef>
+      <a:effectRef idx="0">
+        <a:scrgbClr r="0" g="0" b="0"/>
+      </a:effectRef>
+      <a:fontRef idx="minor"/>
+    </dgm:style>
+  </dgm:styleLbl>
+  <dgm:styleLbl name="alignAcc1">
+    <dgm:scene3d>
+      <a:camera prst="orthographicFront"/>
+      <a:lightRig rig="threePt" dir="t"/>
+    </dgm:scene3d>
+    <dgm:sp3d/>
+    <dgm:txPr/>
+    <dgm:style>
+      <a:lnRef idx="2">
+        <a:scrgbClr r="0" g="0" b="0"/>
+      </a:lnRef>
+      <a:fillRef idx="1">
+        <a:scrgbClr r="0" g="0" b="0"/>
+      </a:fillRef>
+      <a:effectRef idx="0">
+        <a:scrgbClr r="0" g="0" b="0"/>
+      </a:effectRef>
+      <a:fontRef idx="minor"/>
+    </dgm:style>
+  </dgm:styleLbl>
+  <dgm:styleLbl name="trAlignAcc1">
+    <dgm:scene3d>
+      <a:camera prst="orthographicFront"/>
+      <a:lightRig rig="threePt" dir="t"/>
+    </dgm:scene3d>
+    <dgm:sp3d/>
+    <dgm:txPr/>
+    <dgm:style>
+      <a:lnRef idx="1">
+        <a:scrgbClr r="0" g="0" b="0"/>
+      </a:lnRef>
+      <a:fillRef idx="1">
+        <a:scrgbClr r="0" g="0" b="0"/>
+      </a:fillRef>
+      <a:effectRef idx="0">
+        <a:scrgbClr r="0" g="0" b="0"/>
+      </a:effectRef>
+      <a:fontRef idx="minor"/>
+    </dgm:style>
+  </dgm:styleLbl>
+  <dgm:styleLbl name="bgAcc1">
+    <dgm:scene3d>
+      <a:camera prst="orthographicFront"/>
+      <a:lightRig rig="threePt" dir="t"/>
+    </dgm:scene3d>
+    <dgm:sp3d/>
+    <dgm:txPr/>
+    <dgm:style>
+      <a:lnRef idx="2">
+        <a:scrgbClr r="0" g="0" b="0"/>
+      </a:lnRef>
+      <a:fillRef idx="1">
+        <a:scrgbClr r="0" g="0" b="0"/>
+      </a:fillRef>
+      <a:effectRef idx="0">
+        <a:scrgbClr r="0" g="0" b="0"/>
+      </a:effectRef>
+      <a:fontRef idx="minor"/>
+    </dgm:style>
+  </dgm:styleLbl>
+  <dgm:styleLbl name="solidFgAcc1">
+    <dgm:scene3d>
+      <a:camera prst="orthographicFront"/>
+      <a:lightRig rig="threePt" dir="t"/>
+    </dgm:scene3d>
+    <dgm:sp3d/>
+    <dgm:txPr/>
+    <dgm:style>
+      <a:lnRef idx="2">
+        <a:scrgbClr r="0" g="0" b="0"/>
+      </a:lnRef>
+      <a:fillRef idx="1">
+        <a:scrgbClr r="0" g="0" b="0"/>
+      </a:fillRef>
+      <a:effectRef idx="0">
+        <a:scrgbClr r="0" g="0" b="0"/>
+      </a:effectRef>
+      <a:fontRef idx="minor"/>
+    </dgm:style>
+  </dgm:styleLbl>
+  <dgm:styleLbl name="solidAlignAcc1">
+    <dgm:scene3d>
+      <a:camera prst="orthographicFront"/>
+      <a:lightRig rig="threePt" dir="t"/>
+    </dgm:scene3d>
+    <dgm:sp3d/>
+    <dgm:txPr/>
+    <dgm:style>
+      <a:lnRef idx="2">
+        <a:scrgbClr r="0" g="0" b="0"/>
+      </a:lnRef>
+      <a:fillRef idx="1">
+        <a:scrgbClr r="0" g="0" b="0"/>
+      </a:fillRef>
+      <a:effectRef idx="0">
+        <a:scrgbClr r="0" g="0" b="0"/>
+      </a:effectRef>
+      <a:fontRef idx="minor"/>
+    </dgm:style>
+  </dgm:styleLbl>
+  <dgm:styleLbl name="solidBgAcc1">
+    <dgm:scene3d>
+      <a:camera prst="orthographicFront"/>
+      <a:lightRig rig="threePt" dir="t"/>
+    </dgm:scene3d>
+    <dgm:sp3d/>
+    <dgm:txPr/>
+    <dgm:style>
+      <a:lnRef idx="2">
+        <a:scrgbClr r="0" g="0" b="0"/>
+      </a:lnRef>
+      <a:fillRef idx="1">
+        <a:scrgbClr r="0" g="0" b="0"/>
+      </a:fillRef>
+      <a:effectRef idx="0">
+        <a:scrgbClr r="0" g="0" b="0"/>
+      </a:effectRef>
+      <a:fontRef idx="minor"/>
+    </dgm:style>
+  </dgm:styleLbl>
+  <dgm:styleLbl name="fgAccFollowNode1">
+    <dgm:scene3d>
+      <a:camera prst="orthographicFront"/>
+      <a:lightRig rig="threePt" dir="t"/>
+    </dgm:scene3d>
+    <dgm:sp3d/>
+    <dgm:txPr/>
+    <dgm:style>
+      <a:lnRef idx="2">
+        <a:scrgbClr r="0" g="0" b="0"/>
+      </a:lnRef>
+      <a:fillRef idx="1">
+        <a:scrgbClr r="0" g="0" b="0"/>
+      </a:fillRef>
+      <a:effectRef idx="0">
+        <a:scrgbClr r="0" g="0" b="0"/>
+      </a:effectRef>
+      <a:fontRef idx="minor"/>
+    </dgm:style>
+  </dgm:styleLbl>
+  <dgm:styleLbl name="alignAccFollowNode1">
+    <dgm:scene3d>
+      <a:camera prst="orthographicFront"/>
+      <a:lightRig rig="threePt" dir="t"/>
+    </dgm:scene3d>
+    <dgm:sp3d/>
+    <dgm:txPr/>
+    <dgm:style>
+      <a:lnRef idx="2">
+        <a:scrgbClr r="0" g="0" b="0"/>
+      </a:lnRef>
+      <a:fillRef idx="1">
+        <a:scrgbClr r="0" g="0" b="0"/>
+      </a:fillRef>
+      <a:effectRef idx="0">
+        <a:scrgbClr r="0" g="0" b="0"/>
+      </a:effectRef>
+      <a:fontRef idx="minor"/>
+    </dgm:style>
+  </dgm:styleLbl>
+  <dgm:styleLbl name="bgAccFollowNode1">
+    <dgm:scene3d>
+      <a:camera prst="orthographicFront"/>
+      <a:lightRig rig="threePt" dir="t"/>
+    </dgm:scene3d>
+    <dgm:sp3d/>
+    <dgm:txPr/>
+    <dgm:style>
+      <a:lnRef idx="2">
+        <a:scrgbClr r="0" g="0" b="0"/>
+      </a:lnRef>
+      <a:fillRef idx="1">
+        <a:scrgbClr r="0" g="0" b="0"/>
+      </a:fillRef>
+      <a:effectRef idx="0">
+        <a:scrgbClr r="0" g="0" b="0"/>
+      </a:effectRef>
+      <a:fontRef idx="minor"/>
+    </dgm:style>
+  </dgm:styleLbl>
+  <dgm:styleLbl name="fgAcc0">
+    <dgm:scene3d>
+      <a:camera prst="orthographicFront"/>
+      <a:lightRig rig="threePt" dir="t"/>
+    </dgm:scene3d>
+    <dgm:sp3d/>
+    <dgm:txPr/>
+    <dgm:style>
+      <a:lnRef idx="2">
+        <a:scrgbClr r="0" g="0" b="0"/>
+      </a:lnRef>
+      <a:fillRef idx="1">
+        <a:scrgbClr r="0" g="0" b="0"/>
+      </a:fillRef>
+      <a:effectRef idx="0">
+        <a:scrgbClr r="0" g="0" b="0"/>
+      </a:effectRef>
+      <a:fontRef idx="minor"/>
+    </dgm:style>
+  </dgm:styleLbl>
+  <dgm:styleLbl name="fgAcc2">
+    <dgm:scene3d>
+      <a:camera prst="orthographicFront"/>
+      <a:lightRig rig="threePt" dir="t"/>
+    </dgm:scene3d>
+    <dgm:sp3d/>
+    <dgm:txPr/>
+    <dgm:style>
+      <a:lnRef idx="2">
+        <a:scrgbClr r="0" g="0" b="0"/>
+      </a:lnRef>
+      <a:fillRef idx="1">
+        <a:scrgbClr r="0" g="0" b="0"/>
+      </a:fillRef>
+      <a:effectRef idx="0">
+        <a:scrgbClr r="0" g="0" b="0"/>
+      </a:effectRef>
+      <a:fontRef idx="minor"/>
+    </dgm:style>
+  </dgm:styleLbl>
+  <dgm:styleLbl name="fgAcc3">
+    <dgm:scene3d>
+      <a:camera prst="orthographicFront"/>
+      <a:lightRig rig="threePt" dir="t"/>
+    </dgm:scene3d>
+    <dgm:sp3d/>
+    <dgm:txPr/>
+    <dgm:style>
+      <a:lnRef idx="2">
+        <a:scrgbClr r="0" g="0" b="0"/>
+      </a:lnRef>
+      <a:fillRef idx="1">
+        <a:scrgbClr r="0" g="0" b="0"/>
+      </a:fillRef>
+      <a:effectRef idx="0">
+        <a:scrgbClr r="0" g="0" b="0"/>
+      </a:effectRef>
+      <a:fontRef idx="minor"/>
+    </dgm:style>
+  </dgm:styleLbl>
+  <dgm:styleLbl name="fgAcc4">
+    <dgm:scene3d>
+      <a:camera prst="orthographicFront"/>
+      <a:lightRig rig="threePt" dir="t"/>
+    </dgm:scene3d>
+    <dgm:sp3d/>
+    <dgm:txPr/>
+    <dgm:style>
+      <a:lnRef idx="2">
+        <a:scrgbClr r="0" g="0" b="0"/>
+      </a:lnRef>
+      <a:fillRef idx="1">
+        <a:scrgbClr r="0" g="0" b="0"/>
+      </a:fillRef>
+      <a:effectRef idx="0">
+        <a:scrgbClr r="0" g="0" b="0"/>
+      </a:effectRef>
+      <a:fontRef idx="minor"/>
+    </dgm:style>
+  </dgm:styleLbl>
+  <dgm:styleLbl name="bgShp">
+    <dgm:scene3d>
+      <a:camera prst="orthographicFront"/>
+      <a:lightRig rig="threePt" dir="t"/>
+    </dgm:scene3d>
+    <dgm:sp3d/>
+    <dgm:txPr/>
+    <dgm:style>
+      <a:lnRef idx="0">
+        <a:scrgbClr r="0" g="0" b="0"/>
+      </a:lnRef>
+      <a:fillRef idx="1">
+        <a:scrgbClr r="0" g="0" b="0"/>
+      </a:fillRef>
+      <a:effectRef idx="0">
+        <a:scrgbClr r="0" g="0" b="0"/>
+      </a:effectRef>
+      <a:fontRef idx="minor"/>
+    </dgm:style>
+  </dgm:styleLbl>
+  <dgm:styleLbl name="dkBgShp">
+    <dgm:scene3d>
+      <a:camera prst="orthographicFront"/>
+      <a:lightRig rig="threePt" dir="t"/>
+    </dgm:scene3d>
+    <dgm:sp3d/>
+    <dgm:txPr/>
+    <dgm:style>
+      <a:lnRef idx="0">
+        <a:scrgbClr r="0" g="0" b="0"/>
+      </a:lnRef>
+      <a:fillRef idx="1">
+        <a:scrgbClr r="0" g="0" b="0"/>
+      </a:fillRef>
+      <a:effectRef idx="0">
+        <a:scrgbClr r="0" g="0" b="0"/>
+      </a:effectRef>
+      <a:fontRef idx="minor"/>
+    </dgm:style>
+  </dgm:styleLbl>
+  <dgm:styleLbl name="trBgShp">
+    <dgm:scene3d>
+      <a:camera prst="orthographicFront"/>
+      <a:lightRig rig="threePt" dir="t"/>
+    </dgm:scene3d>
+    <dgm:sp3d/>
+    <dgm:txPr/>
+    <dgm:style>
+      <a:lnRef idx="0">
+        <a:scrgbClr r="0" g="0" b="0"/>
+      </a:lnRef>
+      <a:fillRef idx="1">
+        <a:scrgbClr r="0" g="0" b="0"/>
+      </a:fillRef>
+      <a:effectRef idx="0">
+        <a:scrgbClr r="0" g="0" b="0"/>
+      </a:effectRef>
+      <a:fontRef idx="minor"/>
+    </dgm:style>
+  </dgm:styleLbl>
+  <dgm:styleLbl name="fgShp">
+    <dgm:scene3d>
+      <a:camera prst="orthographicFront"/>
+      <a:lightRig rig="threePt" dir="t"/>
+    </dgm:scene3d>
+    <dgm:sp3d/>
+    <dgm:txPr/>
+    <dgm:style>
+      <a:lnRef idx="2">
+        <a:scrgbClr r="0" g="0" b="0"/>
+      </a:lnRef>
+      <a:fillRef idx="1">
+        <a:scrgbClr r="0" g="0" b="0"/>
+      </a:fillRef>
+      <a:effectRef idx="0">
+        <a:scrgbClr r="0" g="0" b="0"/>
+      </a:effectRef>
+      <a:fontRef idx="minor"/>
+    </dgm:style>
+  </dgm:styleLbl>
+  <dgm:styleLbl name="revTx">
+    <dgm:scene3d>
+      <a:camera prst="orthographicFront"/>
+      <a:lightRig rig="threePt" dir="t"/>
+    </dgm:scene3d>
+    <dgm:sp3d/>
+    <dgm:txPr/>
+    <dgm:style>
+      <a:lnRef idx="0">
+        <a:scrgbClr r="0" g="0" b="0"/>
+      </a:lnRef>
+      <a:fillRef idx="0">
+        <a:scrgbClr r="0" g="0" b="0"/>
+      </a:fillRef>
+      <a:effectRef idx="0">
+        <a:scrgbClr r="0" g="0" b="0"/>
+      </a:effectRef>
+      <a:fontRef idx="minor"/>
+    </dgm:style>
+  </dgm:styleLbl>
+</dgm:styleDef>
+</file>
+
 <file path=ppt/slideLayouts/slideLayout1.xml><?xml version="1.0" encoding="utf-8"?>
 <p:sldLayout xmlns:a="http://schemas.openxmlformats.org/drawingml/2006/main" xmlns:r="http://schemas.openxmlformats.org/officeDocument/2006/relationships" xmlns:p="http://schemas.openxmlformats.org/presentationml/2006/main" showMasterSp="0" type="title" preserve="1">
   <p:cSld name="Title Slide">
@@ -450,7 +4649,7 @@
             <a:fld id="{5923F103-BC34-4FE4-A40E-EDDEECFDA5D0}" type="datetimeFigureOut">
               <a:rPr lang="en-US" dirty="0"/>
               <a:pPr/>
-              <a:t>3/2/2017</a:t>
+              <a:t>3/10/2017</a:t>
             </a:fld>
             <a:endParaRPr lang="en-US" dirty="0"/>
           </a:p>
@@ -1538,7 +5737,7 @@
           <a:p>
             <a:fld id="{923A1CC3-2375-41D4-9E03-427CAF2A4C1A}" type="datetimeFigureOut">
               <a:rPr lang="en-US" dirty="0"/>
-              <a:t>3/2/2017</a:t>
+              <a:t>3/10/2017</a:t>
             </a:fld>
             <a:endParaRPr lang="en-US" dirty="0"/>
           </a:p>
@@ -2518,7 +6717,7 @@
           <a:p>
             <a:fld id="{AFF16868-8199-4C2C-A5B1-63AEE139F88E}" type="datetimeFigureOut">
               <a:rPr lang="en-US" dirty="0"/>
-              <a:t>3/2/2017</a:t>
+              <a:t>3/10/2017</a:t>
             </a:fld>
             <a:endParaRPr lang="en-US" dirty="0"/>
           </a:p>
@@ -3652,7 +7851,7 @@
           <a:p>
             <a:fld id="{AAD9FF7F-6988-44CC-821B-644E70CD2F73}" type="datetimeFigureOut">
               <a:rPr lang="en-US" dirty="0"/>
-              <a:t>3/2/2017</a:t>
+              <a:t>3/10/2017</a:t>
             </a:fld>
             <a:endParaRPr lang="en-US" dirty="0"/>
           </a:p>
@@ -4685,7 +8884,7 @@
           <a:p>
             <a:fld id="{5C12C299-16B2-4475-990D-751901EACC14}" type="datetimeFigureOut">
               <a:rPr lang="en-US" dirty="0"/>
-              <a:t>3/2/2017</a:t>
+              <a:t>3/10/2017</a:t>
             </a:fld>
             <a:endParaRPr lang="en-US" dirty="0"/>
           </a:p>
@@ -5345,7 +9544,7 @@
           <a:p>
             <a:fld id="{9FE86839-B9D8-4651-8783-F325ECE74E65}" type="datetimeFigureOut">
               <a:rPr lang="en-US" dirty="0"/>
-              <a:t>3/2/2017</a:t>
+              <a:t>3/10/2017</a:t>
             </a:fld>
             <a:endParaRPr lang="en-US" dirty="0"/>
           </a:p>
@@ -6206,7 +10405,7 @@
           <a:p>
             <a:fld id="{FD484F64-32F6-45C5-931F-ADC1662401D0}" type="datetimeFigureOut">
               <a:rPr lang="en-US" dirty="0"/>
-              <a:t>3/2/2017</a:t>
+              <a:t>3/10/2017</a:t>
             </a:fld>
             <a:endParaRPr lang="en-US" dirty="0"/>
           </a:p>
@@ -6396,7 +10595,7 @@
           <a:p>
             <a:fld id="{53086D93-FCAC-47E0-A2EE-787E62CA814C}" type="datetimeFigureOut">
               <a:rPr lang="en-US" dirty="0"/>
-              <a:t>3/2/2017</a:t>
+              <a:t>3/10/2017</a:t>
             </a:fld>
             <a:endParaRPr lang="en-US" dirty="0"/>
           </a:p>
@@ -7368,7 +11567,7 @@
           <a:p>
             <a:fld id="{CDA879A6-0FD0-4734-A311-86BFCA472E6E}" type="datetimeFigureOut">
               <a:rPr lang="en-US" dirty="0"/>
-              <a:t>3/2/2017</a:t>
+              <a:t>3/10/2017</a:t>
             </a:fld>
             <a:endParaRPr lang="en-US" dirty="0"/>
           </a:p>
@@ -7579,7 +11778,7 @@
           <a:p>
             <a:fld id="{19C9CA7B-DFD4-44B5-8C60-D14B8CD1FB59}" type="datetimeFigureOut">
               <a:rPr lang="en-US" dirty="0"/>
-              <a:t>3/2/2017</a:t>
+              <a:t>3/10/2017</a:t>
             </a:fld>
             <a:endParaRPr lang="en-US" dirty="0"/>
           </a:p>
@@ -8613,7 +12812,7 @@
           <a:p>
             <a:fld id="{F34E6425-0181-43F2-84FC-787E803FD2F8}" type="datetimeFigureOut">
               <a:rPr lang="en-US" dirty="0"/>
-              <a:t>3/2/2017</a:t>
+              <a:t>3/10/2017</a:t>
             </a:fld>
             <a:endParaRPr lang="en-US" dirty="0"/>
           </a:p>
@@ -8885,7 +13084,7 @@
           <a:p>
             <a:fld id="{3BDB8791-F1B0-41E7-B7FD-A781E65C4266}" type="datetimeFigureOut">
               <a:rPr lang="en-US" dirty="0"/>
-              <a:t>3/2/2017</a:t>
+              <a:t>3/10/2017</a:t>
             </a:fld>
             <a:endParaRPr lang="en-US" dirty="0"/>
           </a:p>
@@ -9295,7 +13494,7 @@
           <a:p>
             <a:fld id="{5FDD63B2-E120-4ED8-B27B-C685F510A5FE}" type="datetimeFigureOut">
               <a:rPr lang="en-US" dirty="0"/>
-              <a:t>3/2/2017</a:t>
+              <a:t>3/10/2017</a:t>
             </a:fld>
             <a:endParaRPr lang="en-US" dirty="0"/>
           </a:p>
@@ -9422,7 +13621,7 @@
           <a:p>
             <a:fld id="{7AA18ACC-A947-437B-A130-35BD54FDF1E9}" type="datetimeFigureOut">
               <a:rPr lang="en-US" dirty="0"/>
-              <a:t>3/2/2017</a:t>
+              <a:t>3/10/2017</a:t>
             </a:fld>
             <a:endParaRPr lang="en-US" dirty="0"/>
           </a:p>
@@ -9517,7 +13716,7 @@
           <a:p>
             <a:fld id="{7C8D7E02-BCB8-4D50-A234-369438C08659}" type="datetimeFigureOut">
               <a:rPr lang="en-US" dirty="0"/>
-              <a:t>3/2/2017</a:t>
+              <a:t>3/10/2017</a:t>
             </a:fld>
             <a:endParaRPr lang="en-US" dirty="0"/>
           </a:p>
@@ -10598,7 +14797,7 @@
           <a:p>
             <a:fld id="{76E86A4C-8E40-4F87-A4F0-01A0687C5742}" type="datetimeFigureOut">
               <a:rPr lang="en-US" dirty="0"/>
-              <a:t>3/2/2017</a:t>
+              <a:t>3/10/2017</a:t>
             </a:fld>
             <a:endParaRPr lang="en-US" dirty="0"/>
           </a:p>
@@ -11706,7 +15905,7 @@
           <a:p>
             <a:fld id="{35E72C73-2D91-4E12-BA25-F0AA0C03599B}" type="datetimeFigureOut">
               <a:rPr lang="en-US" dirty="0"/>
-              <a:t>3/2/2017</a:t>
+              <a:t>3/10/2017</a:t>
             </a:fld>
             <a:endParaRPr lang="en-US" dirty="0"/>
           </a:p>
@@ -12703,7 +16902,7 @@
           <a:p>
             <a:fld id="{2BE451C3-0FF4-47C4-B829-773ADF60F88C}" type="datetimeFigureOut">
               <a:rPr lang="en-US" dirty="0"/>
-              <a:t>3/2/2017</a:t>
+              <a:t>3/10/2017</a:t>
             </a:fld>
             <a:endParaRPr lang="en-US" dirty="0"/>
           </a:p>
@@ -13554,14 +17753,14 @@
           <p:nvPr>
             <p:extLst>
               <p:ext uri="{D42A27DB-BD31-4B8C-83A1-F6EECF244321}">
-                <p14:modId xmlns:p14="http://schemas.microsoft.com/office/powerpoint/2010/main" val="3295495594"/>
+                <p14:modId xmlns:p14="http://schemas.microsoft.com/office/powerpoint/2010/main" val="1289717139"/>
               </p:ext>
             </p:extLst>
           </p:nvPr>
         </p:nvGraphicFramePr>
         <p:xfrm>
           <a:off x="1471660" y="4452767"/>
-          <a:ext cx="8128000" cy="1112520"/>
+          <a:ext cx="8128000" cy="1381760"/>
         </p:xfrm>
         <a:graphic>
           <a:graphicData uri="http://schemas.openxmlformats.org/drawingml/2006/table">
@@ -13607,6 +17806,12 @@
                       <a:r>
                         <a:rPr lang="en-US" dirty="0"/>
                         <a:t>Column 2 Header</a:t>
+                      </a:r>
+                    </a:p>
+                    <a:p>
+                      <a:r>
+                        <a:rPr lang="en-US" dirty="0"/>
+                        <a:t>Here’s a second row</a:t>
                       </a:r>
                     </a:p>
                   </a:txBody>
@@ -13686,6 +17891,108 @@
     <p:extLst>
       <p:ext uri="{BB962C8B-B14F-4D97-AF65-F5344CB8AC3E}">
         <p14:creationId xmlns:p14="http://schemas.microsoft.com/office/powerpoint/2010/main" val="1407099305"/>
+      </p:ext>
+    </p:extLst>
+  </p:cSld>
+  <p:clrMapOvr>
+    <a:masterClrMapping/>
+  </p:clrMapOvr>
+</p:sld>
+</file>
+
+<file path=ppt/slides/slide4.xml><?xml version="1.0" encoding="utf-8"?>
+<p:sld xmlns:a="http://schemas.openxmlformats.org/drawingml/2006/main" xmlns:r="http://schemas.openxmlformats.org/officeDocument/2006/relationships" xmlns:p="http://schemas.openxmlformats.org/presentationml/2006/main">
+  <p:cSld>
+    <p:spTree>
+      <p:nvGrpSpPr>
+        <p:cNvPr id="1" name=""/>
+        <p:cNvGrpSpPr/>
+        <p:nvPr/>
+      </p:nvGrpSpPr>
+      <p:grpSpPr>
+        <a:xfrm>
+          <a:off x="0" y="0"/>
+          <a:ext cx="0" cy="0"/>
+          <a:chOff x="0" y="0"/>
+          <a:chExt cx="0" cy="0"/>
+        </a:xfrm>
+      </p:grpSpPr>
+      <p:sp>
+        <p:nvSpPr>
+          <p:cNvPr id="2" name="Title 1"/>
+          <p:cNvSpPr>
+            <a:spLocks noGrp="1"/>
+          </p:cNvSpPr>
+          <p:nvPr>
+            <p:ph type="title"/>
+          </p:nvPr>
+        </p:nvSpPr>
+        <p:spPr/>
+        <p:txBody>
+          <a:bodyPr/>
+          <a:lstStyle/>
+          <a:p>
+            <a:r>
+              <a:rPr lang="en-US" dirty="0"/>
+              <a:t>Slide 4</a:t>
+            </a:r>
+          </a:p>
+        </p:txBody>
+      </p:sp>
+      <p:graphicFrame>
+        <p:nvGraphicFramePr>
+          <p:cNvPr id="5" name="Content Placeholder 4"/>
+          <p:cNvGraphicFramePr>
+            <a:graphicFrameLocks noGrp="1"/>
+          </p:cNvGraphicFramePr>
+          <p:nvPr>
+            <p:ph sz="half" idx="1"/>
+            <p:extLst>
+              <p:ext uri="{D42A27DB-BD31-4B8C-83A1-F6EECF244321}">
+                <p14:modId xmlns:p14="http://schemas.microsoft.com/office/powerpoint/2010/main" val="2624885280"/>
+              </p:ext>
+            </p:extLst>
+          </p:nvPr>
+        </p:nvGraphicFramePr>
+        <p:xfrm>
+          <a:off x="1155700" y="2603500"/>
+          <a:ext cx="4824413" cy="3416300"/>
+        </p:xfrm>
+        <a:graphic>
+          <a:graphicData uri="http://schemas.openxmlformats.org/drawingml/2006/diagram">
+            <dgm:relIds xmlns:dgm="http://schemas.openxmlformats.org/drawingml/2006/diagram" xmlns:r="http://schemas.openxmlformats.org/officeDocument/2006/relationships" r:dm="rId2" r:lo="rId3" r:qs="rId4" r:cs="rId5"/>
+          </a:graphicData>
+        </a:graphic>
+      </p:graphicFrame>
+      <p:graphicFrame>
+        <p:nvGraphicFramePr>
+          <p:cNvPr id="8" name="Content Placeholder 7"/>
+          <p:cNvGraphicFramePr>
+            <a:graphicFrameLocks noGrp="1"/>
+          </p:cNvGraphicFramePr>
+          <p:nvPr>
+            <p:ph sz="half" idx="2"/>
+            <p:extLst>
+              <p:ext uri="{D42A27DB-BD31-4B8C-83A1-F6EECF244321}">
+                <p14:modId xmlns:p14="http://schemas.microsoft.com/office/powerpoint/2010/main" val="3120787803"/>
+              </p:ext>
+            </p:extLst>
+          </p:nvPr>
+        </p:nvGraphicFramePr>
+        <p:xfrm>
+          <a:off x="6208713" y="2603500"/>
+          <a:ext cx="4824412" cy="3416300"/>
+        </p:xfrm>
+        <a:graphic>
+          <a:graphicData uri="http://schemas.openxmlformats.org/drawingml/2006/chart">
+            <c:chart xmlns:c="http://schemas.openxmlformats.org/drawingml/2006/chart" xmlns:r="http://schemas.openxmlformats.org/officeDocument/2006/relationships" r:id="rId7"/>
+          </a:graphicData>
+        </a:graphic>
+      </p:graphicFrame>
+    </p:spTree>
+    <p:extLst>
+      <p:ext uri="{BB962C8B-B14F-4D97-AF65-F5344CB8AC3E}">
+        <p14:creationId xmlns:p14="http://schemas.microsoft.com/office/powerpoint/2010/main" val="1245730438"/>
       </p:ext>
     </p:extLst>
   </p:cSld>

</xml_diff>

<commit_message>
Added testing, fleshed out example files
</commit_message>
<xml_diff>
--- a/inst/extdata/example.pptx
+++ b/inst/extdata/example.pptx
@@ -4,6 +4,9 @@
   <p:sldMasterIdLst>
     <p:sldMasterId id="2147483648" r:id="rId1"/>
   </p:sldMasterIdLst>
+  <p:notesMasterIdLst>
+    <p:notesMasterId r:id="rId7"/>
+  </p:notesMasterIdLst>
   <p:sldIdLst>
     <p:sldId id="256" r:id="rId2"/>
     <p:sldId id="257" r:id="rId3"/>
@@ -114,6 +117,18 @@
     </p:ext>
   </p:extLst>
 </p:presentation>
+</file>
+
+<file path=ppt/commentAuthors.xml><?xml version="1.0" encoding="utf-8"?>
+<p:cmAuthorLst xmlns:a="http://schemas.openxmlformats.org/drawingml/2006/main" xmlns:r="http://schemas.openxmlformats.org/officeDocument/2006/relationships" xmlns:p="http://schemas.openxmlformats.org/presentationml/2006/main">
+  <p:cmAuthor id="1" name="Ewing, Mark" initials="EM" lastIdx="2" clrIdx="0">
+    <p:extLst>
+      <p:ext uri="{19B8F6BF-5375-455C-9EA6-DF929625EA0E}">
+        <p15:presenceInfo xmlns:p15="http://schemas.microsoft.com/office/powerpoint/2012/main" userId="S-1-5-21-1937730580-630086540-1877560073-511824" providerId="AD"/>
+      </p:ext>
+    </p:extLst>
+  </p:cmAuthor>
+</p:cmAuthorLst>
 </file>
 
 <file path=ppt/charts/chart1.xml><?xml version="1.0" encoding="utf-8"?>
@@ -1107,6 +1122,20 @@
     </cs:spPr>
   </cs:wall>
 </cs:chartStyle>
+</file>
+
+<file path=ppt/comments/comment1.xml><?xml version="1.0" encoding="utf-8"?>
+<p:cmLst xmlns:a="http://schemas.openxmlformats.org/drawingml/2006/main" xmlns:r="http://schemas.openxmlformats.org/officeDocument/2006/relationships" xmlns:p="http://schemas.openxmlformats.org/presentationml/2006/main">
+  <p:cm authorId="1" dt="2017-03-16T09:01:03.543" idx="2">
+    <p:pos x="6952" y="1307"/>
+    <p:text>I'm commenting that this word art is awesome looking!</p:text>
+    <p:extLst>
+      <p:ext uri="{C676402C-5697-4E1C-873F-D02D1690AC5C}">
+        <p15:threadingInfo xmlns:p15="http://schemas.microsoft.com/office/powerpoint/2012/main" timeZoneBias="240"/>
+      </p:ext>
+    </p:extLst>
+  </p:cm>
+</p:cmLst>
 </file>
 
 <file path=ppt/diagrams/colors1.xml><?xml version="1.0" encoding="utf-8"?>
@@ -9013,6 +9042,356 @@
 </dgm:styleDef>
 </file>
 
+<file path=ppt/notesMasters/notesMaster1.xml><?xml version="1.0" encoding="utf-8"?>
+<p:notesMaster xmlns:a="http://schemas.openxmlformats.org/drawingml/2006/main" xmlns:r="http://schemas.openxmlformats.org/officeDocument/2006/relationships" xmlns:p="http://schemas.openxmlformats.org/presentationml/2006/main">
+  <p:cSld>
+    <p:bg>
+      <p:bgRef idx="1001">
+        <a:schemeClr val="bg1"/>
+      </p:bgRef>
+    </p:bg>
+    <p:spTree>
+      <p:nvGrpSpPr>
+        <p:cNvPr id="1" name=""/>
+        <p:cNvGrpSpPr/>
+        <p:nvPr/>
+      </p:nvGrpSpPr>
+      <p:grpSpPr>
+        <a:xfrm>
+          <a:off x="0" y="0"/>
+          <a:ext cx="0" cy="0"/>
+          <a:chOff x="0" y="0"/>
+          <a:chExt cx="0" cy="0"/>
+        </a:xfrm>
+      </p:grpSpPr>
+      <p:sp>
+        <p:nvSpPr>
+          <p:cNvPr id="2" name="Header Placeholder 1"/>
+          <p:cNvSpPr>
+            <a:spLocks noGrp="1"/>
+          </p:cNvSpPr>
+          <p:nvPr>
+            <p:ph type="hdr" sz="quarter"/>
+          </p:nvPr>
+        </p:nvSpPr>
+        <p:spPr>
+          <a:xfrm>
+            <a:off x="0" y="0"/>
+            <a:ext cx="2971800" cy="458788"/>
+          </a:xfrm>
+          <a:prstGeom prst="rect">
+            <a:avLst/>
+          </a:prstGeom>
+        </p:spPr>
+        <p:txBody>
+          <a:bodyPr vert="horz" lIns="91440" tIns="45720" rIns="91440" bIns="45720" rtlCol="0"/>
+          <a:lstStyle>
+            <a:lvl1pPr algn="l">
+              <a:defRPr sz="1200"/>
+            </a:lvl1pPr>
+          </a:lstStyle>
+          <a:p>
+            <a:endParaRPr lang="en-US"/>
+          </a:p>
+        </p:txBody>
+      </p:sp>
+      <p:sp>
+        <p:nvSpPr>
+          <p:cNvPr id="3" name="Date Placeholder 2"/>
+          <p:cNvSpPr>
+            <a:spLocks noGrp="1"/>
+          </p:cNvSpPr>
+          <p:nvPr>
+            <p:ph type="dt" idx="1"/>
+          </p:nvPr>
+        </p:nvSpPr>
+        <p:spPr>
+          <a:xfrm>
+            <a:off x="3884613" y="0"/>
+            <a:ext cx="2971800" cy="458788"/>
+          </a:xfrm>
+          <a:prstGeom prst="rect">
+            <a:avLst/>
+          </a:prstGeom>
+        </p:spPr>
+        <p:txBody>
+          <a:bodyPr vert="horz" lIns="91440" tIns="45720" rIns="91440" bIns="45720" rtlCol="0"/>
+          <a:lstStyle>
+            <a:lvl1pPr algn="r">
+              <a:defRPr sz="1200"/>
+            </a:lvl1pPr>
+          </a:lstStyle>
+          <a:p>
+            <a:fld id="{D269A648-BCB2-4D5C-A31C-0F80153BA3D8}" type="datetimeFigureOut">
+              <a:rPr lang="en-US" smtClean="0"/>
+              <a:t>3/16/2017</a:t>
+            </a:fld>
+            <a:endParaRPr lang="en-US"/>
+          </a:p>
+        </p:txBody>
+      </p:sp>
+      <p:sp>
+        <p:nvSpPr>
+          <p:cNvPr id="4" name="Slide Image Placeholder 3"/>
+          <p:cNvSpPr>
+            <a:spLocks noGrp="1" noRot="1" noChangeAspect="1"/>
+          </p:cNvSpPr>
+          <p:nvPr>
+            <p:ph type="sldImg" idx="2"/>
+          </p:nvPr>
+        </p:nvSpPr>
+        <p:spPr>
+          <a:xfrm>
+            <a:off x="685800" y="1143000"/>
+            <a:ext cx="5486400" cy="3086100"/>
+          </a:xfrm>
+          <a:prstGeom prst="rect">
+            <a:avLst/>
+          </a:prstGeom>
+          <a:noFill/>
+          <a:ln w="12700">
+            <a:solidFill>
+              <a:prstClr val="black"/>
+            </a:solidFill>
+          </a:ln>
+        </p:spPr>
+        <p:txBody>
+          <a:bodyPr vert="horz" lIns="91440" tIns="45720" rIns="91440" bIns="45720" rtlCol="0" anchor="ctr"/>
+          <a:lstStyle/>
+          <a:p>
+            <a:endParaRPr lang="en-US"/>
+          </a:p>
+        </p:txBody>
+      </p:sp>
+      <p:sp>
+        <p:nvSpPr>
+          <p:cNvPr id="5" name="Notes Placeholder 4"/>
+          <p:cNvSpPr>
+            <a:spLocks noGrp="1"/>
+          </p:cNvSpPr>
+          <p:nvPr>
+            <p:ph type="body" sz="quarter" idx="3"/>
+          </p:nvPr>
+        </p:nvSpPr>
+        <p:spPr>
+          <a:xfrm>
+            <a:off x="685800" y="4400550"/>
+            <a:ext cx="5486400" cy="3600450"/>
+          </a:xfrm>
+          <a:prstGeom prst="rect">
+            <a:avLst/>
+          </a:prstGeom>
+        </p:spPr>
+        <p:txBody>
+          <a:bodyPr vert="horz" lIns="91440" tIns="45720" rIns="91440" bIns="45720" rtlCol="0"/>
+          <a:lstStyle/>
+          <a:p>
+            <a:pPr lvl="0"/>
+            <a:r>
+              <a:rPr lang="en-US"/>
+              <a:t>Edit Master text styles</a:t>
+            </a:r>
+          </a:p>
+          <a:p>
+            <a:pPr lvl="1"/>
+            <a:r>
+              <a:rPr lang="en-US"/>
+              <a:t>Second level</a:t>
+            </a:r>
+          </a:p>
+          <a:p>
+            <a:pPr lvl="2"/>
+            <a:r>
+              <a:rPr lang="en-US"/>
+              <a:t>Third level</a:t>
+            </a:r>
+          </a:p>
+          <a:p>
+            <a:pPr lvl="3"/>
+            <a:r>
+              <a:rPr lang="en-US"/>
+              <a:t>Fourth level</a:t>
+            </a:r>
+          </a:p>
+          <a:p>
+            <a:pPr lvl="4"/>
+            <a:r>
+              <a:rPr lang="en-US"/>
+              <a:t>Fifth level</a:t>
+            </a:r>
+            <a:endParaRPr lang="en-US"/>
+          </a:p>
+        </p:txBody>
+      </p:sp>
+      <p:sp>
+        <p:nvSpPr>
+          <p:cNvPr id="6" name="Footer Placeholder 5"/>
+          <p:cNvSpPr>
+            <a:spLocks noGrp="1"/>
+          </p:cNvSpPr>
+          <p:nvPr>
+            <p:ph type="ftr" sz="quarter" idx="4"/>
+          </p:nvPr>
+        </p:nvSpPr>
+        <p:spPr>
+          <a:xfrm>
+            <a:off x="0" y="8685213"/>
+            <a:ext cx="2971800" cy="458787"/>
+          </a:xfrm>
+          <a:prstGeom prst="rect">
+            <a:avLst/>
+          </a:prstGeom>
+        </p:spPr>
+        <p:txBody>
+          <a:bodyPr vert="horz" lIns="91440" tIns="45720" rIns="91440" bIns="45720" rtlCol="0" anchor="b"/>
+          <a:lstStyle>
+            <a:lvl1pPr algn="l">
+              <a:defRPr sz="1200"/>
+            </a:lvl1pPr>
+          </a:lstStyle>
+          <a:p>
+            <a:endParaRPr lang="en-US"/>
+          </a:p>
+        </p:txBody>
+      </p:sp>
+      <p:sp>
+        <p:nvSpPr>
+          <p:cNvPr id="7" name="Slide Number Placeholder 6"/>
+          <p:cNvSpPr>
+            <a:spLocks noGrp="1"/>
+          </p:cNvSpPr>
+          <p:nvPr>
+            <p:ph type="sldNum" sz="quarter" idx="5"/>
+          </p:nvPr>
+        </p:nvSpPr>
+        <p:spPr>
+          <a:xfrm>
+            <a:off x="3884613" y="8685213"/>
+            <a:ext cx="2971800" cy="458787"/>
+          </a:xfrm>
+          <a:prstGeom prst="rect">
+            <a:avLst/>
+          </a:prstGeom>
+        </p:spPr>
+        <p:txBody>
+          <a:bodyPr vert="horz" lIns="91440" tIns="45720" rIns="91440" bIns="45720" rtlCol="0" anchor="b"/>
+          <a:lstStyle>
+            <a:lvl1pPr algn="r">
+              <a:defRPr sz="1200"/>
+            </a:lvl1pPr>
+          </a:lstStyle>
+          <a:p>
+            <a:fld id="{F992BCCA-4ED8-48A3-923C-DAFC13A6B855}" type="slidenum">
+              <a:rPr lang="en-US" smtClean="0"/>
+              <a:t>‹#›</a:t>
+            </a:fld>
+            <a:endParaRPr lang="en-US"/>
+          </a:p>
+        </p:txBody>
+      </p:sp>
+    </p:spTree>
+    <p:extLst>
+      <p:ext uri="{BB962C8B-B14F-4D97-AF65-F5344CB8AC3E}">
+        <p14:creationId xmlns:p14="http://schemas.microsoft.com/office/powerpoint/2010/main" val="982090953"/>
+      </p:ext>
+    </p:extLst>
+  </p:cSld>
+  <p:clrMap bg1="lt1" tx1="dk1" bg2="lt2" tx2="dk2" accent1="accent1" accent2="accent2" accent3="accent3" accent4="accent4" accent5="accent5" accent6="accent6" hlink="hlink" folHlink="folHlink"/>
+  <p:notesStyle>
+    <a:lvl1pPr marL="0" algn="l" defTabSz="914400" rtl="0" eaLnBrk="1" latinLnBrk="0" hangingPunct="1">
+      <a:defRPr sz="1200" kern="1200">
+        <a:solidFill>
+          <a:schemeClr val="tx1"/>
+        </a:solidFill>
+        <a:latin typeface="+mn-lt"/>
+        <a:ea typeface="+mn-ea"/>
+        <a:cs typeface="+mn-cs"/>
+      </a:defRPr>
+    </a:lvl1pPr>
+    <a:lvl2pPr marL="457200" algn="l" defTabSz="914400" rtl="0" eaLnBrk="1" latinLnBrk="0" hangingPunct="1">
+      <a:defRPr sz="1200" kern="1200">
+        <a:solidFill>
+          <a:schemeClr val="tx1"/>
+        </a:solidFill>
+        <a:latin typeface="+mn-lt"/>
+        <a:ea typeface="+mn-ea"/>
+        <a:cs typeface="+mn-cs"/>
+      </a:defRPr>
+    </a:lvl2pPr>
+    <a:lvl3pPr marL="914400" algn="l" defTabSz="914400" rtl="0" eaLnBrk="1" latinLnBrk="0" hangingPunct="1">
+      <a:defRPr sz="1200" kern="1200">
+        <a:solidFill>
+          <a:schemeClr val="tx1"/>
+        </a:solidFill>
+        <a:latin typeface="+mn-lt"/>
+        <a:ea typeface="+mn-ea"/>
+        <a:cs typeface="+mn-cs"/>
+      </a:defRPr>
+    </a:lvl3pPr>
+    <a:lvl4pPr marL="1371600" algn="l" defTabSz="914400" rtl="0" eaLnBrk="1" latinLnBrk="0" hangingPunct="1">
+      <a:defRPr sz="1200" kern="1200">
+        <a:solidFill>
+          <a:schemeClr val="tx1"/>
+        </a:solidFill>
+        <a:latin typeface="+mn-lt"/>
+        <a:ea typeface="+mn-ea"/>
+        <a:cs typeface="+mn-cs"/>
+      </a:defRPr>
+    </a:lvl4pPr>
+    <a:lvl5pPr marL="1828800" algn="l" defTabSz="914400" rtl="0" eaLnBrk="1" latinLnBrk="0" hangingPunct="1">
+      <a:defRPr sz="1200" kern="1200">
+        <a:solidFill>
+          <a:schemeClr val="tx1"/>
+        </a:solidFill>
+        <a:latin typeface="+mn-lt"/>
+        <a:ea typeface="+mn-ea"/>
+        <a:cs typeface="+mn-cs"/>
+      </a:defRPr>
+    </a:lvl5pPr>
+    <a:lvl6pPr marL="2286000" algn="l" defTabSz="914400" rtl="0" eaLnBrk="1" latinLnBrk="0" hangingPunct="1">
+      <a:defRPr sz="1200" kern="1200">
+        <a:solidFill>
+          <a:schemeClr val="tx1"/>
+        </a:solidFill>
+        <a:latin typeface="+mn-lt"/>
+        <a:ea typeface="+mn-ea"/>
+        <a:cs typeface="+mn-cs"/>
+      </a:defRPr>
+    </a:lvl6pPr>
+    <a:lvl7pPr marL="2743200" algn="l" defTabSz="914400" rtl="0" eaLnBrk="1" latinLnBrk="0" hangingPunct="1">
+      <a:defRPr sz="1200" kern="1200">
+        <a:solidFill>
+          <a:schemeClr val="tx1"/>
+        </a:solidFill>
+        <a:latin typeface="+mn-lt"/>
+        <a:ea typeface="+mn-ea"/>
+        <a:cs typeface="+mn-cs"/>
+      </a:defRPr>
+    </a:lvl7pPr>
+    <a:lvl8pPr marL="3200400" algn="l" defTabSz="914400" rtl="0" eaLnBrk="1" latinLnBrk="0" hangingPunct="1">
+      <a:defRPr sz="1200" kern="1200">
+        <a:solidFill>
+          <a:schemeClr val="tx1"/>
+        </a:solidFill>
+        <a:latin typeface="+mn-lt"/>
+        <a:ea typeface="+mn-ea"/>
+        <a:cs typeface="+mn-cs"/>
+      </a:defRPr>
+    </a:lvl8pPr>
+    <a:lvl9pPr marL="3657600" algn="l" defTabSz="914400" rtl="0" eaLnBrk="1" latinLnBrk="0" hangingPunct="1">
+      <a:defRPr sz="1200" kern="1200">
+        <a:solidFill>
+          <a:schemeClr val="tx1"/>
+        </a:solidFill>
+        <a:latin typeface="+mn-lt"/>
+        <a:ea typeface="+mn-ea"/>
+        <a:cs typeface="+mn-cs"/>
+      </a:defRPr>
+    </a:lvl9pPr>
+  </p:notesStyle>
+</p:notesMaster>
+</file>
+
 <file path=ppt/slideLayouts/slideLayout1.xml><?xml version="1.0" encoding="utf-8"?>
 <p:sldLayout xmlns:a="http://schemas.openxmlformats.org/drawingml/2006/main" xmlns:r="http://schemas.openxmlformats.org/officeDocument/2006/relationships" xmlns:p="http://schemas.openxmlformats.org/presentationml/2006/main" showMasterSp="0" type="title" preserve="1">
   <p:cSld name="Title Slide">
@@ -9346,10 +9725,9 @@
             </a:lvl1pPr>
           </a:lstStyle>
           <a:p>
-            <a:fld id="{5923F103-BC34-4FE4-A40E-EDDEECFDA5D0}" type="datetimeFigureOut">
-              <a:rPr lang="en-US" dirty="0"/>
-              <a:pPr/>
-              <a:t>3/13/2017</a:t>
+            <a:fld id="{4DA5F7EA-8E4A-495A-B1DE-862531789DFD}" type="datetime1">
+              <a:rPr lang="en-US" smtClean="0"/>
+              <a:t>3/16/2017</a:t>
             </a:fld>
             <a:endParaRPr lang="en-US" dirty="0"/>
           </a:p>
@@ -10435,9 +10813,9 @@
           <a:bodyPr/>
           <a:lstStyle/>
           <a:p>
-            <a:fld id="{923A1CC3-2375-41D4-9E03-427CAF2A4C1A}" type="datetimeFigureOut">
-              <a:rPr lang="en-US" dirty="0"/>
-              <a:t>3/13/2017</a:t>
+            <a:fld id="{398ED06B-C958-432E-AB74-7BAAC11F46E8}" type="datetime1">
+              <a:rPr lang="en-US" smtClean="0"/>
+              <a:t>3/16/2017</a:t>
             </a:fld>
             <a:endParaRPr lang="en-US" dirty="0"/>
           </a:p>
@@ -11415,9 +11793,9 @@
           <a:bodyPr/>
           <a:lstStyle/>
           <a:p>
-            <a:fld id="{AFF16868-8199-4C2C-A5B1-63AEE139F88E}" type="datetimeFigureOut">
-              <a:rPr lang="en-US" dirty="0"/>
-              <a:t>3/13/2017</a:t>
+            <a:fld id="{C8E50AA3-3715-4F04-861D-002342ADB044}" type="datetime1">
+              <a:rPr lang="en-US" smtClean="0"/>
+              <a:t>3/16/2017</a:t>
             </a:fld>
             <a:endParaRPr lang="en-US" dirty="0"/>
           </a:p>
@@ -12549,9 +12927,9 @@
           <a:bodyPr/>
           <a:lstStyle/>
           <a:p>
-            <a:fld id="{AAD9FF7F-6988-44CC-821B-644E70CD2F73}" type="datetimeFigureOut">
-              <a:rPr lang="en-US" dirty="0"/>
-              <a:t>3/13/2017</a:t>
+            <a:fld id="{46E3C526-CB58-4802-8CF1-71EAB7963578}" type="datetime1">
+              <a:rPr lang="en-US" smtClean="0"/>
+              <a:t>3/16/2017</a:t>
             </a:fld>
             <a:endParaRPr lang="en-US" dirty="0"/>
           </a:p>
@@ -13582,9 +13960,9 @@
           <a:bodyPr/>
           <a:lstStyle/>
           <a:p>
-            <a:fld id="{5C12C299-16B2-4475-990D-751901EACC14}" type="datetimeFigureOut">
-              <a:rPr lang="en-US" dirty="0"/>
-              <a:t>3/13/2017</a:t>
+            <a:fld id="{E323F820-7B68-45E0-94CB-B7AA6E199F7D}" type="datetime1">
+              <a:rPr lang="en-US" smtClean="0"/>
+              <a:t>3/16/2017</a:t>
             </a:fld>
             <a:endParaRPr lang="en-US" dirty="0"/>
           </a:p>
@@ -14242,9 +14620,9 @@
           <a:bodyPr/>
           <a:lstStyle/>
           <a:p>
-            <a:fld id="{9FE86839-B9D8-4651-8783-F325ECE74E65}" type="datetimeFigureOut">
-              <a:rPr lang="en-US" dirty="0"/>
-              <a:t>3/13/2017</a:t>
+            <a:fld id="{8EDBD61F-20CF-4D80-B0E2-8952B3CC5780}" type="datetime1">
+              <a:rPr lang="en-US" smtClean="0"/>
+              <a:t>3/16/2017</a:t>
             </a:fld>
             <a:endParaRPr lang="en-US" dirty="0"/>
           </a:p>
@@ -15103,9 +15481,9 @@
           <a:bodyPr/>
           <a:lstStyle/>
           <a:p>
-            <a:fld id="{FD484F64-32F6-45C5-931F-ADC1662401D0}" type="datetimeFigureOut">
-              <a:rPr lang="en-US" dirty="0"/>
-              <a:t>3/13/2017</a:t>
+            <a:fld id="{37E5EDED-74FD-4E59-97B6-DE99C14326AD}" type="datetime1">
+              <a:rPr lang="en-US" smtClean="0"/>
+              <a:t>3/16/2017</a:t>
             </a:fld>
             <a:endParaRPr lang="en-US" dirty="0"/>
           </a:p>
@@ -15293,9 +15671,9 @@
           <a:bodyPr/>
           <a:lstStyle/>
           <a:p>
-            <a:fld id="{53086D93-FCAC-47E0-A2EE-787E62CA814C}" type="datetimeFigureOut">
-              <a:rPr lang="en-US" dirty="0"/>
-              <a:t>3/13/2017</a:t>
+            <a:fld id="{014FD56A-D71A-45C6-BC69-946DBA3BE158}" type="datetime1">
+              <a:rPr lang="en-US" smtClean="0"/>
+              <a:t>3/16/2017</a:t>
             </a:fld>
             <a:endParaRPr lang="en-US" dirty="0"/>
           </a:p>
@@ -16265,9 +16643,9 @@
           <a:bodyPr/>
           <a:lstStyle/>
           <a:p>
-            <a:fld id="{CDA879A6-0FD0-4734-A311-86BFCA472E6E}" type="datetimeFigureOut">
-              <a:rPr lang="en-US" dirty="0"/>
-              <a:t>3/13/2017</a:t>
+            <a:fld id="{15C17129-4032-4F66-B1C6-7A80A43AC055}" type="datetime1">
+              <a:rPr lang="en-US" smtClean="0"/>
+              <a:t>3/16/2017</a:t>
             </a:fld>
             <a:endParaRPr lang="en-US" dirty="0"/>
           </a:p>
@@ -16476,9 +16854,9 @@
           <a:bodyPr/>
           <a:lstStyle/>
           <a:p>
-            <a:fld id="{19C9CA7B-DFD4-44B5-8C60-D14B8CD1FB59}" type="datetimeFigureOut">
-              <a:rPr lang="en-US" dirty="0"/>
-              <a:t>3/13/2017</a:t>
+            <a:fld id="{884D75EE-0C7B-4C1A-A1F6-F3A3A1304932}" type="datetime1">
+              <a:rPr lang="en-US" smtClean="0"/>
+              <a:t>3/16/2017</a:t>
             </a:fld>
             <a:endParaRPr lang="en-US" dirty="0"/>
           </a:p>
@@ -17510,9 +17888,9 @@
           <a:bodyPr/>
           <a:lstStyle/>
           <a:p>
-            <a:fld id="{F34E6425-0181-43F2-84FC-787E803FD2F8}" type="datetimeFigureOut">
-              <a:rPr lang="en-US" dirty="0"/>
-              <a:t>3/13/2017</a:t>
+            <a:fld id="{D1302752-A7B1-419C-B8AA-DB42F1A31140}" type="datetime1">
+              <a:rPr lang="en-US" smtClean="0"/>
+              <a:t>3/16/2017</a:t>
             </a:fld>
             <a:endParaRPr lang="en-US" dirty="0"/>
           </a:p>
@@ -17782,9 +18160,9 @@
           <a:bodyPr/>
           <a:lstStyle/>
           <a:p>
-            <a:fld id="{3BDB8791-F1B0-41E7-B7FD-A781E65C4266}" type="datetimeFigureOut">
-              <a:rPr lang="en-US" dirty="0"/>
-              <a:t>3/13/2017</a:t>
+            <a:fld id="{F137B042-ECC5-44F5-8020-6C40CDF9C251}" type="datetime1">
+              <a:rPr lang="en-US" smtClean="0"/>
+              <a:t>3/16/2017</a:t>
             </a:fld>
             <a:endParaRPr lang="en-US" dirty="0"/>
           </a:p>
@@ -18192,9 +18570,9 @@
           <a:bodyPr/>
           <a:lstStyle/>
           <a:p>
-            <a:fld id="{5FDD63B2-E120-4ED8-B27B-C685F510A5FE}" type="datetimeFigureOut">
-              <a:rPr lang="en-US" dirty="0"/>
-              <a:t>3/13/2017</a:t>
+            <a:fld id="{5F13F018-5022-4784-80A7-1F524FE1C774}" type="datetime1">
+              <a:rPr lang="en-US" smtClean="0"/>
+              <a:t>3/16/2017</a:t>
             </a:fld>
             <a:endParaRPr lang="en-US" dirty="0"/>
           </a:p>
@@ -18319,9 +18697,9 @@
           <a:bodyPr/>
           <a:lstStyle/>
           <a:p>
-            <a:fld id="{7AA18ACC-A947-437B-A130-35BD54FDF1E9}" type="datetimeFigureOut">
-              <a:rPr lang="en-US" dirty="0"/>
-              <a:t>3/13/2017</a:t>
+            <a:fld id="{795A91DC-53E7-4FC3-ABD9-834FB50B749E}" type="datetime1">
+              <a:rPr lang="en-US" smtClean="0"/>
+              <a:t>3/16/2017</a:t>
             </a:fld>
             <a:endParaRPr lang="en-US" dirty="0"/>
           </a:p>
@@ -18414,9 +18792,9 @@
           <a:bodyPr/>
           <a:lstStyle/>
           <a:p>
-            <a:fld id="{7C8D7E02-BCB8-4D50-A234-369438C08659}" type="datetimeFigureOut">
-              <a:rPr lang="en-US" dirty="0"/>
-              <a:t>3/13/2017</a:t>
+            <a:fld id="{43A1F790-078A-42D9-B034-0CEB8AE0475D}" type="datetime1">
+              <a:rPr lang="en-US" smtClean="0"/>
+              <a:t>3/16/2017</a:t>
             </a:fld>
             <a:endParaRPr lang="en-US" dirty="0"/>
           </a:p>
@@ -19495,9 +19873,9 @@
           <a:bodyPr/>
           <a:lstStyle/>
           <a:p>
-            <a:fld id="{76E86A4C-8E40-4F87-A4F0-01A0687C5742}" type="datetimeFigureOut">
-              <a:rPr lang="en-US" dirty="0"/>
-              <a:t>3/13/2017</a:t>
+            <a:fld id="{AC0BF88E-03E9-4503-BC6D-26E5D6225C82}" type="datetime1">
+              <a:rPr lang="en-US" smtClean="0"/>
+              <a:t>3/16/2017</a:t>
             </a:fld>
             <a:endParaRPr lang="en-US" dirty="0"/>
           </a:p>
@@ -20603,9 +20981,9 @@
           <a:bodyPr/>
           <a:lstStyle/>
           <a:p>
-            <a:fld id="{35E72C73-2D91-4E12-BA25-F0AA0C03599B}" type="datetimeFigureOut">
-              <a:rPr lang="en-US" dirty="0"/>
-              <a:t>3/13/2017</a:t>
+            <a:fld id="{9B3E28DF-F1EF-44A5-AF07-49CB3783E8A2}" type="datetime1">
+              <a:rPr lang="en-US" smtClean="0"/>
+              <a:t>3/16/2017</a:t>
             </a:fld>
             <a:endParaRPr lang="en-US" dirty="0"/>
           </a:p>
@@ -21600,9 +21978,9 @@
             </a:lvl1pPr>
           </a:lstStyle>
           <a:p>
-            <a:fld id="{2BE451C3-0FF4-47C4-B829-773ADF60F88C}" type="datetimeFigureOut">
-              <a:rPr lang="en-US" dirty="0"/>
-              <a:t>3/13/2017</a:t>
+            <a:fld id="{1E79669A-4947-41EB-B9C7-88D39ABF89C4}" type="datetime1">
+              <a:rPr lang="en-US" smtClean="0"/>
+              <a:t>3/16/2017</a:t>
             </a:fld>
             <a:endParaRPr lang="en-US" dirty="0"/>
           </a:p>
@@ -21745,7 +22123,7 @@
     <p:sldLayoutId id="2147483658" r:id="rId16"/>
     <p:sldLayoutId id="2147483659" r:id="rId17"/>
   </p:sldLayoutIdLst>
-  <p:hf sldNum="0" hdr="0" ftr="0" dt="0"/>
+  <p:hf hdr="0" ftr="0"/>
   <p:txStyles>
     <p:titleStyle>
       <a:lvl1pPr algn="l" defTabSz="457200" rtl="0" eaLnBrk="1" latinLnBrk="0" hangingPunct="1">
@@ -22219,6 +22597,77 @@
           </a:p>
         </p:txBody>
       </p:sp>
+      <p:sp>
+        <p:nvSpPr>
+          <p:cNvPr id="4" name="Date Placeholder 3"/>
+          <p:cNvSpPr>
+            <a:spLocks noGrp="1"/>
+          </p:cNvSpPr>
+          <p:nvPr>
+            <p:ph type="dt" sz="half" idx="10"/>
+          </p:nvPr>
+        </p:nvSpPr>
+        <p:spPr/>
+        <p:txBody>
+          <a:bodyPr/>
+          <a:lstStyle/>
+          <a:p>
+            <a:fld id="{BFCF16A9-9002-458F-8FF6-EFCC31DEEDF6}" type="datetime1">
+              <a:rPr lang="en-US" smtClean="0"/>
+              <a:t>3/16/2017</a:t>
+            </a:fld>
+            <a:endParaRPr lang="en-US" dirty="0"/>
+          </a:p>
+        </p:txBody>
+      </p:sp>
+      <p:sp>
+        <p:nvSpPr>
+          <p:cNvPr id="5" name="Slide Number Placeholder 4"/>
+          <p:cNvSpPr>
+            <a:spLocks noGrp="1"/>
+          </p:cNvSpPr>
+          <p:nvPr>
+            <p:ph type="sldNum" sz="quarter" idx="12"/>
+          </p:nvPr>
+        </p:nvSpPr>
+        <p:spPr/>
+        <p:txBody>
+          <a:bodyPr/>
+          <a:lstStyle/>
+          <a:p>
+            <a:fld id="{D57F1E4F-1CFF-5643-939E-217C01CDF565}" type="slidenum">
+              <a:rPr lang="en-US" smtClean="0"/>
+              <a:pPr/>
+              <a:t>1</a:t>
+            </a:fld>
+            <a:endParaRPr lang="en-US" dirty="0"/>
+          </a:p>
+        </p:txBody>
+      </p:sp>
+      <p:pic>
+        <p:nvPicPr>
+          <p:cNvPr id="6" name="Picture 5" descr="Datei:&lt;strong&gt;R logo&lt;/strong&gt;.svg – Wikiversity"/>
+          <p:cNvPicPr>
+            <a:picLocks noChangeAspect="1"/>
+          </p:cNvPicPr>
+          <p:nvPr/>
+        </p:nvPicPr>
+        <p:blipFill>
+          <a:blip r:embed="rId2"/>
+          <a:stretch>
+            <a:fillRect/>
+          </a:stretch>
+        </p:blipFill>
+        <p:spPr>
+          <a:xfrm>
+            <a:off x="8246181" y="880533"/>
+            <a:ext cx="1163193" cy="901700"/>
+          </a:xfrm>
+          <a:prstGeom prst="rect">
+            <a:avLst/>
+          </a:prstGeom>
+        </p:spPr>
+      </p:pic>
     </p:spTree>
     <p:extLst>
       <p:ext uri="{BB962C8B-B14F-4D97-AF65-F5344CB8AC3E}">
@@ -22349,6 +22798,273 @@
           </a:p>
         </p:txBody>
       </p:sp>
+      <p:sp>
+        <p:nvSpPr>
+          <p:cNvPr id="5" name="TextBox 4"/>
+          <p:cNvSpPr txBox="1"/>
+          <p:nvPr/>
+        </p:nvSpPr>
+        <p:spPr>
+          <a:xfrm>
+            <a:off x="998290" y="4580389"/>
+            <a:ext cx="2550253" cy="646331"/>
+          </a:xfrm>
+          <a:prstGeom prst="rect">
+            <a:avLst/>
+          </a:prstGeom>
+          <a:noFill/>
+        </p:spPr>
+        <p:txBody>
+          <a:bodyPr wrap="square" rtlCol="0">
+            <a:spAutoFit/>
+          </a:bodyPr>
+          <a:lstStyle/>
+          <a:p>
+            <a:r>
+              <a:rPr lang="en-US" dirty="0"/>
+              <a:t>This is an added floating text box.</a:t>
+            </a:r>
+          </a:p>
+        </p:txBody>
+      </p:sp>
+      <p:sp>
+        <p:nvSpPr>
+          <p:cNvPr id="6" name="Date Placeholder 5"/>
+          <p:cNvSpPr>
+            <a:spLocks noGrp="1"/>
+          </p:cNvSpPr>
+          <p:nvPr>
+            <p:ph type="dt" sz="half" idx="10"/>
+          </p:nvPr>
+        </p:nvSpPr>
+        <p:spPr/>
+        <p:txBody>
+          <a:bodyPr/>
+          <a:lstStyle/>
+          <a:p>
+            <a:fld id="{5AC78F6A-CC46-4E16-AACF-688B1BA9DAA8}" type="datetime1">
+              <a:rPr lang="en-US" smtClean="0"/>
+              <a:t>3/16/2017</a:t>
+            </a:fld>
+            <a:endParaRPr lang="en-US" dirty="0"/>
+          </a:p>
+        </p:txBody>
+      </p:sp>
+      <p:sp>
+        <p:nvSpPr>
+          <p:cNvPr id="7" name="Slide Number Placeholder 6"/>
+          <p:cNvSpPr>
+            <a:spLocks noGrp="1"/>
+          </p:cNvSpPr>
+          <p:nvPr>
+            <p:ph type="sldNum" sz="quarter" idx="12"/>
+          </p:nvPr>
+        </p:nvSpPr>
+        <p:spPr/>
+        <p:txBody>
+          <a:bodyPr/>
+          <a:lstStyle/>
+          <a:p>
+            <a:fld id="{D57F1E4F-1CFF-5643-939E-217C01CDF565}" type="slidenum">
+              <a:rPr lang="en-US" smtClean="0"/>
+              <a:pPr/>
+              <a:t>2</a:t>
+            </a:fld>
+            <a:endParaRPr lang="en-US" dirty="0"/>
+          </a:p>
+        </p:txBody>
+      </p:sp>
+      <p:sp>
+        <p:nvSpPr>
+          <p:cNvPr id="8" name="Rectangle 7"/>
+          <p:cNvSpPr/>
+          <p:nvPr/>
+        </p:nvSpPr>
+        <p:spPr>
+          <a:xfrm>
+            <a:off x="4727388" y="2074723"/>
+            <a:ext cx="6308137" cy="923330"/>
+          </a:xfrm>
+          <a:prstGeom prst="rect">
+            <a:avLst/>
+          </a:prstGeom>
+          <a:noFill/>
+        </p:spPr>
+        <p:txBody>
+          <a:bodyPr wrap="none" lIns="91440" tIns="45720" rIns="91440" bIns="45720">
+            <a:spAutoFit/>
+          </a:bodyPr>
+          <a:lstStyle/>
+          <a:p>
+            <a:pPr algn="ctr"/>
+            <a:r>
+              <a:rPr lang="en-US" sz="5400" b="1" cap="none" spc="0" dirty="0">
+                <a:ln w="12700">
+                  <a:solidFill>
+                    <a:schemeClr val="tx2">
+                      <a:lumMod val="75000"/>
+                    </a:schemeClr>
+                  </a:solidFill>
+                  <a:prstDash val="solid"/>
+                </a:ln>
+                <a:pattFill prst="dkUpDiag">
+                  <a:fgClr>
+                    <a:schemeClr val="tx2"/>
+                  </a:fgClr>
+                  <a:bgClr>
+                    <a:schemeClr val="tx2">
+                      <a:lumMod val="20000"/>
+                      <a:lumOff val="80000"/>
+                    </a:schemeClr>
+                  </a:bgClr>
+                </a:pattFill>
+                <a:effectLst>
+                  <a:outerShdw dist="38100" dir="2640000" algn="bl" rotWithShape="0">
+                    <a:schemeClr val="tx2">
+                      <a:lumMod val="75000"/>
+                    </a:schemeClr>
+                  </a:outerShdw>
+                </a:effectLst>
+              </a:rPr>
+              <a:t>Amazing word art!</a:t>
+            </a:r>
+          </a:p>
+        </p:txBody>
+      </p:sp>
+      <mc:AlternateContent xmlns:mc="http://schemas.openxmlformats.org/markup-compatibility/2006">
+        <mc:Choice xmlns:a14="http://schemas.microsoft.com/office/drawing/2010/main" Requires="a14">
+          <p:sp>
+            <p:nvSpPr>
+              <p:cNvPr id="9" name="TextBox 8"/>
+              <p:cNvSpPr txBox="1"/>
+              <p:nvPr/>
+            </p:nvSpPr>
+            <p:spPr>
+              <a:xfrm>
+                <a:off x="4244109" y="3839085"/>
+                <a:ext cx="836062" cy="472565"/>
+              </a:xfrm>
+              <a:prstGeom prst="rect">
+                <a:avLst/>
+              </a:prstGeom>
+              <a:noFill/>
+            </p:spPr>
+            <p:txBody>
+              <a:bodyPr wrap="none" lIns="0" tIns="0" rIns="0" bIns="0" rtlCol="0">
+                <a:spAutoFit/>
+              </a:bodyPr>
+              <a:lstStyle/>
+              <a:p>
+                <a14:m>
+                  <m:oMathPara xmlns:m="http://schemas.openxmlformats.org/officeDocument/2006/math">
+                    <m:oMathParaPr>
+                      <m:jc m:val="centerGroup"/>
+                    </m:oMathParaPr>
+                    <m:oMath xmlns:m="http://schemas.openxmlformats.org/officeDocument/2006/math">
+                      <m:f>
+                        <m:fPr>
+                          <m:ctrlPr>
+                            <a:rPr lang="en-US" i="1" smtClean="0">
+                              <a:latin typeface="Cambria Math" panose="02040503050406030204" pitchFamily="18" charset="0"/>
+                            </a:rPr>
+                          </m:ctrlPr>
+                        </m:fPr>
+                        <m:num>
+                          <m:r>
+                            <a:rPr lang="en-US" b="0" i="1" smtClean="0">
+                              <a:latin typeface="Cambria Math" panose="02040503050406030204" pitchFamily="18" charset="0"/>
+                            </a:rPr>
+                            <m:t>𝑥</m:t>
+                          </m:r>
+                        </m:num>
+                        <m:den>
+                          <m:r>
+                            <a:rPr lang="en-US" b="0" i="1" smtClean="0">
+                              <a:latin typeface="Cambria Math" panose="02040503050406030204" pitchFamily="18" charset="0"/>
+                            </a:rPr>
+                            <m:t>2</m:t>
+                          </m:r>
+                        </m:den>
+                      </m:f>
+                      <m:r>
+                        <a:rPr lang="en-US" b="0" i="1" smtClean="0">
+                          <a:latin typeface="Cambria Math" panose="02040503050406030204" pitchFamily="18" charset="0"/>
+                        </a:rPr>
+                        <m:t>=</m:t>
+                      </m:r>
+                      <m:f>
+                        <m:fPr>
+                          <m:type m:val="skw"/>
+                          <m:ctrlPr>
+                            <a:rPr lang="en-US" b="0" i="1" smtClean="0">
+                              <a:latin typeface="Cambria Math" panose="02040503050406030204" pitchFamily="18" charset="0"/>
+                            </a:rPr>
+                          </m:ctrlPr>
+                        </m:fPr>
+                        <m:num>
+                          <m:r>
+                            <a:rPr lang="en-US" b="0" i="1" smtClean="0">
+                              <a:latin typeface="Cambria Math" panose="02040503050406030204" pitchFamily="18" charset="0"/>
+                            </a:rPr>
+                            <m:t>𝑦</m:t>
+                          </m:r>
+                        </m:num>
+                        <m:den>
+                          <m:r>
+                            <a:rPr lang="en-US" b="0" i="1" smtClean="0">
+                              <a:latin typeface="Cambria Math" panose="02040503050406030204" pitchFamily="18" charset="0"/>
+                            </a:rPr>
+                            <m:t>𝑧</m:t>
+                          </m:r>
+                        </m:den>
+                      </m:f>
+                    </m:oMath>
+                  </m:oMathPara>
+                </a14:m>
+                <a:endParaRPr lang="en-US" dirty="0"/>
+              </a:p>
+            </p:txBody>
+          </p:sp>
+        </mc:Choice>
+        <mc:Fallback>
+          <p:sp>
+            <p:nvSpPr>
+              <p:cNvPr id="9" name="TextBox 8"/>
+              <p:cNvSpPr txBox="1">
+                <a:spLocks noRot="1" noChangeAspect="1" noMove="1" noResize="1" noEditPoints="1" noAdjustHandles="1" noChangeArrowheads="1" noChangeShapeType="1" noTextEdit="1"/>
+              </p:cNvSpPr>
+              <p:nvPr/>
+            </p:nvSpPr>
+            <p:spPr>
+              <a:xfrm>
+                <a:off x="4244109" y="3839085"/>
+                <a:ext cx="836062" cy="472565"/>
+              </a:xfrm>
+              <a:prstGeom prst="rect">
+                <a:avLst/>
+              </a:prstGeom>
+              <a:blipFill>
+                <a:blip r:embed="rId2"/>
+                <a:stretch>
+                  <a:fillRect/>
+                </a:stretch>
+              </a:blipFill>
+            </p:spPr>
+            <p:txBody>
+              <a:bodyPr/>
+              <a:lstStyle/>
+              <a:p>
+                <a:r>
+                  <a:rPr lang="en-US">
+                    <a:noFill/>
+                  </a:rPr>
+                  <a:t> </a:t>
+                </a:r>
+              </a:p>
+            </p:txBody>
+          </p:sp>
+        </mc:Fallback>
+      </mc:AlternateContent>
     </p:spTree>
     <p:extLst>
       <p:ext uri="{BB962C8B-B14F-4D97-AF65-F5344CB8AC3E}">
@@ -22630,6 +23346,53 @@
           </a:graphicData>
         </a:graphic>
       </p:graphicFrame>
+      <p:sp>
+        <p:nvSpPr>
+          <p:cNvPr id="6" name="Date Placeholder 5"/>
+          <p:cNvSpPr>
+            <a:spLocks noGrp="1"/>
+          </p:cNvSpPr>
+          <p:nvPr>
+            <p:ph type="dt" sz="half" idx="10"/>
+          </p:nvPr>
+        </p:nvSpPr>
+        <p:spPr/>
+        <p:txBody>
+          <a:bodyPr/>
+          <a:lstStyle/>
+          <a:p>
+            <a:fld id="{3535FED5-5602-47FF-A526-3288D43DD789}" type="datetime1">
+              <a:rPr lang="en-US" smtClean="0"/>
+              <a:t>3/16/2017</a:t>
+            </a:fld>
+            <a:endParaRPr lang="en-US" dirty="0"/>
+          </a:p>
+        </p:txBody>
+      </p:sp>
+      <p:sp>
+        <p:nvSpPr>
+          <p:cNvPr id="7" name="Slide Number Placeholder 6"/>
+          <p:cNvSpPr>
+            <a:spLocks noGrp="1"/>
+          </p:cNvSpPr>
+          <p:nvPr>
+            <p:ph type="sldNum" sz="quarter" idx="12"/>
+          </p:nvPr>
+        </p:nvSpPr>
+        <p:spPr/>
+        <p:txBody>
+          <a:bodyPr/>
+          <a:lstStyle/>
+          <a:p>
+            <a:fld id="{D57F1E4F-1CFF-5643-939E-217C01CDF565}" type="slidenum">
+              <a:rPr lang="en-US" smtClean="0"/>
+              <a:pPr/>
+              <a:t>3</a:t>
+            </a:fld>
+            <a:endParaRPr lang="en-US" dirty="0"/>
+          </a:p>
+        </p:txBody>
+      </p:sp>
     </p:spTree>
     <p:extLst>
       <p:ext uri="{BB962C8B-B14F-4D97-AF65-F5344CB8AC3E}">
@@ -22732,6 +23495,53 @@
           </a:graphicData>
         </a:graphic>
       </p:graphicFrame>
+      <p:sp>
+        <p:nvSpPr>
+          <p:cNvPr id="3" name="Date Placeholder 2"/>
+          <p:cNvSpPr>
+            <a:spLocks noGrp="1"/>
+          </p:cNvSpPr>
+          <p:nvPr>
+            <p:ph type="dt" sz="half" idx="10"/>
+          </p:nvPr>
+        </p:nvSpPr>
+        <p:spPr/>
+        <p:txBody>
+          <a:bodyPr/>
+          <a:lstStyle/>
+          <a:p>
+            <a:fld id="{D08BB69F-6BF4-439E-BA5F-B8D28AB54982}" type="datetime1">
+              <a:rPr lang="en-US" smtClean="0"/>
+              <a:t>3/16/2017</a:t>
+            </a:fld>
+            <a:endParaRPr lang="en-US" dirty="0"/>
+          </a:p>
+        </p:txBody>
+      </p:sp>
+      <p:sp>
+        <p:nvSpPr>
+          <p:cNvPr id="4" name="Slide Number Placeholder 3"/>
+          <p:cNvSpPr>
+            <a:spLocks noGrp="1"/>
+          </p:cNvSpPr>
+          <p:nvPr>
+            <p:ph type="sldNum" sz="quarter" idx="12"/>
+          </p:nvPr>
+        </p:nvSpPr>
+        <p:spPr/>
+        <p:txBody>
+          <a:bodyPr/>
+          <a:lstStyle/>
+          <a:p>
+            <a:fld id="{D57F1E4F-1CFF-5643-939E-217C01CDF565}" type="slidenum">
+              <a:rPr lang="en-US" smtClean="0"/>
+              <a:pPr/>
+              <a:t>4</a:t>
+            </a:fld>
+            <a:endParaRPr lang="en-US" dirty="0"/>
+          </a:p>
+        </p:txBody>
+      </p:sp>
     </p:spTree>
     <p:extLst>
       <p:ext uri="{BB962C8B-B14F-4D97-AF65-F5344CB8AC3E}">
@@ -22834,6 +23644,53 @@
           </a:graphicData>
         </a:graphic>
       </p:graphicFrame>
+      <p:sp>
+        <p:nvSpPr>
+          <p:cNvPr id="3" name="Date Placeholder 2"/>
+          <p:cNvSpPr>
+            <a:spLocks noGrp="1"/>
+          </p:cNvSpPr>
+          <p:nvPr>
+            <p:ph type="dt" sz="half" idx="10"/>
+          </p:nvPr>
+        </p:nvSpPr>
+        <p:spPr/>
+        <p:txBody>
+          <a:bodyPr/>
+          <a:lstStyle/>
+          <a:p>
+            <a:fld id="{6982F29C-1EEB-442D-803A-7783B5ADE048}" type="datetime1">
+              <a:rPr lang="en-US" smtClean="0"/>
+              <a:t>3/16/2017</a:t>
+            </a:fld>
+            <a:endParaRPr lang="en-US" dirty="0"/>
+          </a:p>
+        </p:txBody>
+      </p:sp>
+      <p:sp>
+        <p:nvSpPr>
+          <p:cNvPr id="4" name="Slide Number Placeholder 3"/>
+          <p:cNvSpPr>
+            <a:spLocks noGrp="1"/>
+          </p:cNvSpPr>
+          <p:nvPr>
+            <p:ph type="sldNum" sz="quarter" idx="12"/>
+          </p:nvPr>
+        </p:nvSpPr>
+        <p:spPr/>
+        <p:txBody>
+          <a:bodyPr/>
+          <a:lstStyle/>
+          <a:p>
+            <a:fld id="{D57F1E4F-1CFF-5643-939E-217C01CDF565}" type="slidenum">
+              <a:rPr lang="en-US" smtClean="0"/>
+              <a:pPr/>
+              <a:t>5</a:t>
+            </a:fld>
+            <a:endParaRPr lang="en-US" dirty="0"/>
+          </a:p>
+        </p:txBody>
+      </p:sp>
     </p:spTree>
     <p:extLst>
       <p:ext uri="{BB962C8B-B14F-4D97-AF65-F5344CB8AC3E}">
@@ -23109,4 +23966,299 @@
     </a:ext>
   </a:extLst>
 </a:theme>
+</file>
+
+<file path=ppt/theme/theme2.xml><?xml version="1.0" encoding="utf-8"?>
+<a:theme xmlns:a="http://schemas.openxmlformats.org/drawingml/2006/main" name="Office Theme">
+  <a:themeElements>
+    <a:clrScheme name="Office">
+      <a:dk1>
+        <a:sysClr val="windowText" lastClr="000000"/>
+      </a:dk1>
+      <a:lt1>
+        <a:sysClr val="window" lastClr="FFFFFF"/>
+      </a:lt1>
+      <a:dk2>
+        <a:srgbClr val="44546A"/>
+      </a:dk2>
+      <a:lt2>
+        <a:srgbClr val="E7E6E6"/>
+      </a:lt2>
+      <a:accent1>
+        <a:srgbClr val="4472C4"/>
+      </a:accent1>
+      <a:accent2>
+        <a:srgbClr val="ED7D31"/>
+      </a:accent2>
+      <a:accent3>
+        <a:srgbClr val="A5A5A5"/>
+      </a:accent3>
+      <a:accent4>
+        <a:srgbClr val="FFC000"/>
+      </a:accent4>
+      <a:accent5>
+        <a:srgbClr val="5B9BD5"/>
+      </a:accent5>
+      <a:accent6>
+        <a:srgbClr val="70AD47"/>
+      </a:accent6>
+      <a:hlink>
+        <a:srgbClr val="0563C1"/>
+      </a:hlink>
+      <a:folHlink>
+        <a:srgbClr val="954F72"/>
+      </a:folHlink>
+    </a:clrScheme>
+    <a:fontScheme name="Office">
+      <a:majorFont>
+        <a:latin typeface="Calibri Light" panose="020F0302020204030204"/>
+        <a:ea typeface=""/>
+        <a:cs typeface=""/>
+        <a:font script="Jpan" typeface="游ゴシック Light"/>
+        <a:font script="Hang" typeface="맑은 고딕"/>
+        <a:font script="Hans" typeface="等线 Light"/>
+        <a:font script="Hant" typeface="新細明體"/>
+        <a:font script="Arab" typeface="Times New Roman"/>
+        <a:font script="Hebr" typeface="Times New Roman"/>
+        <a:font script="Thai" typeface="Angsana New"/>
+        <a:font script="Ethi" typeface="Nyala"/>
+        <a:font script="Beng" typeface="Vrinda"/>
+        <a:font script="Gujr" typeface="Shruti"/>
+        <a:font script="Khmr" typeface="MoolBoran"/>
+        <a:font script="Knda" typeface="Tunga"/>
+        <a:font script="Guru" typeface="Raavi"/>
+        <a:font script="Cans" typeface="Euphemia"/>
+        <a:font script="Cher" typeface="Plantagenet Cherokee"/>
+        <a:font script="Yiii" typeface="Microsoft Yi Baiti"/>
+        <a:font script="Tibt" typeface="Microsoft Himalaya"/>
+        <a:font script="Thaa" typeface="MV Boli"/>
+        <a:font script="Deva" typeface="Mangal"/>
+        <a:font script="Telu" typeface="Gautami"/>
+        <a:font script="Taml" typeface="Latha"/>
+        <a:font script="Syrc" typeface="Estrangelo Edessa"/>
+        <a:font script="Orya" typeface="Kalinga"/>
+        <a:font script="Mlym" typeface="Kartika"/>
+        <a:font script="Laoo" typeface="DokChampa"/>
+        <a:font script="Sinh" typeface="Iskoola Pota"/>
+        <a:font script="Mong" typeface="Mongolian Baiti"/>
+        <a:font script="Viet" typeface="Times New Roman"/>
+        <a:font script="Uigh" typeface="Microsoft Uighur"/>
+        <a:font script="Geor" typeface="Sylfaen"/>
+        <a:font script="Armn" typeface="Arial"/>
+        <a:font script="Bugi" typeface="Leelawadee UI"/>
+        <a:font script="Bopo" typeface="Microsoft JhengHei"/>
+        <a:font script="Java" typeface="Javanese Text"/>
+        <a:font script="Lisu" typeface="Segoe UI"/>
+        <a:font script="Mymr" typeface="Myanmar Text"/>
+        <a:font script="Nkoo" typeface="Ebrima"/>
+        <a:font script="Olck" typeface="Nirmala UI"/>
+        <a:font script="Osma" typeface="Ebrima"/>
+        <a:font script="Phag" typeface="Phagspa"/>
+        <a:font script="Syrn" typeface="Estrangelo Edessa"/>
+        <a:font script="Syrj" typeface="Estrangelo Edessa"/>
+        <a:font script="Syre" typeface="Estrangelo Edessa"/>
+        <a:font script="Sora" typeface="Nirmala UI"/>
+        <a:font script="Tale" typeface="Microsoft Tai Le"/>
+        <a:font script="Talu" typeface="Microsoft New Tai Lue"/>
+        <a:font script="Tfng" typeface="Ebrima"/>
+      </a:majorFont>
+      <a:minorFont>
+        <a:latin typeface="Calibri" panose="020F0502020204030204"/>
+        <a:ea typeface=""/>
+        <a:cs typeface=""/>
+        <a:font script="Jpan" typeface="游ゴシック"/>
+        <a:font script="Hang" typeface="맑은 고딕"/>
+        <a:font script="Hans" typeface="等线"/>
+        <a:font script="Hant" typeface="新細明體"/>
+        <a:font script="Arab" typeface="Arial"/>
+        <a:font script="Hebr" typeface="Arial"/>
+        <a:font script="Thai" typeface="Cordia New"/>
+        <a:font script="Ethi" typeface="Nyala"/>
+        <a:font script="Beng" typeface="Vrinda"/>
+        <a:font script="Gujr" typeface="Shruti"/>
+        <a:font script="Khmr" typeface="DaunPenh"/>
+        <a:font script="Knda" typeface="Tunga"/>
+        <a:font script="Guru" typeface="Raavi"/>
+        <a:font script="Cans" typeface="Euphemia"/>
+        <a:font script="Cher" typeface="Plantagenet Cherokee"/>
+        <a:font script="Yiii" typeface="Microsoft Yi Baiti"/>
+        <a:font script="Tibt" typeface="Microsoft Himalaya"/>
+        <a:font script="Thaa" typeface="MV Boli"/>
+        <a:font script="Deva" typeface="Mangal"/>
+        <a:font script="Telu" typeface="Gautami"/>
+        <a:font script="Taml" typeface="Latha"/>
+        <a:font script="Syrc" typeface="Estrangelo Edessa"/>
+        <a:font script="Orya" typeface="Kalinga"/>
+        <a:font script="Mlym" typeface="Kartika"/>
+        <a:font script="Laoo" typeface="DokChampa"/>
+        <a:font script="Sinh" typeface="Iskoola Pota"/>
+        <a:font script="Mong" typeface="Mongolian Baiti"/>
+        <a:font script="Viet" typeface="Arial"/>
+        <a:font script="Uigh" typeface="Microsoft Uighur"/>
+        <a:font script="Geor" typeface="Sylfaen"/>
+        <a:font script="Armn" typeface="Arial"/>
+        <a:font script="Bugi" typeface="Leelawadee UI"/>
+        <a:font script="Bopo" typeface="Microsoft JhengHei"/>
+        <a:font script="Java" typeface="Javanese Text"/>
+        <a:font script="Lisu" typeface="Segoe UI"/>
+        <a:font script="Mymr" typeface="Myanmar Text"/>
+        <a:font script="Nkoo" typeface="Ebrima"/>
+        <a:font script="Olck" typeface="Nirmala UI"/>
+        <a:font script="Osma" typeface="Ebrima"/>
+        <a:font script="Phag" typeface="Phagspa"/>
+        <a:font script="Syrn" typeface="Estrangelo Edessa"/>
+        <a:font script="Syrj" typeface="Estrangelo Edessa"/>
+        <a:font script="Syre" typeface="Estrangelo Edessa"/>
+        <a:font script="Sora" typeface="Nirmala UI"/>
+        <a:font script="Tale" typeface="Microsoft Tai Le"/>
+        <a:font script="Talu" typeface="Microsoft New Tai Lue"/>
+        <a:font script="Tfng" typeface="Ebrima"/>
+      </a:minorFont>
+    </a:fontScheme>
+    <a:fmtScheme name="Office">
+      <a:fillStyleLst>
+        <a:solidFill>
+          <a:schemeClr val="phClr"/>
+        </a:solidFill>
+        <a:gradFill rotWithShape="1">
+          <a:gsLst>
+            <a:gs pos="0">
+              <a:schemeClr val="phClr">
+                <a:lumMod val="110000"/>
+                <a:satMod val="105000"/>
+                <a:tint val="67000"/>
+              </a:schemeClr>
+            </a:gs>
+            <a:gs pos="50000">
+              <a:schemeClr val="phClr">
+                <a:lumMod val="105000"/>
+                <a:satMod val="103000"/>
+                <a:tint val="73000"/>
+              </a:schemeClr>
+            </a:gs>
+            <a:gs pos="100000">
+              <a:schemeClr val="phClr">
+                <a:lumMod val="105000"/>
+                <a:satMod val="109000"/>
+                <a:tint val="81000"/>
+              </a:schemeClr>
+            </a:gs>
+          </a:gsLst>
+          <a:lin ang="5400000" scaled="0"/>
+        </a:gradFill>
+        <a:gradFill rotWithShape="1">
+          <a:gsLst>
+            <a:gs pos="0">
+              <a:schemeClr val="phClr">
+                <a:satMod val="103000"/>
+                <a:lumMod val="102000"/>
+                <a:tint val="94000"/>
+              </a:schemeClr>
+            </a:gs>
+            <a:gs pos="50000">
+              <a:schemeClr val="phClr">
+                <a:satMod val="110000"/>
+                <a:lumMod val="100000"/>
+                <a:shade val="100000"/>
+              </a:schemeClr>
+            </a:gs>
+            <a:gs pos="100000">
+              <a:schemeClr val="phClr">
+                <a:lumMod val="99000"/>
+                <a:satMod val="120000"/>
+                <a:shade val="78000"/>
+              </a:schemeClr>
+            </a:gs>
+          </a:gsLst>
+          <a:lin ang="5400000" scaled="0"/>
+        </a:gradFill>
+      </a:fillStyleLst>
+      <a:lnStyleLst>
+        <a:ln w="6350" cap="flat" cmpd="sng" algn="ctr">
+          <a:solidFill>
+            <a:schemeClr val="phClr"/>
+          </a:solidFill>
+          <a:prstDash val="solid"/>
+          <a:miter lim="800000"/>
+        </a:ln>
+        <a:ln w="12700" cap="flat" cmpd="sng" algn="ctr">
+          <a:solidFill>
+            <a:schemeClr val="phClr"/>
+          </a:solidFill>
+          <a:prstDash val="solid"/>
+          <a:miter lim="800000"/>
+        </a:ln>
+        <a:ln w="19050" cap="flat" cmpd="sng" algn="ctr">
+          <a:solidFill>
+            <a:schemeClr val="phClr"/>
+          </a:solidFill>
+          <a:prstDash val="solid"/>
+          <a:miter lim="800000"/>
+        </a:ln>
+      </a:lnStyleLst>
+      <a:effectStyleLst>
+        <a:effectStyle>
+          <a:effectLst/>
+        </a:effectStyle>
+        <a:effectStyle>
+          <a:effectLst/>
+        </a:effectStyle>
+        <a:effectStyle>
+          <a:effectLst>
+            <a:outerShdw blurRad="57150" dist="19050" dir="5400000" algn="ctr" rotWithShape="0">
+              <a:srgbClr val="000000">
+                <a:alpha val="63000"/>
+              </a:srgbClr>
+            </a:outerShdw>
+          </a:effectLst>
+        </a:effectStyle>
+      </a:effectStyleLst>
+      <a:bgFillStyleLst>
+        <a:solidFill>
+          <a:schemeClr val="phClr"/>
+        </a:solidFill>
+        <a:solidFill>
+          <a:schemeClr val="phClr">
+            <a:tint val="95000"/>
+            <a:satMod val="170000"/>
+          </a:schemeClr>
+        </a:solidFill>
+        <a:gradFill rotWithShape="1">
+          <a:gsLst>
+            <a:gs pos="0">
+              <a:schemeClr val="phClr">
+                <a:tint val="93000"/>
+                <a:satMod val="150000"/>
+                <a:shade val="98000"/>
+                <a:lumMod val="102000"/>
+              </a:schemeClr>
+            </a:gs>
+            <a:gs pos="50000">
+              <a:schemeClr val="phClr">
+                <a:tint val="98000"/>
+                <a:satMod val="130000"/>
+                <a:shade val="90000"/>
+                <a:lumMod val="103000"/>
+              </a:schemeClr>
+            </a:gs>
+            <a:gs pos="100000">
+              <a:schemeClr val="phClr">
+                <a:shade val="63000"/>
+                <a:satMod val="120000"/>
+              </a:schemeClr>
+            </a:gs>
+          </a:gsLst>
+          <a:lin ang="5400000" scaled="0"/>
+        </a:gradFill>
+      </a:bgFillStyleLst>
+    </a:fmtScheme>
+  </a:themeElements>
+  <a:objectDefaults/>
+  <a:extraClrSchemeLst/>
+  <a:extLst>
+    <a:ext uri="{05A4C25C-085E-4340-85A3-A5531E510DB2}">
+      <thm15:themeFamily xmlns:thm15="http://schemas.microsoft.com/office/thememl/2012/main" name="Office Theme" id="{62F939B6-93AF-4DB8-9C6B-D6C7DFDC589F}" vid="{4A3C46E8-61CC-4603-A589-7422A47A8E4A}"/>
+    </a:ext>
+  </a:extLst>
+</a:theme>
 </file>
</xml_diff>